<commit_message>
Updated slides and added a manual for preparing for the workshop
</commit_message>
<xml_diff>
--- a/Slides/MiCM_GitHub_Workshop.pptx
+++ b/Slides/MiCM_GitHub_Workshop.pptx
@@ -5,7 +5,7 @@
     <p:sldMasterId id="2147483672" r:id="rId1"/>
   </p:sldMasterIdLst>
   <p:notesMasterIdLst>
-    <p:notesMasterId r:id="rId9"/>
+    <p:notesMasterId r:id="rId13"/>
   </p:notesMasterIdLst>
   <p:sldIdLst>
     <p:sldId id="316" r:id="rId2"/>
@@ -13,8 +13,12 @@
     <p:sldId id="317" r:id="rId4"/>
     <p:sldId id="318" r:id="rId5"/>
     <p:sldId id="319" r:id="rId6"/>
-    <p:sldId id="263" r:id="rId7"/>
+    <p:sldId id="320" r:id="rId7"/>
     <p:sldId id="277" r:id="rId8"/>
+    <p:sldId id="321" r:id="rId9"/>
+    <p:sldId id="322" r:id="rId10"/>
+    <p:sldId id="323" r:id="rId11"/>
+    <p:sldId id="324" r:id="rId12"/>
   </p:sldIdLst>
   <p:sldSz cx="9144000" cy="6858000" type="screen4x3"/>
   <p:notesSz cx="6858000" cy="9144000"/>
@@ -124,7 +128,7 @@
 <file path=ppt/revisionInfo.xml><?xml version="1.0" encoding="utf-8"?>
 <p1510:revInfo xmlns:a="http://schemas.openxmlformats.org/drawingml/2006/main" xmlns:r="http://schemas.openxmlformats.org/officeDocument/2006/relationships" xmlns:p1510="http://schemas.microsoft.com/office/powerpoint/2015/10/main">
   <p1510:revLst>
-    <p1510:client id="{FC38A552-1810-4A9B-8174-E44D3C19BC43}" v="2" dt="2022-06-01T12:54:21.991"/>
+    <p1510:client id="{FC38A552-1810-4A9B-8174-E44D3C19BC43}" v="3" dt="2022-06-01T18:25:04.535"/>
   </p1510:revLst>
 </p1510:revInfo>
 </file>
@@ -1993,7 +1997,7 @@
   <pc:docChgLst>
     <pc:chgData name="Adrien Osakwe" userId="7a3e290c-eb83-484b-8e3d-d46ef2333477" providerId="ADAL" clId="{FC38A552-1810-4A9B-8174-E44D3C19BC43}"/>
     <pc:docChg chg="undo custSel addSld delSld modSld sldOrd modMainMaster">
-      <pc:chgData name="Adrien Osakwe" userId="7a3e290c-eb83-484b-8e3d-d46ef2333477" providerId="ADAL" clId="{FC38A552-1810-4A9B-8174-E44D3C19BC43}" dt="2022-06-01T15:00:18.851" v="803" actId="20577"/>
+      <pc:chgData name="Adrien Osakwe" userId="7a3e290c-eb83-484b-8e3d-d46ef2333477" providerId="ADAL" clId="{FC38A552-1810-4A9B-8174-E44D3C19BC43}" dt="2022-06-01T18:33:02.128" v="1284" actId="20577"/>
       <pc:docMkLst>
         <pc:docMk/>
       </pc:docMkLst>
@@ -2004,8 +2008,15 @@
           <pc:sldMk cId="3133242724" sldId="262"/>
         </pc:sldMkLst>
       </pc:sldChg>
+      <pc:sldChg chg="del">
+        <pc:chgData name="Adrien Osakwe" userId="7a3e290c-eb83-484b-8e3d-d46ef2333477" providerId="ADAL" clId="{FC38A552-1810-4A9B-8174-E44D3C19BC43}" dt="2022-06-01T18:19:11.785" v="889" actId="47"/>
+        <pc:sldMkLst>
+          <pc:docMk/>
+          <pc:sldMk cId="2115249166" sldId="263"/>
+        </pc:sldMkLst>
+      </pc:sldChg>
       <pc:sldChg chg="modSp mod">
-        <pc:chgData name="Adrien Osakwe" userId="7a3e290c-eb83-484b-8e3d-d46ef2333477" providerId="ADAL" clId="{FC38A552-1810-4A9B-8174-E44D3C19BC43}" dt="2022-06-01T14:59:10.438" v="605" actId="20577"/>
+        <pc:chgData name="Adrien Osakwe" userId="7a3e290c-eb83-484b-8e3d-d46ef2333477" providerId="ADAL" clId="{FC38A552-1810-4A9B-8174-E44D3C19BC43}" dt="2022-06-01T18:33:02.128" v="1284" actId="20577"/>
         <pc:sldMkLst>
           <pc:docMk/>
           <pc:sldMk cId="3891667287" sldId="277"/>
@@ -2019,7 +2030,7 @@
           </ac:spMkLst>
         </pc:spChg>
         <pc:spChg chg="mod">
-          <ac:chgData name="Adrien Osakwe" userId="7a3e290c-eb83-484b-8e3d-d46ef2333477" providerId="ADAL" clId="{FC38A552-1810-4A9B-8174-E44D3C19BC43}" dt="2022-06-01T12:53:26.728" v="71"/>
+          <ac:chgData name="Adrien Osakwe" userId="7a3e290c-eb83-484b-8e3d-d46ef2333477" providerId="ADAL" clId="{FC38A552-1810-4A9B-8174-E44D3C19BC43}" dt="2022-06-01T18:32:50.366" v="1242" actId="5793"/>
           <ac:spMkLst>
             <pc:docMk/>
             <pc:sldMk cId="3891667287" sldId="277"/>
@@ -2027,7 +2038,7 @@
           </ac:spMkLst>
         </pc:spChg>
         <pc:spChg chg="mod">
-          <ac:chgData name="Adrien Osakwe" userId="7a3e290c-eb83-484b-8e3d-d46ef2333477" providerId="ADAL" clId="{FC38A552-1810-4A9B-8174-E44D3C19BC43}" dt="2022-06-01T12:53:26.728" v="71"/>
+          <ac:chgData name="Adrien Osakwe" userId="7a3e290c-eb83-484b-8e3d-d46ef2333477" providerId="ADAL" clId="{FC38A552-1810-4A9B-8174-E44D3C19BC43}" dt="2022-06-01T18:33:02.128" v="1284" actId="20577"/>
           <ac:spMkLst>
             <pc:docMk/>
             <pc:sldMk cId="3891667287" sldId="277"/>
@@ -2059,13 +2070,13 @@
         </pc:spChg>
       </pc:sldChg>
       <pc:sldChg chg="modSp new mod">
-        <pc:chgData name="Adrien Osakwe" userId="7a3e290c-eb83-484b-8e3d-d46ef2333477" providerId="ADAL" clId="{FC38A552-1810-4A9B-8174-E44D3C19BC43}" dt="2022-06-01T12:58:09.156" v="493" actId="20577"/>
+        <pc:chgData name="Adrien Osakwe" userId="7a3e290c-eb83-484b-8e3d-d46ef2333477" providerId="ADAL" clId="{FC38A552-1810-4A9B-8174-E44D3C19BC43}" dt="2022-06-01T18:18:00.039" v="864" actId="20577"/>
         <pc:sldMkLst>
           <pc:docMk/>
           <pc:sldMk cId="1592450976" sldId="317"/>
         </pc:sldMkLst>
         <pc:spChg chg="mod">
-          <ac:chgData name="Adrien Osakwe" userId="7a3e290c-eb83-484b-8e3d-d46ef2333477" providerId="ADAL" clId="{FC38A552-1810-4A9B-8174-E44D3C19BC43}" dt="2022-06-01T12:58:09.156" v="493" actId="20577"/>
+          <ac:chgData name="Adrien Osakwe" userId="7a3e290c-eb83-484b-8e3d-d46ef2333477" providerId="ADAL" clId="{FC38A552-1810-4A9B-8174-E44D3C19BC43}" dt="2022-06-01T18:18:00.039" v="864" actId="20577"/>
           <ac:spMkLst>
             <pc:docMk/>
             <pc:sldMk cId="1592450976" sldId="317"/>
@@ -2126,13 +2137,13 @@
         </pc:sldMkLst>
       </pc:sldChg>
       <pc:sldChg chg="modSp new mod">
-        <pc:chgData name="Adrien Osakwe" userId="7a3e290c-eb83-484b-8e3d-d46ef2333477" providerId="ADAL" clId="{FC38A552-1810-4A9B-8174-E44D3C19BC43}" dt="2022-06-01T13:01:33.224" v="584" actId="20577"/>
+        <pc:chgData name="Adrien Osakwe" userId="7a3e290c-eb83-484b-8e3d-d46ef2333477" providerId="ADAL" clId="{FC38A552-1810-4A9B-8174-E44D3C19BC43}" dt="2022-06-01T18:18:44.622" v="870" actId="20577"/>
         <pc:sldMkLst>
           <pc:docMk/>
           <pc:sldMk cId="4043592756" sldId="318"/>
         </pc:sldMkLst>
         <pc:spChg chg="mod">
-          <ac:chgData name="Adrien Osakwe" userId="7a3e290c-eb83-484b-8e3d-d46ef2333477" providerId="ADAL" clId="{FC38A552-1810-4A9B-8174-E44D3C19BC43}" dt="2022-06-01T13:01:33.224" v="584" actId="20577"/>
+          <ac:chgData name="Adrien Osakwe" userId="7a3e290c-eb83-484b-8e3d-d46ef2333477" providerId="ADAL" clId="{FC38A552-1810-4A9B-8174-E44D3C19BC43}" dt="2022-06-01T18:18:44.622" v="870" actId="20577"/>
           <ac:spMkLst>
             <pc:docMk/>
             <pc:sldMk cId="4043592756" sldId="318"/>
@@ -2140,18 +2151,116 @@
           </ac:spMkLst>
         </pc:spChg>
       </pc:sldChg>
-      <pc:sldChg chg="modSp new mod">
-        <pc:chgData name="Adrien Osakwe" userId="7a3e290c-eb83-484b-8e3d-d46ef2333477" providerId="ADAL" clId="{FC38A552-1810-4A9B-8174-E44D3C19BC43}" dt="2022-06-01T15:00:18.851" v="803" actId="20577"/>
+      <pc:sldChg chg="addSp modSp new mod">
+        <pc:chgData name="Adrien Osakwe" userId="7a3e290c-eb83-484b-8e3d-d46ef2333477" providerId="ADAL" clId="{FC38A552-1810-4A9B-8174-E44D3C19BC43}" dt="2022-06-01T18:32:09.463" v="1123" actId="20577"/>
         <pc:sldMkLst>
           <pc:docMk/>
           <pc:sldMk cId="116534369" sldId="319"/>
         </pc:sldMkLst>
         <pc:spChg chg="mod">
-          <ac:chgData name="Adrien Osakwe" userId="7a3e290c-eb83-484b-8e3d-d46ef2333477" providerId="ADAL" clId="{FC38A552-1810-4A9B-8174-E44D3C19BC43}" dt="2022-06-01T15:00:18.851" v="803" actId="20577"/>
+          <ac:chgData name="Adrien Osakwe" userId="7a3e290c-eb83-484b-8e3d-d46ef2333477" providerId="ADAL" clId="{FC38A552-1810-4A9B-8174-E44D3C19BC43}" dt="2022-06-01T18:32:09.463" v="1123" actId="20577"/>
           <ac:spMkLst>
             <pc:docMk/>
             <pc:sldMk cId="116534369" sldId="319"/>
             <ac:spMk id="2" creationId="{FA28E789-0CD4-A736-2344-766F87DCC678}"/>
+          </ac:spMkLst>
+        </pc:spChg>
+        <pc:picChg chg="add mod">
+          <ac:chgData name="Adrien Osakwe" userId="7a3e290c-eb83-484b-8e3d-d46ef2333477" providerId="ADAL" clId="{FC38A552-1810-4A9B-8174-E44D3C19BC43}" dt="2022-06-01T18:25:08.762" v="921" actId="1076"/>
+          <ac:picMkLst>
+            <pc:docMk/>
+            <pc:sldMk cId="116534369" sldId="319"/>
+            <ac:picMk id="3" creationId="{CFE7429E-D8FE-94C9-7214-25CAF3BC98FE}"/>
+          </ac:picMkLst>
+        </pc:picChg>
+      </pc:sldChg>
+      <pc:sldChg chg="modSp new mod ord">
+        <pc:chgData name="Adrien Osakwe" userId="7a3e290c-eb83-484b-8e3d-d46ef2333477" providerId="ADAL" clId="{FC38A552-1810-4A9B-8174-E44D3C19BC43}" dt="2022-06-01T18:32:34.802" v="1176" actId="20577"/>
+        <pc:sldMkLst>
+          <pc:docMk/>
+          <pc:sldMk cId="511111868" sldId="320"/>
+        </pc:sldMkLst>
+        <pc:spChg chg="mod">
+          <ac:chgData name="Adrien Osakwe" userId="7a3e290c-eb83-484b-8e3d-d46ef2333477" providerId="ADAL" clId="{FC38A552-1810-4A9B-8174-E44D3C19BC43}" dt="2022-06-01T18:32:34.802" v="1176" actId="20577"/>
+          <ac:spMkLst>
+            <pc:docMk/>
+            <pc:sldMk cId="511111868" sldId="320"/>
+            <ac:spMk id="2" creationId="{100FAA95-56E1-2195-5855-46B50DD5E678}"/>
+          </ac:spMkLst>
+        </pc:spChg>
+      </pc:sldChg>
+      <pc:sldChg chg="modSp new mod ord">
+        <pc:chgData name="Adrien Osakwe" userId="7a3e290c-eb83-484b-8e3d-d46ef2333477" providerId="ADAL" clId="{FC38A552-1810-4A9B-8174-E44D3C19BC43}" dt="2022-06-01T18:19:46.502" v="918" actId="20577"/>
+        <pc:sldMkLst>
+          <pc:docMk/>
+          <pc:sldMk cId="620605204" sldId="321"/>
+        </pc:sldMkLst>
+        <pc:spChg chg="mod">
+          <ac:chgData name="Adrien Osakwe" userId="7a3e290c-eb83-484b-8e3d-d46ef2333477" providerId="ADAL" clId="{FC38A552-1810-4A9B-8174-E44D3C19BC43}" dt="2022-06-01T18:19:46.502" v="918" actId="20577"/>
+          <ac:spMkLst>
+            <pc:docMk/>
+            <pc:sldMk cId="620605204" sldId="321"/>
+            <ac:spMk id="2" creationId="{C724517E-9288-0D5B-A398-F1132CA83813}"/>
+          </ac:spMkLst>
+        </pc:spChg>
+      </pc:sldChg>
+      <pc:sldChg chg="modSp new mod">
+        <pc:chgData name="Adrien Osakwe" userId="7a3e290c-eb83-484b-8e3d-d46ef2333477" providerId="ADAL" clId="{FC38A552-1810-4A9B-8174-E44D3C19BC43}" dt="2022-06-01T18:25:56.281" v="939" actId="20577"/>
+        <pc:sldMkLst>
+          <pc:docMk/>
+          <pc:sldMk cId="607115465" sldId="322"/>
+        </pc:sldMkLst>
+        <pc:spChg chg="mod">
+          <ac:chgData name="Adrien Osakwe" userId="7a3e290c-eb83-484b-8e3d-d46ef2333477" providerId="ADAL" clId="{FC38A552-1810-4A9B-8174-E44D3C19BC43}" dt="2022-06-01T18:25:56.281" v="939" actId="20577"/>
+          <ac:spMkLst>
+            <pc:docMk/>
+            <pc:sldMk cId="607115465" sldId="322"/>
+            <ac:spMk id="2" creationId="{DDA2806D-35FE-24B5-F6B0-BC4E91E20B63}"/>
+          </ac:spMkLst>
+        </pc:spChg>
+      </pc:sldChg>
+      <pc:sldChg chg="modSp new del mod">
+        <pc:chgData name="Adrien Osakwe" userId="7a3e290c-eb83-484b-8e3d-d46ef2333477" providerId="ADAL" clId="{FC38A552-1810-4A9B-8174-E44D3C19BC43}" dt="2022-06-01T18:30:51.637" v="942" actId="47"/>
+        <pc:sldMkLst>
+          <pc:docMk/>
+          <pc:sldMk cId="53559797" sldId="323"/>
+        </pc:sldMkLst>
+        <pc:spChg chg="mod">
+          <ac:chgData name="Adrien Osakwe" userId="7a3e290c-eb83-484b-8e3d-d46ef2333477" providerId="ADAL" clId="{FC38A552-1810-4A9B-8174-E44D3C19BC43}" dt="2022-06-01T18:30:48.452" v="941" actId="5793"/>
+          <ac:spMkLst>
+            <pc:docMk/>
+            <pc:sldMk cId="53559797" sldId="323"/>
+            <ac:spMk id="2" creationId="{45B14239-FC03-5B6F-CF71-1C8C0AA5D74C}"/>
+          </ac:spMkLst>
+        </pc:spChg>
+      </pc:sldChg>
+      <pc:sldChg chg="modSp new mod">
+        <pc:chgData name="Adrien Osakwe" userId="7a3e290c-eb83-484b-8e3d-d46ef2333477" providerId="ADAL" clId="{FC38A552-1810-4A9B-8174-E44D3C19BC43}" dt="2022-06-01T18:31:10.499" v="995" actId="20577"/>
+        <pc:sldMkLst>
+          <pc:docMk/>
+          <pc:sldMk cId="2151990461" sldId="323"/>
+        </pc:sldMkLst>
+        <pc:spChg chg="mod">
+          <ac:chgData name="Adrien Osakwe" userId="7a3e290c-eb83-484b-8e3d-d46ef2333477" providerId="ADAL" clId="{FC38A552-1810-4A9B-8174-E44D3C19BC43}" dt="2022-06-01T18:31:10.499" v="995" actId="20577"/>
+          <ac:spMkLst>
+            <pc:docMk/>
+            <pc:sldMk cId="2151990461" sldId="323"/>
+            <ac:spMk id="2" creationId="{537CF4C5-19DD-1456-A479-EB3A56303A29}"/>
+          </ac:spMkLst>
+        </pc:spChg>
+      </pc:sldChg>
+      <pc:sldChg chg="modSp new mod">
+        <pc:chgData name="Adrien Osakwe" userId="7a3e290c-eb83-484b-8e3d-d46ef2333477" providerId="ADAL" clId="{FC38A552-1810-4A9B-8174-E44D3C19BC43}" dt="2022-06-01T18:31:32.890" v="1058" actId="20577"/>
+        <pc:sldMkLst>
+          <pc:docMk/>
+          <pc:sldMk cId="1537293915" sldId="324"/>
+        </pc:sldMkLst>
+        <pc:spChg chg="mod">
+          <ac:chgData name="Adrien Osakwe" userId="7a3e290c-eb83-484b-8e3d-d46ef2333477" providerId="ADAL" clId="{FC38A552-1810-4A9B-8174-E44D3C19BC43}" dt="2022-06-01T18:31:32.890" v="1058" actId="20577"/>
+          <ac:spMkLst>
+            <pc:docMk/>
+            <pc:sldMk cId="1537293915" sldId="324"/>
+            <ac:spMk id="2" creationId="{36BF4A6E-5D75-77B9-9DA7-DC7FB331562E}"/>
           </ac:spMkLst>
         </pc:spChg>
       </pc:sldChg>
@@ -7415,6 +7524,122 @@
 </p:sld>
 </file>
 
+<file path=ppt/slides/slide10.xml><?xml version="1.0" encoding="utf-8"?>
+<p:sld xmlns:a="http://schemas.openxmlformats.org/drawingml/2006/main" xmlns:r="http://schemas.openxmlformats.org/officeDocument/2006/relationships" xmlns:p="http://schemas.openxmlformats.org/presentationml/2006/main">
+  <p:cSld>
+    <p:spTree>
+      <p:nvGrpSpPr>
+        <p:cNvPr id="1" name=""/>
+        <p:cNvGrpSpPr/>
+        <p:nvPr/>
+      </p:nvGrpSpPr>
+      <p:grpSpPr>
+        <a:xfrm>
+          <a:off x="0" y="0"/>
+          <a:ext cx="0" cy="0"/>
+          <a:chOff x="0" y="0"/>
+          <a:chExt cx="0" cy="0"/>
+        </a:xfrm>
+      </p:grpSpPr>
+      <p:sp>
+        <p:nvSpPr>
+          <p:cNvPr id="2" name="Title 1">
+            <a:extLst>
+              <a:ext uri="{FF2B5EF4-FFF2-40B4-BE49-F238E27FC236}">
+                <a16:creationId xmlns:a16="http://schemas.microsoft.com/office/drawing/2014/main" id="{537CF4C5-19DD-1456-A479-EB3A56303A29}"/>
+              </a:ext>
+            </a:extLst>
+          </p:cNvPr>
+          <p:cNvSpPr>
+            <a:spLocks noGrp="1"/>
+          </p:cNvSpPr>
+          <p:nvPr>
+            <p:ph type="title"/>
+          </p:nvPr>
+        </p:nvSpPr>
+        <p:spPr/>
+        <p:txBody>
+          <a:bodyPr/>
+          <a:lstStyle/>
+          <a:p>
+            <a:r>
+              <a:rPr lang="en-CA" dirty="0"/>
+              <a:t>Part II – Working on Local Projects</a:t>
+            </a:r>
+          </a:p>
+        </p:txBody>
+      </p:sp>
+    </p:spTree>
+    <p:extLst>
+      <p:ext uri="{BB962C8B-B14F-4D97-AF65-F5344CB8AC3E}">
+        <p14:creationId xmlns:p14="http://schemas.microsoft.com/office/powerpoint/2010/main" val="2151990461"/>
+      </p:ext>
+    </p:extLst>
+  </p:cSld>
+  <p:clrMapOvr>
+    <a:masterClrMapping/>
+  </p:clrMapOvr>
+</p:sld>
+</file>
+
+<file path=ppt/slides/slide11.xml><?xml version="1.0" encoding="utf-8"?>
+<p:sld xmlns:a="http://schemas.openxmlformats.org/drawingml/2006/main" xmlns:r="http://schemas.openxmlformats.org/officeDocument/2006/relationships" xmlns:p="http://schemas.openxmlformats.org/presentationml/2006/main">
+  <p:cSld>
+    <p:spTree>
+      <p:nvGrpSpPr>
+        <p:cNvPr id="1" name=""/>
+        <p:cNvGrpSpPr/>
+        <p:nvPr/>
+      </p:nvGrpSpPr>
+      <p:grpSpPr>
+        <a:xfrm>
+          <a:off x="0" y="0"/>
+          <a:ext cx="0" cy="0"/>
+          <a:chOff x="0" y="0"/>
+          <a:chExt cx="0" cy="0"/>
+        </a:xfrm>
+      </p:grpSpPr>
+      <p:sp>
+        <p:nvSpPr>
+          <p:cNvPr id="2" name="Title 1">
+            <a:extLst>
+              <a:ext uri="{FF2B5EF4-FFF2-40B4-BE49-F238E27FC236}">
+                <a16:creationId xmlns:a16="http://schemas.microsoft.com/office/drawing/2014/main" id="{36BF4A6E-5D75-77B9-9DA7-DC7FB331562E}"/>
+              </a:ext>
+            </a:extLst>
+          </p:cNvPr>
+          <p:cNvSpPr>
+            <a:spLocks noGrp="1"/>
+          </p:cNvSpPr>
+          <p:nvPr>
+            <p:ph type="title"/>
+          </p:nvPr>
+        </p:nvSpPr>
+        <p:spPr/>
+        <p:txBody>
+          <a:bodyPr/>
+          <a:lstStyle/>
+          <a:p>
+            <a:r>
+              <a:rPr lang="en-CA" dirty="0"/>
+              <a:t>Part III – Hosting Projects on GitHub</a:t>
+            </a:r>
+          </a:p>
+        </p:txBody>
+      </p:sp>
+    </p:spTree>
+    <p:extLst>
+      <p:ext uri="{BB962C8B-B14F-4D97-AF65-F5344CB8AC3E}">
+        <p14:creationId xmlns:p14="http://schemas.microsoft.com/office/powerpoint/2010/main" val="1537293915"/>
+      </p:ext>
+    </p:extLst>
+  </p:cSld>
+  <p:clrMapOvr>
+    <a:masterClrMapping/>
+  </p:clrMapOvr>
+</p:sld>
+</file>
+
 <file path=ppt/slides/slide2.xml><?xml version="1.0" encoding="utf-8"?>
 <p:sld xmlns:a="http://schemas.openxmlformats.org/drawingml/2006/main" xmlns:r="http://schemas.openxmlformats.org/officeDocument/2006/relationships" xmlns:p="http://schemas.openxmlformats.org/presentationml/2006/main">
   <p:cSld>
@@ -7488,7 +7713,7 @@
             </a:pPr>
             <a:r>
               <a:rPr lang="en-CA" b="1" dirty="0"/>
-              <a:t>Objectives for this workshop:</a:t>
+              <a:t>Topics for this workshop:</a:t>
             </a:r>
           </a:p>
           <a:p>
@@ -7518,7 +7743,7 @@
             </a:pPr>
             <a:r>
               <a:rPr lang="en-CA" dirty="0"/>
-              <a:t>Vocabulary</a:t>
+              <a:t>Git Pipeline</a:t>
             </a:r>
           </a:p>
           <a:p>
@@ -7528,7 +7753,7 @@
             </a:pPr>
             <a:r>
               <a:rPr lang="en-CA" dirty="0"/>
-              <a:t>Part II -  Managing Personal Projects</a:t>
+              <a:t>Part II -  Managing Local Projects</a:t>
             </a:r>
           </a:p>
           <a:p>
@@ -7568,7 +7793,7 @@
             </a:pPr>
             <a:r>
               <a:rPr lang="en-CA" dirty="0"/>
-              <a:t>Part III – Collaboration and Reproducibility</a:t>
+              <a:t>Part III – Working with Remote Projects on GitHub</a:t>
             </a:r>
           </a:p>
           <a:p>
@@ -7669,12 +7894,41 @@
             </a:pPr>
             <a:r>
               <a:rPr lang="en-CA" dirty="0"/>
-              <a:t>A Git </a:t>
+              <a:t>A Git repository with a README file</a:t>
             </a:r>
+          </a:p>
+          <a:p>
+            <a:pPr marL="514350" indent="-514350">
+              <a:buFont typeface="+mj-lt"/>
+              <a:buAutoNum type="arabicPeriod"/>
+            </a:pPr>
+            <a:endParaRPr lang="en-CA" dirty="0"/>
+          </a:p>
+          <a:p>
+            <a:pPr marL="0" indent="0">
+              <a:buNone/>
+            </a:pPr>
             <a:r>
-              <a:rPr lang="en-CA"/>
-              <a:t>repository with a README file</a:t>
+              <a:rPr lang="en-CA" b="1" dirty="0"/>
+              <a:t>Hands-on Activities</a:t>
             </a:r>
+          </a:p>
+          <a:p>
+            <a:r>
+              <a:rPr lang="en-CA" dirty="0"/>
+              <a:t>Quick Review Polls</a:t>
+            </a:r>
+          </a:p>
+          <a:p>
+            <a:r>
+              <a:rPr lang="en-CA" dirty="0"/>
+              <a:t>Git-based activities</a:t>
+            </a:r>
+          </a:p>
+          <a:p>
+            <a:pPr marL="0" indent="0">
+              <a:buNone/>
+            </a:pPr>
             <a:endParaRPr lang="en-CA" dirty="0"/>
           </a:p>
         </p:txBody>
@@ -7725,7 +7979,12 @@
             <p:ph type="body" sz="quarter" idx="10"/>
           </p:nvPr>
         </p:nvSpPr>
-        <p:spPr/>
+        <p:spPr>
+          <a:xfrm>
+            <a:off x="242372" y="1454228"/>
+            <a:ext cx="4802239" cy="4924350"/>
+          </a:xfrm>
+        </p:spPr>
         <p:txBody>
           <a:bodyPr/>
           <a:lstStyle/>
@@ -7735,29 +7994,53 @@
             </a:pPr>
             <a:r>
               <a:rPr lang="en-CA" b="1" dirty="0"/>
-              <a:t>Hands-on Activities</a:t>
+              <a:t>Version Control Systems</a:t>
             </a:r>
-          </a:p>
-          <a:p>
-            <a:pPr marL="0" indent="0">
-              <a:buNone/>
-            </a:pPr>
-            <a:endParaRPr lang="en-CA" b="1" dirty="0"/>
           </a:p>
           <a:p>
             <a:r>
               <a:rPr lang="en-CA" dirty="0"/>
-              <a:t>Quick Review Polls</a:t>
+              <a:t>Make it easier to document changes</a:t>
             </a:r>
           </a:p>
           <a:p>
             <a:r>
               <a:rPr lang="en-CA" dirty="0"/>
-              <a:t>Git-based activities</a:t>
+              <a:t>Less confusion</a:t>
             </a:r>
           </a:p>
         </p:txBody>
       </p:sp>
+      <p:pic>
+        <p:nvPicPr>
+          <p:cNvPr id="3" name="Picture 2">
+            <a:extLst>
+              <a:ext uri="{FF2B5EF4-FFF2-40B4-BE49-F238E27FC236}">
+                <a16:creationId xmlns:a16="http://schemas.microsoft.com/office/drawing/2014/main" id="{CFE7429E-D8FE-94C9-7214-25CAF3BC98FE}"/>
+              </a:ext>
+            </a:extLst>
+          </p:cNvPr>
+          <p:cNvPicPr>
+            <a:picLocks noChangeAspect="1"/>
+          </p:cNvPicPr>
+          <p:nvPr/>
+        </p:nvPicPr>
+        <p:blipFill>
+          <a:blip r:embed="rId2"/>
+          <a:stretch>
+            <a:fillRect/>
+          </a:stretch>
+        </p:blipFill>
+        <p:spPr>
+          <a:xfrm>
+            <a:off x="5137563" y="1407368"/>
+            <a:ext cx="3763552" cy="5018069"/>
+          </a:xfrm>
+          <a:prstGeom prst="rect">
+            <a:avLst/>
+          </a:prstGeom>
+        </p:spPr>
+      </p:pic>
     </p:spTree>
     <p:extLst>
       <p:ext uri="{BB962C8B-B14F-4D97-AF65-F5344CB8AC3E}">
@@ -7788,10 +8071,47 @@
           <a:chExt cx="0" cy="0"/>
         </a:xfrm>
       </p:grpSpPr>
+      <p:sp>
+        <p:nvSpPr>
+          <p:cNvPr id="2" name="Text Placeholder 1">
+            <a:extLst>
+              <a:ext uri="{FF2B5EF4-FFF2-40B4-BE49-F238E27FC236}">
+                <a16:creationId xmlns:a16="http://schemas.microsoft.com/office/drawing/2014/main" id="{100FAA95-56E1-2195-5855-46B50DD5E678}"/>
+              </a:ext>
+            </a:extLst>
+          </p:cNvPr>
+          <p:cNvSpPr>
+            <a:spLocks noGrp="1"/>
+          </p:cNvSpPr>
+          <p:nvPr>
+            <p:ph type="body" sz="quarter" idx="10"/>
+          </p:nvPr>
+        </p:nvSpPr>
+        <p:spPr/>
+        <p:txBody>
+          <a:bodyPr/>
+          <a:lstStyle/>
+          <a:p>
+            <a:pPr marL="0" indent="0">
+              <a:buNone/>
+            </a:pPr>
+            <a:r>
+              <a:rPr lang="en-CA" b="1" dirty="0"/>
+              <a:t>Git</a:t>
+            </a:r>
+          </a:p>
+          <a:p>
+            <a:r>
+              <a:rPr lang="en-CA" dirty="0"/>
+              <a:t>A type of version control system</a:t>
+            </a:r>
+          </a:p>
+        </p:txBody>
+      </p:sp>
     </p:spTree>
     <p:extLst>
       <p:ext uri="{BB962C8B-B14F-4D97-AF65-F5344CB8AC3E}">
-        <p14:creationId xmlns:p14="http://schemas.microsoft.com/office/powerpoint/2010/main" val="2115249166"/>
+        <p14:creationId xmlns:p14="http://schemas.microsoft.com/office/powerpoint/2010/main" val="511111868"/>
       </p:ext>
     </p:extLst>
   </p:cSld>
@@ -7867,7 +8187,16 @@
           <a:bodyPr/>
           <a:lstStyle/>
           <a:p>
-            <a:endParaRPr lang="en-CA"/>
+            <a:r>
+              <a:rPr lang="en-CA" dirty="0"/>
+              <a:t>A version control system</a:t>
+            </a:r>
+          </a:p>
+          <a:p>
+            <a:pPr marL="0" indent="0">
+              <a:buNone/>
+            </a:pPr>
+            <a:endParaRPr lang="en-CA" dirty="0"/>
           </a:p>
         </p:txBody>
       </p:sp>
@@ -7892,7 +8221,18 @@
           <a:bodyPr/>
           <a:lstStyle/>
           <a:p>
-            <a:endParaRPr lang="en-CA"/>
+            <a:r>
+              <a:rPr lang="en-CA" dirty="0"/>
+              <a:t>A server that </a:t>
+            </a:r>
+            <a:r>
+              <a:rPr lang="en-CA" b="1" dirty="0"/>
+              <a:t>hosts </a:t>
+            </a:r>
+            <a:r>
+              <a:rPr lang="en-CA"/>
+              <a:t>git repositories</a:t>
+            </a:r>
           </a:p>
         </p:txBody>
       </p:sp>
@@ -7900,6 +8240,128 @@
     <p:extLst>
       <p:ext uri="{BB962C8B-B14F-4D97-AF65-F5344CB8AC3E}">
         <p14:creationId xmlns:p14="http://schemas.microsoft.com/office/powerpoint/2010/main" val="3891667287"/>
+      </p:ext>
+    </p:extLst>
+  </p:cSld>
+  <p:clrMapOvr>
+    <a:masterClrMapping/>
+  </p:clrMapOvr>
+</p:sld>
+</file>
+
+<file path=ppt/slides/slide8.xml><?xml version="1.0" encoding="utf-8"?>
+<p:sld xmlns:a="http://schemas.openxmlformats.org/drawingml/2006/main" xmlns:r="http://schemas.openxmlformats.org/officeDocument/2006/relationships" xmlns:p="http://schemas.openxmlformats.org/presentationml/2006/main">
+  <p:cSld>
+    <p:spTree>
+      <p:nvGrpSpPr>
+        <p:cNvPr id="1" name=""/>
+        <p:cNvGrpSpPr/>
+        <p:nvPr/>
+      </p:nvGrpSpPr>
+      <p:grpSpPr>
+        <a:xfrm>
+          <a:off x="0" y="0"/>
+          <a:ext cx="0" cy="0"/>
+          <a:chOff x="0" y="0"/>
+          <a:chExt cx="0" cy="0"/>
+        </a:xfrm>
+      </p:grpSpPr>
+      <p:sp>
+        <p:nvSpPr>
+          <p:cNvPr id="2" name="Text Placeholder 1">
+            <a:extLst>
+              <a:ext uri="{FF2B5EF4-FFF2-40B4-BE49-F238E27FC236}">
+                <a16:creationId xmlns:a16="http://schemas.microsoft.com/office/drawing/2014/main" id="{C724517E-9288-0D5B-A398-F1132CA83813}"/>
+              </a:ext>
+            </a:extLst>
+          </p:cNvPr>
+          <p:cNvSpPr>
+            <a:spLocks noGrp="1"/>
+          </p:cNvSpPr>
+          <p:nvPr>
+            <p:ph type="body" sz="quarter" idx="10"/>
+          </p:nvPr>
+        </p:nvSpPr>
+        <p:spPr/>
+        <p:txBody>
+          <a:bodyPr/>
+          <a:lstStyle/>
+          <a:p>
+            <a:pPr marL="0" indent="0">
+              <a:buNone/>
+            </a:pPr>
+            <a:r>
+              <a:rPr lang="en-CA" b="1" dirty="0"/>
+              <a:t>Git Pipeline</a:t>
+            </a:r>
+          </a:p>
+        </p:txBody>
+      </p:sp>
+    </p:spTree>
+    <p:extLst>
+      <p:ext uri="{BB962C8B-B14F-4D97-AF65-F5344CB8AC3E}">
+        <p14:creationId xmlns:p14="http://schemas.microsoft.com/office/powerpoint/2010/main" val="620605204"/>
+      </p:ext>
+    </p:extLst>
+  </p:cSld>
+  <p:clrMapOvr>
+    <a:masterClrMapping/>
+  </p:clrMapOvr>
+</p:sld>
+</file>
+
+<file path=ppt/slides/slide9.xml><?xml version="1.0" encoding="utf-8"?>
+<p:sld xmlns:a="http://schemas.openxmlformats.org/drawingml/2006/main" xmlns:r="http://schemas.openxmlformats.org/officeDocument/2006/relationships" xmlns:p="http://schemas.openxmlformats.org/presentationml/2006/main">
+  <p:cSld>
+    <p:spTree>
+      <p:nvGrpSpPr>
+        <p:cNvPr id="1" name=""/>
+        <p:cNvGrpSpPr/>
+        <p:nvPr/>
+      </p:nvGrpSpPr>
+      <p:grpSpPr>
+        <a:xfrm>
+          <a:off x="0" y="0"/>
+          <a:ext cx="0" cy="0"/>
+          <a:chOff x="0" y="0"/>
+          <a:chExt cx="0" cy="0"/>
+        </a:xfrm>
+      </p:grpSpPr>
+      <p:sp>
+        <p:nvSpPr>
+          <p:cNvPr id="2" name="Text Placeholder 1">
+            <a:extLst>
+              <a:ext uri="{FF2B5EF4-FFF2-40B4-BE49-F238E27FC236}">
+                <a16:creationId xmlns:a16="http://schemas.microsoft.com/office/drawing/2014/main" id="{DDA2806D-35FE-24B5-F6B0-BC4E91E20B63}"/>
+              </a:ext>
+            </a:extLst>
+          </p:cNvPr>
+          <p:cNvSpPr>
+            <a:spLocks noGrp="1"/>
+          </p:cNvSpPr>
+          <p:nvPr>
+            <p:ph type="body" sz="quarter" idx="10"/>
+          </p:nvPr>
+        </p:nvSpPr>
+        <p:spPr/>
+        <p:txBody>
+          <a:bodyPr/>
+          <a:lstStyle/>
+          <a:p>
+            <a:pPr marL="0" indent="0">
+              <a:buNone/>
+            </a:pPr>
+            <a:r>
+              <a:rPr lang="en-CA" b="1" dirty="0"/>
+              <a:t>Summary</a:t>
+            </a:r>
+          </a:p>
+        </p:txBody>
+      </p:sp>
+    </p:spTree>
+    <p:extLst>
+      <p:ext uri="{BB962C8B-B14F-4D97-AF65-F5344CB8AC3E}">
+        <p14:creationId xmlns:p14="http://schemas.microsoft.com/office/powerpoint/2010/main" val="607115465"/>
       </p:ext>
     </p:extLst>
   </p:cSld>

</xml_diff>

<commit_message>
Initial drafts of Outline and Requirements
If I choose to do the workshop in one day, this is a viable commit. If not I will modify pdfs to make it a two day event.
</commit_message>
<xml_diff>
--- a/Slides/MiCM_GitHub_Workshop.pptx
+++ b/Slides/MiCM_GitHub_Workshop.pptx
@@ -5,7 +5,7 @@
     <p:sldMasterId id="2147483672" r:id="rId1"/>
   </p:sldMasterIdLst>
   <p:notesMasterIdLst>
-    <p:notesMasterId r:id="rId30"/>
+    <p:notesMasterId r:id="rId38"/>
   </p:notesMasterIdLst>
   <p:sldIdLst>
     <p:sldId id="316" r:id="rId2"/>
@@ -19,23 +19,31 @@
     <p:sldId id="327" r:id="rId10"/>
     <p:sldId id="321" r:id="rId11"/>
     <p:sldId id="339" r:id="rId12"/>
-    <p:sldId id="322" r:id="rId13"/>
-    <p:sldId id="341" r:id="rId14"/>
-    <p:sldId id="333" r:id="rId15"/>
-    <p:sldId id="334" r:id="rId16"/>
-    <p:sldId id="323" r:id="rId17"/>
-    <p:sldId id="325" r:id="rId18"/>
-    <p:sldId id="335" r:id="rId19"/>
-    <p:sldId id="336" r:id="rId20"/>
-    <p:sldId id="337" r:id="rId21"/>
-    <p:sldId id="338" r:id="rId22"/>
-    <p:sldId id="324" r:id="rId23"/>
-    <p:sldId id="328" r:id="rId24"/>
-    <p:sldId id="340" r:id="rId25"/>
-    <p:sldId id="326" r:id="rId26"/>
-    <p:sldId id="329" r:id="rId27"/>
-    <p:sldId id="330" r:id="rId28"/>
-    <p:sldId id="331" r:id="rId29"/>
+    <p:sldId id="343" r:id="rId13"/>
+    <p:sldId id="322" r:id="rId14"/>
+    <p:sldId id="341" r:id="rId15"/>
+    <p:sldId id="333" r:id="rId16"/>
+    <p:sldId id="334" r:id="rId17"/>
+    <p:sldId id="344" r:id="rId18"/>
+    <p:sldId id="323" r:id="rId19"/>
+    <p:sldId id="325" r:id="rId20"/>
+    <p:sldId id="335" r:id="rId21"/>
+    <p:sldId id="336" r:id="rId22"/>
+    <p:sldId id="337" r:id="rId23"/>
+    <p:sldId id="338" r:id="rId24"/>
+    <p:sldId id="345" r:id="rId25"/>
+    <p:sldId id="324" r:id="rId26"/>
+    <p:sldId id="328" r:id="rId27"/>
+    <p:sldId id="340" r:id="rId28"/>
+    <p:sldId id="326" r:id="rId29"/>
+    <p:sldId id="346" r:id="rId30"/>
+    <p:sldId id="347" r:id="rId31"/>
+    <p:sldId id="348" r:id="rId32"/>
+    <p:sldId id="350" r:id="rId33"/>
+    <p:sldId id="329" r:id="rId34"/>
+    <p:sldId id="330" r:id="rId35"/>
+    <p:sldId id="331" r:id="rId36"/>
+    <p:sldId id="342" r:id="rId37"/>
   </p:sldIdLst>
   <p:sldSz cx="9144000" cy="6858000" type="screen4x3"/>
   <p:notesSz cx="6858000" cy="9144000"/>
@@ -145,7 +153,7 @@
 <file path=ppt/revisionInfo.xml><?xml version="1.0" encoding="utf-8"?>
 <p1510:revInfo xmlns:a="http://schemas.openxmlformats.org/drawingml/2006/main" xmlns:r="http://schemas.openxmlformats.org/officeDocument/2006/relationships" xmlns:p1510="http://schemas.microsoft.com/office/powerpoint/2015/10/main">
   <p1510:revLst>
-    <p1510:client id="{FC38A552-1810-4A9B-8174-E44D3C19BC43}" v="32" dt="2022-06-06T15:28:12.135"/>
+    <p1510:client id="{FC38A552-1810-4A9B-8174-E44D3C19BC43}" v="46" dt="2022-06-06T17:58:32.840"/>
   </p1510:revLst>
 </p1510:revInfo>
 </file>
@@ -2014,7 +2022,7 @@
   <pc:docChgLst>
     <pc:chgData name="Adrien Osakwe" userId="7a3e290c-eb83-484b-8e3d-d46ef2333477" providerId="ADAL" clId="{FC38A552-1810-4A9B-8174-E44D3C19BC43}"/>
     <pc:docChg chg="undo custSel addSld delSld modSld sldOrd modMainMaster">
-      <pc:chgData name="Adrien Osakwe" userId="7a3e290c-eb83-484b-8e3d-d46ef2333477" providerId="ADAL" clId="{FC38A552-1810-4A9B-8174-E44D3C19BC43}" dt="2022-06-06T15:28:33.489" v="3741" actId="20577"/>
+      <pc:chgData name="Adrien Osakwe" userId="7a3e290c-eb83-484b-8e3d-d46ef2333477" providerId="ADAL" clId="{FC38A552-1810-4A9B-8174-E44D3C19BC43}" dt="2022-06-06T18:11:58.260" v="5742" actId="47"/>
       <pc:docMkLst>
         <pc:docMk/>
       </pc:docMkLst>
@@ -2032,8 +2040,8 @@
           <pc:sldMk cId="2115249166" sldId="263"/>
         </pc:sldMkLst>
       </pc:sldChg>
-      <pc:sldChg chg="modSp mod">
-        <pc:chgData name="Adrien Osakwe" userId="7a3e290c-eb83-484b-8e3d-d46ef2333477" providerId="ADAL" clId="{FC38A552-1810-4A9B-8174-E44D3C19BC43}" dt="2022-06-01T18:33:02.128" v="1284" actId="20577"/>
+      <pc:sldChg chg="modSp mod ord">
+        <pc:chgData name="Adrien Osakwe" userId="7a3e290c-eb83-484b-8e3d-d46ef2333477" providerId="ADAL" clId="{FC38A552-1810-4A9B-8174-E44D3C19BC43}" dt="2022-06-06T18:01:15.590" v="5370" actId="20577"/>
         <pc:sldMkLst>
           <pc:docMk/>
           <pc:sldMk cId="3891667287" sldId="277"/>
@@ -2047,7 +2055,7 @@
           </ac:spMkLst>
         </pc:spChg>
         <pc:spChg chg="mod">
-          <ac:chgData name="Adrien Osakwe" userId="7a3e290c-eb83-484b-8e3d-d46ef2333477" providerId="ADAL" clId="{FC38A552-1810-4A9B-8174-E44D3C19BC43}" dt="2022-06-01T18:32:50.366" v="1242" actId="5793"/>
+          <ac:chgData name="Adrien Osakwe" userId="7a3e290c-eb83-484b-8e3d-d46ef2333477" providerId="ADAL" clId="{FC38A552-1810-4A9B-8174-E44D3C19BC43}" dt="2022-06-06T18:01:03.728" v="5321" actId="20577"/>
           <ac:spMkLst>
             <pc:docMk/>
             <pc:sldMk cId="3891667287" sldId="277"/>
@@ -2055,7 +2063,7 @@
           </ac:spMkLst>
         </pc:spChg>
         <pc:spChg chg="mod">
-          <ac:chgData name="Adrien Osakwe" userId="7a3e290c-eb83-484b-8e3d-d46ef2333477" providerId="ADAL" clId="{FC38A552-1810-4A9B-8174-E44D3C19BC43}" dt="2022-06-01T18:33:02.128" v="1284" actId="20577"/>
+          <ac:chgData name="Adrien Osakwe" userId="7a3e290c-eb83-484b-8e3d-d46ef2333477" providerId="ADAL" clId="{FC38A552-1810-4A9B-8174-E44D3C19BC43}" dt="2022-06-06T18:01:15.590" v="5370" actId="20577"/>
           <ac:spMkLst>
             <pc:docMk/>
             <pc:sldMk cId="3891667287" sldId="277"/>
@@ -2169,7 +2177,7 @@
         </pc:spChg>
       </pc:sldChg>
       <pc:sldChg chg="addSp delSp modSp new mod modNotesTx">
-        <pc:chgData name="Adrien Osakwe" userId="7a3e290c-eb83-484b-8e3d-d46ef2333477" providerId="ADAL" clId="{FC38A552-1810-4A9B-8174-E44D3C19BC43}" dt="2022-06-06T15:17:07.461" v="3713" actId="1076"/>
+        <pc:chgData name="Adrien Osakwe" userId="7a3e290c-eb83-484b-8e3d-d46ef2333477" providerId="ADAL" clId="{FC38A552-1810-4A9B-8174-E44D3C19BC43}" dt="2022-06-06T17:58:37.483" v="5085" actId="20577"/>
         <pc:sldMkLst>
           <pc:docMk/>
           <pc:sldMk cId="116534369" sldId="319"/>
@@ -2190,6 +2198,14 @@
             <ac:spMk id="4" creationId="{D249ACC2-CA9B-EA03-F92E-78E1D9B6E3DC}"/>
           </ac:spMkLst>
         </pc:spChg>
+        <pc:spChg chg="add mod">
+          <ac:chgData name="Adrien Osakwe" userId="7a3e290c-eb83-484b-8e3d-d46ef2333477" providerId="ADAL" clId="{FC38A552-1810-4A9B-8174-E44D3C19BC43}" dt="2022-06-06T17:58:37.483" v="5085" actId="20577"/>
+          <ac:spMkLst>
+            <pc:docMk/>
+            <pc:sldMk cId="116534369" sldId="319"/>
+            <ac:spMk id="5" creationId="{F50C0EF4-3357-D0B4-AACB-CEAEFAD6502E}"/>
+          </ac:spMkLst>
+        </pc:spChg>
         <pc:picChg chg="add mod modCrop">
           <ac:chgData name="Adrien Osakwe" userId="7a3e290c-eb83-484b-8e3d-d46ef2333477" providerId="ADAL" clId="{FC38A552-1810-4A9B-8174-E44D3C19BC43}" dt="2022-06-06T15:17:07.461" v="3713" actId="1076"/>
           <ac:picMkLst>
@@ -2207,20 +2223,28 @@
           </ac:picMkLst>
         </pc:picChg>
       </pc:sldChg>
-      <pc:sldChg chg="modSp new mod ord">
-        <pc:chgData name="Adrien Osakwe" userId="7a3e290c-eb83-484b-8e3d-d46ef2333477" providerId="ADAL" clId="{FC38A552-1810-4A9B-8174-E44D3C19BC43}" dt="2022-06-01T18:32:34.802" v="1176" actId="20577"/>
+      <pc:sldChg chg="addSp modSp new mod ord">
+        <pc:chgData name="Adrien Osakwe" userId="7a3e290c-eb83-484b-8e3d-d46ef2333477" providerId="ADAL" clId="{FC38A552-1810-4A9B-8174-E44D3C19BC43}" dt="2022-06-06T18:00:05.129" v="5241" actId="20577"/>
         <pc:sldMkLst>
           <pc:docMk/>
           <pc:sldMk cId="511111868" sldId="320"/>
         </pc:sldMkLst>
         <pc:spChg chg="mod">
-          <ac:chgData name="Adrien Osakwe" userId="7a3e290c-eb83-484b-8e3d-d46ef2333477" providerId="ADAL" clId="{FC38A552-1810-4A9B-8174-E44D3C19BC43}" dt="2022-06-01T18:32:34.802" v="1176" actId="20577"/>
+          <ac:chgData name="Adrien Osakwe" userId="7a3e290c-eb83-484b-8e3d-d46ef2333477" providerId="ADAL" clId="{FC38A552-1810-4A9B-8174-E44D3C19BC43}" dt="2022-06-06T18:00:05.129" v="5241" actId="20577"/>
           <ac:spMkLst>
             <pc:docMk/>
             <pc:sldMk cId="511111868" sldId="320"/>
             <ac:spMk id="2" creationId="{100FAA95-56E1-2195-5855-46B50DD5E678}"/>
           </ac:spMkLst>
         </pc:spChg>
+        <pc:picChg chg="add mod">
+          <ac:chgData name="Adrien Osakwe" userId="7a3e290c-eb83-484b-8e3d-d46ef2333477" providerId="ADAL" clId="{FC38A552-1810-4A9B-8174-E44D3C19BC43}" dt="2022-06-06T15:46:46.098" v="3942" actId="1076"/>
+          <ac:picMkLst>
+            <pc:docMk/>
+            <pc:sldMk cId="511111868" sldId="320"/>
+            <ac:picMk id="1026" creationId="{72C526F7-AD9B-8A76-27CF-5B8208E932A9}"/>
+          </ac:picMkLst>
+        </pc:picChg>
       </pc:sldChg>
       <pc:sldChg chg="addSp delSp modSp new mod ord modNotesTx">
         <pc:chgData name="Adrien Osakwe" userId="7a3e290c-eb83-484b-8e3d-d46ef2333477" providerId="ADAL" clId="{FC38A552-1810-4A9B-8174-E44D3C19BC43}" dt="2022-06-06T14:47:29.427" v="3276" actId="21"/>
@@ -2373,20 +2397,28 @@
           </ac:picMkLst>
         </pc:picChg>
       </pc:sldChg>
-      <pc:sldChg chg="modSp new mod modNotesTx">
-        <pc:chgData name="Adrien Osakwe" userId="7a3e290c-eb83-484b-8e3d-d46ef2333477" providerId="ADAL" clId="{FC38A552-1810-4A9B-8174-E44D3C19BC43}" dt="2022-06-03T20:06:13.503" v="3149" actId="20577"/>
+      <pc:sldChg chg="addSp delSp modSp new mod modNotesTx">
+        <pc:chgData name="Adrien Osakwe" userId="7a3e290c-eb83-484b-8e3d-d46ef2333477" providerId="ADAL" clId="{FC38A552-1810-4A9B-8174-E44D3C19BC43}" dt="2022-06-06T18:03:30.251" v="5418" actId="20577"/>
         <pc:sldMkLst>
           <pc:docMk/>
           <pc:sldMk cId="607115465" sldId="322"/>
         </pc:sldMkLst>
         <pc:spChg chg="mod">
-          <ac:chgData name="Adrien Osakwe" userId="7a3e290c-eb83-484b-8e3d-d46ef2333477" providerId="ADAL" clId="{FC38A552-1810-4A9B-8174-E44D3C19BC43}" dt="2022-06-03T19:54:15.333" v="2523" actId="20577"/>
+          <ac:chgData name="Adrien Osakwe" userId="7a3e290c-eb83-484b-8e3d-d46ef2333477" providerId="ADAL" clId="{FC38A552-1810-4A9B-8174-E44D3C19BC43}" dt="2022-06-06T18:03:30.251" v="5418" actId="20577"/>
           <ac:spMkLst>
             <pc:docMk/>
             <pc:sldMk cId="607115465" sldId="322"/>
             <ac:spMk id="2" creationId="{DDA2806D-35FE-24B5-F6B0-BC4E91E20B63}"/>
           </ac:spMkLst>
         </pc:spChg>
+        <pc:picChg chg="add del">
+          <ac:chgData name="Adrien Osakwe" userId="7a3e290c-eb83-484b-8e3d-d46ef2333477" providerId="ADAL" clId="{FC38A552-1810-4A9B-8174-E44D3C19BC43}" dt="2022-06-06T15:51:49.022" v="4386"/>
+          <ac:picMkLst>
+            <pc:docMk/>
+            <pc:sldMk cId="607115465" sldId="322"/>
+            <ac:picMk id="2050" creationId="{49D7D839-524B-31F4-3283-4F14D187229D}"/>
+          </ac:picMkLst>
+        </pc:picChg>
       </pc:sldChg>
       <pc:sldChg chg="modSp new del mod">
         <pc:chgData name="Adrien Osakwe" userId="7a3e290c-eb83-484b-8e3d-d46ef2333477" providerId="ADAL" clId="{FC38A552-1810-4A9B-8174-E44D3C19BC43}" dt="2022-06-01T18:30:51.637" v="942" actId="47"/>
@@ -2434,13 +2466,13 @@
         </pc:spChg>
       </pc:sldChg>
       <pc:sldChg chg="modSp new mod">
-        <pc:chgData name="Adrien Osakwe" userId="7a3e290c-eb83-484b-8e3d-d46ef2333477" providerId="ADAL" clId="{FC38A552-1810-4A9B-8174-E44D3C19BC43}" dt="2022-06-03T15:49:18.387" v="1574" actId="20577"/>
+        <pc:chgData name="Adrien Osakwe" userId="7a3e290c-eb83-484b-8e3d-d46ef2333477" providerId="ADAL" clId="{FC38A552-1810-4A9B-8174-E44D3C19BC43}" dt="2022-06-06T16:25:23.706" v="4614" actId="20577"/>
         <pc:sldMkLst>
           <pc:docMk/>
           <pc:sldMk cId="130669974" sldId="325"/>
         </pc:sldMkLst>
         <pc:spChg chg="mod">
-          <ac:chgData name="Adrien Osakwe" userId="7a3e290c-eb83-484b-8e3d-d46ef2333477" providerId="ADAL" clId="{FC38A552-1810-4A9B-8174-E44D3C19BC43}" dt="2022-06-03T15:49:18.387" v="1574" actId="20577"/>
+          <ac:chgData name="Adrien Osakwe" userId="7a3e290c-eb83-484b-8e3d-d46ef2333477" providerId="ADAL" clId="{FC38A552-1810-4A9B-8174-E44D3C19BC43}" dt="2022-06-06T16:25:23.706" v="4614" actId="20577"/>
           <ac:spMkLst>
             <pc:docMk/>
             <pc:sldMk cId="130669974" sldId="325"/>
@@ -2464,7 +2496,7 @@
         </pc:spChg>
       </pc:sldChg>
       <pc:sldChg chg="modSp new mod ord">
-        <pc:chgData name="Adrien Osakwe" userId="7a3e290c-eb83-484b-8e3d-d46ef2333477" providerId="ADAL" clId="{FC38A552-1810-4A9B-8174-E44D3C19BC43}" dt="2022-06-03T19:48:27.679" v="2157" actId="20577"/>
+        <pc:chgData name="Adrien Osakwe" userId="7a3e290c-eb83-484b-8e3d-d46ef2333477" providerId="ADAL" clId="{FC38A552-1810-4A9B-8174-E44D3C19BC43}" dt="2022-06-06T15:49:33.734" v="4036"/>
         <pc:sldMkLst>
           <pc:docMk/>
           <pc:sldMk cId="3120015113" sldId="327"/>
@@ -2560,13 +2592,13 @@
         </pc:sldMkLst>
       </pc:sldChg>
       <pc:sldChg chg="modSp new mod">
-        <pc:chgData name="Adrien Osakwe" userId="7a3e290c-eb83-484b-8e3d-d46ef2333477" providerId="ADAL" clId="{FC38A552-1810-4A9B-8174-E44D3C19BC43}" dt="2022-06-03T20:01:52.108" v="3076" actId="20577"/>
+        <pc:chgData name="Adrien Osakwe" userId="7a3e290c-eb83-484b-8e3d-d46ef2333477" providerId="ADAL" clId="{FC38A552-1810-4A9B-8174-E44D3C19BC43}" dt="2022-06-06T15:41:21.781" v="3940" actId="20577"/>
         <pc:sldMkLst>
           <pc:docMk/>
           <pc:sldMk cId="890084902" sldId="331"/>
         </pc:sldMkLst>
         <pc:spChg chg="mod">
-          <ac:chgData name="Adrien Osakwe" userId="7a3e290c-eb83-484b-8e3d-d46ef2333477" providerId="ADAL" clId="{FC38A552-1810-4A9B-8174-E44D3C19BC43}" dt="2022-06-03T20:01:52.108" v="3076" actId="20577"/>
+          <ac:chgData name="Adrien Osakwe" userId="7a3e290c-eb83-484b-8e3d-d46ef2333477" providerId="ADAL" clId="{FC38A552-1810-4A9B-8174-E44D3C19BC43}" dt="2022-06-06T15:41:21.781" v="3940" actId="20577"/>
           <ac:spMkLst>
             <pc:docMk/>
             <pc:sldMk cId="890084902" sldId="331"/>
@@ -2597,14 +2629,14 @@
           </ac:picMkLst>
         </pc:picChg>
       </pc:sldChg>
-      <pc:sldChg chg="modSp new mod">
-        <pc:chgData name="Adrien Osakwe" userId="7a3e290c-eb83-484b-8e3d-d46ef2333477" providerId="ADAL" clId="{FC38A552-1810-4A9B-8174-E44D3C19BC43}" dt="2022-06-03T20:06:45.730" v="3206" actId="20577"/>
+      <pc:sldChg chg="modSp new mod modNotesTx">
+        <pc:chgData name="Adrien Osakwe" userId="7a3e290c-eb83-484b-8e3d-d46ef2333477" providerId="ADAL" clId="{FC38A552-1810-4A9B-8174-E44D3C19BC43}" dt="2022-06-06T16:24:23.961" v="4549" actId="20577"/>
         <pc:sldMkLst>
           <pc:docMk/>
           <pc:sldMk cId="634442937" sldId="333"/>
         </pc:sldMkLst>
         <pc:spChg chg="mod">
-          <ac:chgData name="Adrien Osakwe" userId="7a3e290c-eb83-484b-8e3d-d46ef2333477" providerId="ADAL" clId="{FC38A552-1810-4A9B-8174-E44D3C19BC43}" dt="2022-06-03T20:06:45.730" v="3206" actId="20577"/>
+          <ac:chgData name="Adrien Osakwe" userId="7a3e290c-eb83-484b-8e3d-d46ef2333477" providerId="ADAL" clId="{FC38A552-1810-4A9B-8174-E44D3C19BC43}" dt="2022-06-06T15:52:31.051" v="4485" actId="20577"/>
           <ac:spMkLst>
             <pc:docMk/>
             <pc:sldMk cId="634442937" sldId="333"/>
@@ -2613,13 +2645,13 @@
         </pc:spChg>
       </pc:sldChg>
       <pc:sldChg chg="modSp new mod">
-        <pc:chgData name="Adrien Osakwe" userId="7a3e290c-eb83-484b-8e3d-d46ef2333477" providerId="ADAL" clId="{FC38A552-1810-4A9B-8174-E44D3C19BC43}" dt="2022-06-03T20:07:01.750" v="3216" actId="20577"/>
+        <pc:chgData name="Adrien Osakwe" userId="7a3e290c-eb83-484b-8e3d-d46ef2333477" providerId="ADAL" clId="{FC38A552-1810-4A9B-8174-E44D3C19BC43}" dt="2022-06-06T18:07:57.838" v="5740" actId="20577"/>
         <pc:sldMkLst>
           <pc:docMk/>
           <pc:sldMk cId="2565697555" sldId="334"/>
         </pc:sldMkLst>
         <pc:spChg chg="mod">
-          <ac:chgData name="Adrien Osakwe" userId="7a3e290c-eb83-484b-8e3d-d46ef2333477" providerId="ADAL" clId="{FC38A552-1810-4A9B-8174-E44D3C19BC43}" dt="2022-06-03T20:07:01.750" v="3216" actId="20577"/>
+          <ac:chgData name="Adrien Osakwe" userId="7a3e290c-eb83-484b-8e3d-d46ef2333477" providerId="ADAL" clId="{FC38A552-1810-4A9B-8174-E44D3C19BC43}" dt="2022-06-06T18:07:57.838" v="5740" actId="20577"/>
           <ac:spMkLst>
             <pc:docMk/>
             <pc:sldMk cId="2565697555" sldId="334"/>
@@ -2627,14 +2659,14 @@
           </ac:spMkLst>
         </pc:spChg>
       </pc:sldChg>
-      <pc:sldChg chg="modSp add mod">
-        <pc:chgData name="Adrien Osakwe" userId="7a3e290c-eb83-484b-8e3d-d46ef2333477" providerId="ADAL" clId="{FC38A552-1810-4A9B-8174-E44D3C19BC43}" dt="2022-06-03T20:07:38.049" v="3249" actId="20577"/>
+      <pc:sldChg chg="modSp add mod modNotesTx">
+        <pc:chgData name="Adrien Osakwe" userId="7a3e290c-eb83-484b-8e3d-d46ef2333477" providerId="ADAL" clId="{FC38A552-1810-4A9B-8174-E44D3C19BC43}" dt="2022-06-06T16:29:05.409" v="4688" actId="20577"/>
         <pc:sldMkLst>
           <pc:docMk/>
           <pc:sldMk cId="4165173319" sldId="335"/>
         </pc:sldMkLst>
         <pc:spChg chg="mod">
-          <ac:chgData name="Adrien Osakwe" userId="7a3e290c-eb83-484b-8e3d-d46ef2333477" providerId="ADAL" clId="{FC38A552-1810-4A9B-8174-E44D3C19BC43}" dt="2022-06-03T20:07:38.049" v="3249" actId="20577"/>
+          <ac:chgData name="Adrien Osakwe" userId="7a3e290c-eb83-484b-8e3d-d46ef2333477" providerId="ADAL" clId="{FC38A552-1810-4A9B-8174-E44D3C19BC43}" dt="2022-06-06T16:29:05.409" v="4688" actId="20577"/>
           <ac:spMkLst>
             <pc:docMk/>
             <pc:sldMk cId="4165173319" sldId="335"/>
@@ -2658,13 +2690,13 @@
         </pc:spChg>
       </pc:sldChg>
       <pc:sldChg chg="modSp add mod">
-        <pc:chgData name="Adrien Osakwe" userId="7a3e290c-eb83-484b-8e3d-d46ef2333477" providerId="ADAL" clId="{FC38A552-1810-4A9B-8174-E44D3C19BC43}" dt="2022-06-03T20:08:06.244" v="3269" actId="20577"/>
+        <pc:chgData name="Adrien Osakwe" userId="7a3e290c-eb83-484b-8e3d-d46ef2333477" providerId="ADAL" clId="{FC38A552-1810-4A9B-8174-E44D3C19BC43}" dt="2022-06-06T16:29:08.503" v="4690" actId="20577"/>
         <pc:sldMkLst>
           <pc:docMk/>
           <pc:sldMk cId="1749104538" sldId="337"/>
         </pc:sldMkLst>
         <pc:spChg chg="mod">
-          <ac:chgData name="Adrien Osakwe" userId="7a3e290c-eb83-484b-8e3d-d46ef2333477" providerId="ADAL" clId="{FC38A552-1810-4A9B-8174-E44D3C19BC43}" dt="2022-06-03T20:08:06.244" v="3269" actId="20577"/>
+          <ac:chgData name="Adrien Osakwe" userId="7a3e290c-eb83-484b-8e3d-d46ef2333477" providerId="ADAL" clId="{FC38A552-1810-4A9B-8174-E44D3C19BC43}" dt="2022-06-06T16:29:08.503" v="4690" actId="20577"/>
           <ac:spMkLst>
             <pc:docMk/>
             <pc:sldMk cId="1749104538" sldId="337"/>
@@ -2723,6 +2755,154 @@
             <ac:spMk id="2" creationId="{537CF4C5-19DD-1456-A479-EB3A56303A29}"/>
           </ac:spMkLst>
         </pc:spChg>
+      </pc:sldChg>
+      <pc:sldChg chg="modSp new mod">
+        <pc:chgData name="Adrien Osakwe" userId="7a3e290c-eb83-484b-8e3d-d46ef2333477" providerId="ADAL" clId="{FC38A552-1810-4A9B-8174-E44D3C19BC43}" dt="2022-06-06T16:21:48.521" v="4495" actId="113"/>
+        <pc:sldMkLst>
+          <pc:docMk/>
+          <pc:sldMk cId="2212101275" sldId="342"/>
+        </pc:sldMkLst>
+        <pc:spChg chg="mod">
+          <ac:chgData name="Adrien Osakwe" userId="7a3e290c-eb83-484b-8e3d-d46ef2333477" providerId="ADAL" clId="{FC38A552-1810-4A9B-8174-E44D3C19BC43}" dt="2022-06-06T16:21:48.521" v="4495" actId="113"/>
+          <ac:spMkLst>
+            <pc:docMk/>
+            <pc:sldMk cId="2212101275" sldId="342"/>
+            <ac:spMk id="2" creationId="{4B362877-EC0E-5809-5772-B43E9A438950}"/>
+          </ac:spMkLst>
+        </pc:spChg>
+      </pc:sldChg>
+      <pc:sldChg chg="modSp new mod">
+        <pc:chgData name="Adrien Osakwe" userId="7a3e290c-eb83-484b-8e3d-d46ef2333477" providerId="ADAL" clId="{FC38A552-1810-4A9B-8174-E44D3C19BC43}" dt="2022-06-06T15:51:12.504" v="4341" actId="20577"/>
+        <pc:sldMkLst>
+          <pc:docMk/>
+          <pc:sldMk cId="2827798705" sldId="343"/>
+        </pc:sldMkLst>
+        <pc:spChg chg="mod">
+          <ac:chgData name="Adrien Osakwe" userId="7a3e290c-eb83-484b-8e3d-d46ef2333477" providerId="ADAL" clId="{FC38A552-1810-4A9B-8174-E44D3C19BC43}" dt="2022-06-06T15:51:12.504" v="4341" actId="20577"/>
+          <ac:spMkLst>
+            <pc:docMk/>
+            <pc:sldMk cId="2827798705" sldId="343"/>
+            <ac:spMk id="2" creationId="{25A859FC-8253-4863-5CED-A4DFB2F9AD9A}"/>
+          </ac:spMkLst>
+        </pc:spChg>
+      </pc:sldChg>
+      <pc:sldChg chg="modSp add mod ord">
+        <pc:chgData name="Adrien Osakwe" userId="7a3e290c-eb83-484b-8e3d-d46ef2333477" providerId="ADAL" clId="{FC38A552-1810-4A9B-8174-E44D3C19BC43}" dt="2022-06-06T16:24:49.786" v="4598" actId="20577"/>
+        <pc:sldMkLst>
+          <pc:docMk/>
+          <pc:sldMk cId="1723855522" sldId="344"/>
+        </pc:sldMkLst>
+        <pc:spChg chg="mod">
+          <ac:chgData name="Adrien Osakwe" userId="7a3e290c-eb83-484b-8e3d-d46ef2333477" providerId="ADAL" clId="{FC38A552-1810-4A9B-8174-E44D3C19BC43}" dt="2022-06-06T16:24:49.786" v="4598" actId="20577"/>
+          <ac:spMkLst>
+            <pc:docMk/>
+            <pc:sldMk cId="1723855522" sldId="344"/>
+            <ac:spMk id="2" creationId="{F30F071A-0450-8F6E-F28D-8124D7A90523}"/>
+          </ac:spMkLst>
+        </pc:spChg>
+      </pc:sldChg>
+      <pc:sldChg chg="modSp add mod">
+        <pc:chgData name="Adrien Osakwe" userId="7a3e290c-eb83-484b-8e3d-d46ef2333477" providerId="ADAL" clId="{FC38A552-1810-4A9B-8174-E44D3C19BC43}" dt="2022-06-06T16:29:13.006" v="4692" actId="20577"/>
+        <pc:sldMkLst>
+          <pc:docMk/>
+          <pc:sldMk cId="1081245530" sldId="345"/>
+        </pc:sldMkLst>
+        <pc:spChg chg="mod">
+          <ac:chgData name="Adrien Osakwe" userId="7a3e290c-eb83-484b-8e3d-d46ef2333477" providerId="ADAL" clId="{FC38A552-1810-4A9B-8174-E44D3C19BC43}" dt="2022-06-06T16:29:13.006" v="4692" actId="20577"/>
+          <ac:spMkLst>
+            <pc:docMk/>
+            <pc:sldMk cId="1081245530" sldId="345"/>
+            <ac:spMk id="2" creationId="{F30F071A-0450-8F6E-F28D-8124D7A90523}"/>
+          </ac:spMkLst>
+        </pc:spChg>
+      </pc:sldChg>
+      <pc:sldChg chg="modSp add mod">
+        <pc:chgData name="Adrien Osakwe" userId="7a3e290c-eb83-484b-8e3d-d46ef2333477" providerId="ADAL" clId="{FC38A552-1810-4A9B-8174-E44D3C19BC43}" dt="2022-06-06T16:29:43.597" v="4783" actId="20577"/>
+        <pc:sldMkLst>
+          <pc:docMk/>
+          <pc:sldMk cId="2611691246" sldId="346"/>
+        </pc:sldMkLst>
+        <pc:spChg chg="mod">
+          <ac:chgData name="Adrien Osakwe" userId="7a3e290c-eb83-484b-8e3d-d46ef2333477" providerId="ADAL" clId="{FC38A552-1810-4A9B-8174-E44D3C19BC43}" dt="2022-06-06T16:29:43.597" v="4783" actId="20577"/>
+          <ac:spMkLst>
+            <pc:docMk/>
+            <pc:sldMk cId="2611691246" sldId="346"/>
+            <ac:spMk id="2" creationId="{F30F071A-0450-8F6E-F28D-8124D7A90523}"/>
+          </ac:spMkLst>
+        </pc:spChg>
+      </pc:sldChg>
+      <pc:sldChg chg="modSp add mod">
+        <pc:chgData name="Adrien Osakwe" userId="7a3e290c-eb83-484b-8e3d-d46ef2333477" providerId="ADAL" clId="{FC38A552-1810-4A9B-8174-E44D3C19BC43}" dt="2022-06-06T16:29:55.063" v="4814" actId="20577"/>
+        <pc:sldMkLst>
+          <pc:docMk/>
+          <pc:sldMk cId="3458676307" sldId="347"/>
+        </pc:sldMkLst>
+        <pc:spChg chg="mod">
+          <ac:chgData name="Adrien Osakwe" userId="7a3e290c-eb83-484b-8e3d-d46ef2333477" providerId="ADAL" clId="{FC38A552-1810-4A9B-8174-E44D3C19BC43}" dt="2022-06-06T16:29:55.063" v="4814" actId="20577"/>
+          <ac:spMkLst>
+            <pc:docMk/>
+            <pc:sldMk cId="3458676307" sldId="347"/>
+            <ac:spMk id="2" creationId="{F30F071A-0450-8F6E-F28D-8124D7A90523}"/>
+          </ac:spMkLst>
+        </pc:spChg>
+      </pc:sldChg>
+      <pc:sldChg chg="new del">
+        <pc:chgData name="Adrien Osakwe" userId="7a3e290c-eb83-484b-8e3d-d46ef2333477" providerId="ADAL" clId="{FC38A552-1810-4A9B-8174-E44D3C19BC43}" dt="2022-06-06T16:30:15.924" v="4816" actId="47"/>
+        <pc:sldMkLst>
+          <pc:docMk/>
+          <pc:sldMk cId="307895873" sldId="348"/>
+        </pc:sldMkLst>
+      </pc:sldChg>
+      <pc:sldChg chg="modSp add mod">
+        <pc:chgData name="Adrien Osakwe" userId="7a3e290c-eb83-484b-8e3d-d46ef2333477" providerId="ADAL" clId="{FC38A552-1810-4A9B-8174-E44D3C19BC43}" dt="2022-06-06T16:30:57.034" v="4921" actId="20577"/>
+        <pc:sldMkLst>
+          <pc:docMk/>
+          <pc:sldMk cId="308561724" sldId="348"/>
+        </pc:sldMkLst>
+        <pc:spChg chg="mod">
+          <ac:chgData name="Adrien Osakwe" userId="7a3e290c-eb83-484b-8e3d-d46ef2333477" providerId="ADAL" clId="{FC38A552-1810-4A9B-8174-E44D3C19BC43}" dt="2022-06-06T16:30:57.034" v="4921" actId="20577"/>
+          <ac:spMkLst>
+            <pc:docMk/>
+            <pc:sldMk cId="308561724" sldId="348"/>
+            <ac:spMk id="2" creationId="{F30F071A-0450-8F6E-F28D-8124D7A90523}"/>
+          </ac:spMkLst>
+        </pc:spChg>
+      </pc:sldChg>
+      <pc:sldChg chg="add del">
+        <pc:chgData name="Adrien Osakwe" userId="7a3e290c-eb83-484b-8e3d-d46ef2333477" providerId="ADAL" clId="{FC38A552-1810-4A9B-8174-E44D3C19BC43}" dt="2022-06-06T16:30:19.210" v="4818"/>
+        <pc:sldMkLst>
+          <pc:docMk/>
+          <pc:sldMk cId="2683925971" sldId="348"/>
+        </pc:sldMkLst>
+      </pc:sldChg>
+      <pc:sldChg chg="new del">
+        <pc:chgData name="Adrien Osakwe" userId="7a3e290c-eb83-484b-8e3d-d46ef2333477" providerId="ADAL" clId="{FC38A552-1810-4A9B-8174-E44D3C19BC43}" dt="2022-06-06T16:31:26.606" v="4924" actId="47"/>
+        <pc:sldMkLst>
+          <pc:docMk/>
+          <pc:sldMk cId="2490028108" sldId="349"/>
+        </pc:sldMkLst>
+      </pc:sldChg>
+      <pc:sldChg chg="modSp add mod">
+        <pc:chgData name="Adrien Osakwe" userId="7a3e290c-eb83-484b-8e3d-d46ef2333477" providerId="ADAL" clId="{FC38A552-1810-4A9B-8174-E44D3C19BC43}" dt="2022-06-06T16:32:02.120" v="5065" actId="20577"/>
+        <pc:sldMkLst>
+          <pc:docMk/>
+          <pc:sldMk cId="4007831989" sldId="350"/>
+        </pc:sldMkLst>
+        <pc:spChg chg="mod">
+          <ac:chgData name="Adrien Osakwe" userId="7a3e290c-eb83-484b-8e3d-d46ef2333477" providerId="ADAL" clId="{FC38A552-1810-4A9B-8174-E44D3C19BC43}" dt="2022-06-06T16:32:02.120" v="5065" actId="20577"/>
+          <ac:spMkLst>
+            <pc:docMk/>
+            <pc:sldMk cId="4007831989" sldId="350"/>
+            <ac:spMk id="2" creationId="{F30F071A-0450-8F6E-F28D-8124D7A90523}"/>
+          </ac:spMkLst>
+        </pc:spChg>
+      </pc:sldChg>
+      <pc:sldChg chg="new del">
+        <pc:chgData name="Adrien Osakwe" userId="7a3e290c-eb83-484b-8e3d-d46ef2333477" providerId="ADAL" clId="{FC38A552-1810-4A9B-8174-E44D3C19BC43}" dt="2022-06-06T18:11:58.260" v="5742" actId="47"/>
+        <pc:sldMkLst>
+          <pc:docMk/>
+          <pc:sldMk cId="877614117" sldId="351"/>
+        </pc:sldMkLst>
       </pc:sldChg>
       <pc:sldMasterChg chg="addSp modSldLayout">
         <pc:chgData name="Adrien Osakwe" userId="7a3e290c-eb83-484b-8e3d-d46ef2333477" providerId="ADAL" clId="{FC38A552-1810-4A9B-8174-E44D3C19BC43}" dt="2022-06-01T12:53:26.728" v="71"/>
@@ -3766,7 +3946,7 @@
           <a:p>
             <a:fld id="{DACBD60B-517C-4242-AE46-E1BD2D086542}" type="slidenum">
               <a:rPr lang="fr-FR" smtClean="0"/>
-              <a:t>12</a:t>
+              <a:t>13</a:t>
             </a:fld>
             <a:endParaRPr lang="fr-FR"/>
           </a:p>
@@ -3776,6 +3956,180 @@
     <p:extLst>
       <p:ext uri="{BB962C8B-B14F-4D97-AF65-F5344CB8AC3E}">
         <p14:creationId xmlns:p14="http://schemas.microsoft.com/office/powerpoint/2010/main" val="2189421525"/>
+      </p:ext>
+    </p:extLst>
+  </p:cSld>
+  <p:clrMapOvr>
+    <a:masterClrMapping/>
+  </p:clrMapOvr>
+</p:notes>
+</file>
+
+<file path=ppt/notesSlides/notesSlide6.xml><?xml version="1.0" encoding="utf-8"?>
+<p:notes xmlns:a="http://schemas.openxmlformats.org/drawingml/2006/main" xmlns:r="http://schemas.openxmlformats.org/officeDocument/2006/relationships" xmlns:p="http://schemas.openxmlformats.org/presentationml/2006/main">
+  <p:cSld>
+    <p:spTree>
+      <p:nvGrpSpPr>
+        <p:cNvPr id="1" name=""/>
+        <p:cNvGrpSpPr/>
+        <p:nvPr/>
+      </p:nvGrpSpPr>
+      <p:grpSpPr>
+        <a:xfrm>
+          <a:off x="0" y="0"/>
+          <a:ext cx="0" cy="0"/>
+          <a:chOff x="0" y="0"/>
+          <a:chExt cx="0" cy="0"/>
+        </a:xfrm>
+      </p:grpSpPr>
+      <p:sp>
+        <p:nvSpPr>
+          <p:cNvPr id="2" name="Slide Image Placeholder 1"/>
+          <p:cNvSpPr>
+            <a:spLocks noGrp="1" noRot="1" noChangeAspect="1"/>
+          </p:cNvSpPr>
+          <p:nvPr>
+            <p:ph type="sldImg"/>
+          </p:nvPr>
+        </p:nvSpPr>
+        <p:spPr/>
+      </p:sp>
+      <p:sp>
+        <p:nvSpPr>
+          <p:cNvPr id="3" name="Notes Placeholder 2"/>
+          <p:cNvSpPr>
+            <a:spLocks noGrp="1"/>
+          </p:cNvSpPr>
+          <p:nvPr>
+            <p:ph type="body" idx="1"/>
+          </p:nvPr>
+        </p:nvSpPr>
+        <p:spPr/>
+        <p:txBody>
+          <a:bodyPr/>
+          <a:lstStyle/>
+          <a:p>
+            <a:r>
+              <a:rPr lang="en-CA" dirty="0"/>
+              <a:t>Create it, edit it, move it, remove it</a:t>
+            </a:r>
+          </a:p>
+        </p:txBody>
+      </p:sp>
+      <p:sp>
+        <p:nvSpPr>
+          <p:cNvPr id="4" name="Slide Number Placeholder 3"/>
+          <p:cNvSpPr>
+            <a:spLocks noGrp="1"/>
+          </p:cNvSpPr>
+          <p:nvPr>
+            <p:ph type="sldNum" sz="quarter" idx="5"/>
+          </p:nvPr>
+        </p:nvSpPr>
+        <p:spPr/>
+        <p:txBody>
+          <a:bodyPr/>
+          <a:lstStyle/>
+          <a:p>
+            <a:fld id="{DACBD60B-517C-4242-AE46-E1BD2D086542}" type="slidenum">
+              <a:rPr lang="fr-FR" smtClean="0"/>
+              <a:t>15</a:t>
+            </a:fld>
+            <a:endParaRPr lang="fr-FR"/>
+          </a:p>
+        </p:txBody>
+      </p:sp>
+    </p:spTree>
+    <p:extLst>
+      <p:ext uri="{BB962C8B-B14F-4D97-AF65-F5344CB8AC3E}">
+        <p14:creationId xmlns:p14="http://schemas.microsoft.com/office/powerpoint/2010/main" val="25833951"/>
+      </p:ext>
+    </p:extLst>
+  </p:cSld>
+  <p:clrMapOvr>
+    <a:masterClrMapping/>
+  </p:clrMapOvr>
+</p:notes>
+</file>
+
+<file path=ppt/notesSlides/notesSlide7.xml><?xml version="1.0" encoding="utf-8"?>
+<p:notes xmlns:a="http://schemas.openxmlformats.org/drawingml/2006/main" xmlns:r="http://schemas.openxmlformats.org/officeDocument/2006/relationships" xmlns:p="http://schemas.openxmlformats.org/presentationml/2006/main">
+  <p:cSld>
+    <p:spTree>
+      <p:nvGrpSpPr>
+        <p:cNvPr id="1" name=""/>
+        <p:cNvGrpSpPr/>
+        <p:nvPr/>
+      </p:nvGrpSpPr>
+      <p:grpSpPr>
+        <a:xfrm>
+          <a:off x="0" y="0"/>
+          <a:ext cx="0" cy="0"/>
+          <a:chOff x="0" y="0"/>
+          <a:chExt cx="0" cy="0"/>
+        </a:xfrm>
+      </p:grpSpPr>
+      <p:sp>
+        <p:nvSpPr>
+          <p:cNvPr id="2" name="Slide Image Placeholder 1"/>
+          <p:cNvSpPr>
+            <a:spLocks noGrp="1" noRot="1" noChangeAspect="1"/>
+          </p:cNvSpPr>
+          <p:nvPr>
+            <p:ph type="sldImg"/>
+          </p:nvPr>
+        </p:nvSpPr>
+        <p:spPr/>
+      </p:sp>
+      <p:sp>
+        <p:nvSpPr>
+          <p:cNvPr id="3" name="Notes Placeholder 2"/>
+          <p:cNvSpPr>
+            <a:spLocks noGrp="1"/>
+          </p:cNvSpPr>
+          <p:nvPr>
+            <p:ph type="body" idx="1"/>
+          </p:nvPr>
+        </p:nvSpPr>
+        <p:spPr/>
+        <p:txBody>
+          <a:bodyPr/>
+          <a:lstStyle/>
+          <a:p>
+            <a:r>
+              <a:rPr lang="en-CA" dirty="0"/>
+              <a:t>Create new branch and make changes</a:t>
+            </a:r>
+          </a:p>
+        </p:txBody>
+      </p:sp>
+      <p:sp>
+        <p:nvSpPr>
+          <p:cNvPr id="4" name="Slide Number Placeholder 3"/>
+          <p:cNvSpPr>
+            <a:spLocks noGrp="1"/>
+          </p:cNvSpPr>
+          <p:nvPr>
+            <p:ph type="sldNum" sz="quarter" idx="5"/>
+          </p:nvPr>
+        </p:nvSpPr>
+        <p:spPr/>
+        <p:txBody>
+          <a:bodyPr/>
+          <a:lstStyle/>
+          <a:p>
+            <a:fld id="{DACBD60B-517C-4242-AE46-E1BD2D086542}" type="slidenum">
+              <a:rPr lang="fr-FR" smtClean="0"/>
+              <a:t>20</a:t>
+            </a:fld>
+            <a:endParaRPr lang="fr-FR"/>
+          </a:p>
+        </p:txBody>
+      </p:sp>
+    </p:spTree>
+    <p:extLst>
+      <p:ext uri="{BB962C8B-B14F-4D97-AF65-F5344CB8AC3E}">
+        <p14:creationId xmlns:p14="http://schemas.microsoft.com/office/powerpoint/2010/main" val="1675639307"/>
       </p:ext>
     </p:extLst>
   </p:cSld>
@@ -9131,7 +9485,7 @@
           <p:cNvPr id="2" name="Text Placeholder 1">
             <a:extLst>
               <a:ext uri="{FF2B5EF4-FFF2-40B4-BE49-F238E27FC236}">
-                <a16:creationId xmlns:a16="http://schemas.microsoft.com/office/drawing/2014/main" id="{DDA2806D-35FE-24B5-F6B0-BC4E91E20B63}"/>
+                <a16:creationId xmlns:a16="http://schemas.microsoft.com/office/drawing/2014/main" id="{25A859FC-8253-4863-5CED-A4DFB2F9AD9A}"/>
               </a:ext>
             </a:extLst>
           </p:cNvPr>
@@ -9152,14 +9506,112 @@
             </a:pPr>
             <a:r>
               <a:rPr lang="en-CA" b="1" dirty="0"/>
+              <a:t>What is a commit?</a:t>
+            </a:r>
+          </a:p>
+          <a:p>
+            <a:pPr marL="0" indent="0">
+              <a:buNone/>
+            </a:pPr>
+            <a:endParaRPr lang="en-CA" dirty="0"/>
+          </a:p>
+          <a:p>
+            <a:r>
+              <a:rPr lang="en-CA" dirty="0"/>
+              <a:t>A commit is a saved instance of your project</a:t>
+            </a:r>
+          </a:p>
+          <a:p>
+            <a:endParaRPr lang="en-CA" dirty="0"/>
+          </a:p>
+          <a:p>
+            <a:r>
+              <a:rPr lang="en-CA" dirty="0"/>
+              <a:t>It has a </a:t>
+            </a:r>
+            <a:r>
+              <a:rPr lang="en-CA" b="1" dirty="0"/>
+              <a:t>unique ID</a:t>
+            </a:r>
+            <a:r>
+              <a:rPr lang="en-CA" dirty="0"/>
+              <a:t> and can be used to revert your project to a previous version</a:t>
+            </a:r>
+          </a:p>
+          <a:p>
+            <a:endParaRPr lang="en-CA" dirty="0"/>
+          </a:p>
+          <a:p>
+            <a:r>
+              <a:rPr lang="en-CA" dirty="0"/>
+              <a:t>Each commit keeps track of all modifications made since the previous commit</a:t>
+            </a:r>
+          </a:p>
+        </p:txBody>
+      </p:sp>
+    </p:spTree>
+    <p:extLst>
+      <p:ext uri="{BB962C8B-B14F-4D97-AF65-F5344CB8AC3E}">
+        <p14:creationId xmlns:p14="http://schemas.microsoft.com/office/powerpoint/2010/main" val="2827798705"/>
+      </p:ext>
+    </p:extLst>
+  </p:cSld>
+  <p:clrMapOvr>
+    <a:masterClrMapping/>
+  </p:clrMapOvr>
+</p:sld>
+</file>
+
+<file path=ppt/slides/slide13.xml><?xml version="1.0" encoding="utf-8"?>
+<p:sld xmlns:a="http://schemas.openxmlformats.org/drawingml/2006/main" xmlns:r="http://schemas.openxmlformats.org/officeDocument/2006/relationships" xmlns:p="http://schemas.openxmlformats.org/presentationml/2006/main">
+  <p:cSld>
+    <p:spTree>
+      <p:nvGrpSpPr>
+        <p:cNvPr id="1" name=""/>
+        <p:cNvGrpSpPr/>
+        <p:nvPr/>
+      </p:nvGrpSpPr>
+      <p:grpSpPr>
+        <a:xfrm>
+          <a:off x="0" y="0"/>
+          <a:ext cx="0" cy="0"/>
+          <a:chOff x="0" y="0"/>
+          <a:chExt cx="0" cy="0"/>
+        </a:xfrm>
+      </p:grpSpPr>
+      <p:sp>
+        <p:nvSpPr>
+          <p:cNvPr id="2" name="Text Placeholder 1">
+            <a:extLst>
+              <a:ext uri="{FF2B5EF4-FFF2-40B4-BE49-F238E27FC236}">
+                <a16:creationId xmlns:a16="http://schemas.microsoft.com/office/drawing/2014/main" id="{DDA2806D-35FE-24B5-F6B0-BC4E91E20B63}"/>
+              </a:ext>
+            </a:extLst>
+          </p:cNvPr>
+          <p:cNvSpPr>
+            <a:spLocks noGrp="1"/>
+          </p:cNvSpPr>
+          <p:nvPr>
+            <p:ph type="body" sz="quarter" idx="10"/>
+          </p:nvPr>
+        </p:nvSpPr>
+        <p:spPr/>
+        <p:txBody>
+          <a:bodyPr>
+            <a:normAutofit lnSpcReduction="10000"/>
+          </a:bodyPr>
+          <a:lstStyle/>
+          <a:p>
+            <a:pPr marL="0" indent="0">
+              <a:buNone/>
+            </a:pPr>
+            <a:r>
+              <a:rPr lang="en-CA" b="1" dirty="0"/>
               <a:t>Summary</a:t>
             </a:r>
           </a:p>
           <a:p>
-            <a:r>
-              <a:rPr lang="en-CA" dirty="0"/>
-              <a:t>Have to start tracking files after creating the git repository</a:t>
-            </a:r>
+            <a:endParaRPr lang="en-CA" dirty="0"/>
           </a:p>
           <a:p>
             <a:r>
@@ -9178,6 +9630,8 @@
               <a:rPr lang="en-CA" b="1" dirty="0"/>
               <a:t>staging area</a:t>
             </a:r>
+          </a:p>
+          <a:p>
             <a:endParaRPr lang="en-CA" dirty="0"/>
           </a:p>
           <a:p>
@@ -9193,6 +9647,32 @@
               <a:rPr lang="en-CA" dirty="0"/>
               <a:t>to the local repository</a:t>
             </a:r>
+          </a:p>
+          <a:p>
+            <a:endParaRPr lang="en-CA" dirty="0"/>
+          </a:p>
+          <a:p>
+            <a:r>
+              <a:rPr lang="en-CA" dirty="0"/>
+              <a:t>Commits can then be used to </a:t>
+            </a:r>
+            <a:r>
+              <a:rPr lang="en-CA" b="1" dirty="0"/>
+              <a:t>revert </a:t>
+            </a:r>
+            <a:r>
+              <a:rPr lang="en-CA" dirty="0"/>
+              <a:t>to previous instances of the project or simply to </a:t>
+            </a:r>
+            <a:r>
+              <a:rPr lang="en-CA" b="1" dirty="0"/>
+              <a:t>keep track</a:t>
+            </a:r>
+            <a:r>
+              <a:rPr lang="en-CA" dirty="0"/>
+              <a:t> of what changes have been made</a:t>
+            </a:r>
+            <a:endParaRPr lang="en-CA" b="1" dirty="0"/>
           </a:p>
         </p:txBody>
       </p:sp>
@@ -9209,7 +9689,7 @@
 </p:sld>
 </file>
 
-<file path=ppt/slides/slide13.xml><?xml version="1.0" encoding="utf-8"?>
+<file path=ppt/slides/slide14.xml><?xml version="1.0" encoding="utf-8"?>
 <p:sld xmlns:a="http://schemas.openxmlformats.org/drawingml/2006/main" xmlns:r="http://schemas.openxmlformats.org/officeDocument/2006/relationships" xmlns:p="http://schemas.openxmlformats.org/presentationml/2006/main">
   <p:cSld>
     <p:spTree>
@@ -9267,7 +9747,7 @@
 </p:sld>
 </file>
 
-<file path=ppt/slides/slide14.xml><?xml version="1.0" encoding="utf-8"?>
+<file path=ppt/slides/slide15.xml><?xml version="1.0" encoding="utf-8"?>
 <p:sld xmlns:a="http://schemas.openxmlformats.org/drawingml/2006/main" xmlns:r="http://schemas.openxmlformats.org/officeDocument/2006/relationships" xmlns:p="http://schemas.openxmlformats.org/presentationml/2006/main">
   <p:cSld>
     <p:spTree>
@@ -9308,6 +9788,30 @@
             <a:pPr marL="0" indent="0">
               <a:buNone/>
             </a:pPr>
+            <a:endParaRPr lang="en-CA" b="1" dirty="0"/>
+          </a:p>
+          <a:p>
+            <a:pPr marL="0" indent="0">
+              <a:buNone/>
+            </a:pPr>
+            <a:endParaRPr lang="en-CA" b="1" dirty="0"/>
+          </a:p>
+          <a:p>
+            <a:pPr marL="0" indent="0">
+              <a:buNone/>
+            </a:pPr>
+            <a:endParaRPr lang="en-CA" b="1" dirty="0"/>
+          </a:p>
+          <a:p>
+            <a:pPr marL="0" indent="0">
+              <a:buNone/>
+            </a:pPr>
+            <a:endParaRPr lang="en-CA" b="1" dirty="0"/>
+          </a:p>
+          <a:p>
+            <a:pPr marL="0" indent="0">
+              <a:buNone/>
+            </a:pPr>
             <a:r>
               <a:rPr lang="en-CA" b="1" dirty="0"/>
               <a:t>Activity #1 – Create and track a Text File with Git</a:t>
@@ -9328,7 +9832,7 @@
 </p:sld>
 </file>
 
-<file path=ppt/slides/slide15.xml><?xml version="1.0" encoding="utf-8"?>
+<file path=ppt/slides/slide16.xml><?xml version="1.0" encoding="utf-8"?>
 <p:sld xmlns:a="http://schemas.openxmlformats.org/drawingml/2006/main" xmlns:r="http://schemas.openxmlformats.org/officeDocument/2006/relationships" xmlns:p="http://schemas.openxmlformats.org/presentationml/2006/main">
   <p:cSld>
     <p:spTree>
@@ -9374,6 +9878,61 @@
               <a:t>Poll #1</a:t>
             </a:r>
           </a:p>
+          <a:p>
+            <a:pPr marL="0" indent="0">
+              <a:buNone/>
+            </a:pPr>
+            <a:endParaRPr lang="en-CA" b="1" dirty="0"/>
+          </a:p>
+          <a:p>
+            <a:pPr marL="0" indent="0">
+              <a:buNone/>
+            </a:pPr>
+            <a:r>
+              <a:rPr lang="en-CA" b="1" dirty="0"/>
+              <a:t>T/F </a:t>
+            </a:r>
+            <a:r>
+              <a:rPr lang="en-CA" dirty="0"/>
+              <a:t>– After initialisation, a project folder becomes a git repository</a:t>
+            </a:r>
+          </a:p>
+          <a:p>
+            <a:pPr marL="0" indent="0">
+              <a:buNone/>
+            </a:pPr>
+            <a:endParaRPr lang="en-CA" b="1" dirty="0"/>
+          </a:p>
+          <a:p>
+            <a:pPr marL="0" indent="0">
+              <a:buNone/>
+            </a:pPr>
+            <a:r>
+              <a:rPr lang="en-CA" dirty="0"/>
+              <a:t>Where in the git repository is a modification stored after it is “added”?</a:t>
+            </a:r>
+          </a:p>
+          <a:p>
+            <a:pPr marL="0" indent="0">
+              <a:buNone/>
+            </a:pPr>
+            <a:endParaRPr lang="en-CA" dirty="0"/>
+          </a:p>
+          <a:p>
+            <a:pPr marL="0" indent="0">
+              <a:buNone/>
+            </a:pPr>
+            <a:r>
+              <a:rPr lang="en-CA" dirty="0"/>
+              <a:t>Is it possible for two commits to have the same ID?</a:t>
+            </a:r>
+          </a:p>
+          <a:p>
+            <a:pPr marL="0" indent="0">
+              <a:buNone/>
+            </a:pPr>
+            <a:endParaRPr lang="en-CA" b="1" dirty="0"/>
+          </a:p>
         </p:txBody>
       </p:sp>
     </p:spTree>
@@ -9389,7 +9948,92 @@
 </p:sld>
 </file>
 
-<file path=ppt/slides/slide16.xml><?xml version="1.0" encoding="utf-8"?>
+<file path=ppt/slides/slide17.xml><?xml version="1.0" encoding="utf-8"?>
+<p:sld xmlns:a="http://schemas.openxmlformats.org/drawingml/2006/main" xmlns:r="http://schemas.openxmlformats.org/officeDocument/2006/relationships" xmlns:p="http://schemas.openxmlformats.org/presentationml/2006/main">
+  <p:cSld>
+    <p:spTree>
+      <p:nvGrpSpPr>
+        <p:cNvPr id="1" name=""/>
+        <p:cNvGrpSpPr/>
+        <p:nvPr/>
+      </p:nvGrpSpPr>
+      <p:grpSpPr>
+        <a:xfrm>
+          <a:off x="0" y="0"/>
+          <a:ext cx="0" cy="0"/>
+          <a:chOff x="0" y="0"/>
+          <a:chExt cx="0" cy="0"/>
+        </a:xfrm>
+      </p:grpSpPr>
+      <p:sp>
+        <p:nvSpPr>
+          <p:cNvPr id="2" name="Text Placeholder 1">
+            <a:extLst>
+              <a:ext uri="{FF2B5EF4-FFF2-40B4-BE49-F238E27FC236}">
+                <a16:creationId xmlns:a16="http://schemas.microsoft.com/office/drawing/2014/main" id="{F30F071A-0450-8F6E-F28D-8124D7A90523}"/>
+              </a:ext>
+            </a:extLst>
+          </p:cNvPr>
+          <p:cNvSpPr>
+            <a:spLocks noGrp="1"/>
+          </p:cNvSpPr>
+          <p:nvPr>
+            <p:ph type="body" sz="quarter" idx="10"/>
+          </p:nvPr>
+        </p:nvSpPr>
+        <p:spPr/>
+        <p:txBody>
+          <a:bodyPr/>
+          <a:lstStyle/>
+          <a:p>
+            <a:pPr marL="0" indent="0">
+              <a:buNone/>
+            </a:pPr>
+            <a:endParaRPr lang="en-CA" b="1" dirty="0"/>
+          </a:p>
+          <a:p>
+            <a:pPr marL="0" indent="0">
+              <a:buNone/>
+            </a:pPr>
+            <a:endParaRPr lang="en-CA" b="1" dirty="0"/>
+          </a:p>
+          <a:p>
+            <a:pPr marL="0" indent="0">
+              <a:buNone/>
+            </a:pPr>
+            <a:endParaRPr lang="en-CA" b="1" dirty="0"/>
+          </a:p>
+          <a:p>
+            <a:pPr marL="0" indent="0">
+              <a:buNone/>
+            </a:pPr>
+            <a:endParaRPr lang="en-CA" b="1" dirty="0"/>
+          </a:p>
+          <a:p>
+            <a:pPr marL="0" indent="0">
+              <a:buNone/>
+            </a:pPr>
+            <a:r>
+              <a:rPr lang="en-CA" b="1" dirty="0"/>
+              <a:t>Activity #2 – Revert a text file to a previous commit</a:t>
+            </a:r>
+          </a:p>
+        </p:txBody>
+      </p:sp>
+    </p:spTree>
+    <p:extLst>
+      <p:ext uri="{BB962C8B-B14F-4D97-AF65-F5344CB8AC3E}">
+        <p14:creationId xmlns:p14="http://schemas.microsoft.com/office/powerpoint/2010/main" val="1723855522"/>
+      </p:ext>
+    </p:extLst>
+  </p:cSld>
+  <p:clrMapOvr>
+    <a:masterClrMapping/>
+  </p:clrMapOvr>
+</p:sld>
+</file>
+
+<file path=ppt/slides/slide18.xml><?xml version="1.0" encoding="utf-8"?>
 <p:sld xmlns:a="http://schemas.openxmlformats.org/drawingml/2006/main" xmlns:r="http://schemas.openxmlformats.org/officeDocument/2006/relationships" xmlns:p="http://schemas.openxmlformats.org/presentationml/2006/main">
   <p:cSld>
     <p:spTree>
@@ -9447,7 +10091,7 @@
 </p:sld>
 </file>
 
-<file path=ppt/slides/slide17.xml><?xml version="1.0" encoding="utf-8"?>
+<file path=ppt/slides/slide19.xml><?xml version="1.0" encoding="utf-8"?>
 <p:sld xmlns:a="http://schemas.openxmlformats.org/drawingml/2006/main" xmlns:r="http://schemas.openxmlformats.org/officeDocument/2006/relationships" xmlns:p="http://schemas.openxmlformats.org/presentationml/2006/main">
   <p:cSld>
     <p:spTree>
@@ -9485,30 +10129,9 @@
           <a:bodyPr/>
           <a:lstStyle/>
           <a:p>
-            <a:r>
-              <a:rPr lang="en-CA" dirty="0"/>
-              <a:t>Add a file and track it</a:t>
-            </a:r>
-          </a:p>
-          <a:p>
-            <a:r>
-              <a:rPr lang="en-CA" dirty="0"/>
-              <a:t>Edit the file</a:t>
-            </a:r>
-          </a:p>
-          <a:p>
-            <a:r>
-              <a:rPr lang="en-CA" dirty="0"/>
-              <a:t>New edit with a mistake</a:t>
-            </a:r>
-          </a:p>
-          <a:p>
-            <a:r>
-              <a:rPr lang="en-CA" dirty="0"/>
-              <a:t>Rebase the edit</a:t>
-            </a:r>
-          </a:p>
-          <a:p>
+            <a:pPr marL="0" indent="0">
+              <a:buNone/>
+            </a:pPr>
             <a:endParaRPr lang="en-CA" dirty="0"/>
           </a:p>
           <a:p>
@@ -9516,6 +10139,21 @@
               <a:rPr lang="en-CA" dirty="0"/>
               <a:t>Branching</a:t>
             </a:r>
+          </a:p>
+          <a:p>
+            <a:endParaRPr lang="en-CA" dirty="0"/>
+          </a:p>
+          <a:p>
+            <a:r>
+              <a:rPr lang="en-CA" dirty="0"/>
+              <a:t>Merging</a:t>
+            </a:r>
+          </a:p>
+          <a:p>
+            <a:pPr marL="0" indent="0">
+              <a:buNone/>
+            </a:pPr>
+            <a:endParaRPr lang="en-CA" dirty="0"/>
           </a:p>
         </p:txBody>
       </p:sp>
@@ -9523,128 +10161,6 @@
     <p:extLst>
       <p:ext uri="{BB962C8B-B14F-4D97-AF65-F5344CB8AC3E}">
         <p14:creationId xmlns:p14="http://schemas.microsoft.com/office/powerpoint/2010/main" val="130669974"/>
-      </p:ext>
-    </p:extLst>
-  </p:cSld>
-  <p:clrMapOvr>
-    <a:masterClrMapping/>
-  </p:clrMapOvr>
-</p:sld>
-</file>
-
-<file path=ppt/slides/slide18.xml><?xml version="1.0" encoding="utf-8"?>
-<p:sld xmlns:a="http://schemas.openxmlformats.org/drawingml/2006/main" xmlns:r="http://schemas.openxmlformats.org/officeDocument/2006/relationships" xmlns:p="http://schemas.openxmlformats.org/presentationml/2006/main">
-  <p:cSld>
-    <p:spTree>
-      <p:nvGrpSpPr>
-        <p:cNvPr id="1" name=""/>
-        <p:cNvGrpSpPr/>
-        <p:nvPr/>
-      </p:nvGrpSpPr>
-      <p:grpSpPr>
-        <a:xfrm>
-          <a:off x="0" y="0"/>
-          <a:ext cx="0" cy="0"/>
-          <a:chOff x="0" y="0"/>
-          <a:chExt cx="0" cy="0"/>
-        </a:xfrm>
-      </p:grpSpPr>
-      <p:sp>
-        <p:nvSpPr>
-          <p:cNvPr id="2" name="Text Placeholder 1">
-            <a:extLst>
-              <a:ext uri="{FF2B5EF4-FFF2-40B4-BE49-F238E27FC236}">
-                <a16:creationId xmlns:a16="http://schemas.microsoft.com/office/drawing/2014/main" id="{F30F071A-0450-8F6E-F28D-8124D7A90523}"/>
-              </a:ext>
-            </a:extLst>
-          </p:cNvPr>
-          <p:cNvSpPr>
-            <a:spLocks noGrp="1"/>
-          </p:cNvSpPr>
-          <p:nvPr>
-            <p:ph type="body" sz="quarter" idx="10"/>
-          </p:nvPr>
-        </p:nvSpPr>
-        <p:spPr/>
-        <p:txBody>
-          <a:bodyPr/>
-          <a:lstStyle/>
-          <a:p>
-            <a:pPr marL="0" indent="0">
-              <a:buNone/>
-            </a:pPr>
-            <a:r>
-              <a:rPr lang="en-CA" b="1" dirty="0"/>
-              <a:t>Activity #2 – Create a new branch</a:t>
-            </a:r>
-          </a:p>
-        </p:txBody>
-      </p:sp>
-    </p:spTree>
-    <p:extLst>
-      <p:ext uri="{BB962C8B-B14F-4D97-AF65-F5344CB8AC3E}">
-        <p14:creationId xmlns:p14="http://schemas.microsoft.com/office/powerpoint/2010/main" val="4165173319"/>
-      </p:ext>
-    </p:extLst>
-  </p:cSld>
-  <p:clrMapOvr>
-    <a:masterClrMapping/>
-  </p:clrMapOvr>
-</p:sld>
-</file>
-
-<file path=ppt/slides/slide19.xml><?xml version="1.0" encoding="utf-8"?>
-<p:sld xmlns:a="http://schemas.openxmlformats.org/drawingml/2006/main" xmlns:r="http://schemas.openxmlformats.org/officeDocument/2006/relationships" xmlns:p="http://schemas.openxmlformats.org/presentationml/2006/main">
-  <p:cSld>
-    <p:spTree>
-      <p:nvGrpSpPr>
-        <p:cNvPr id="1" name=""/>
-        <p:cNvGrpSpPr/>
-        <p:nvPr/>
-      </p:nvGrpSpPr>
-      <p:grpSpPr>
-        <a:xfrm>
-          <a:off x="0" y="0"/>
-          <a:ext cx="0" cy="0"/>
-          <a:chOff x="0" y="0"/>
-          <a:chExt cx="0" cy="0"/>
-        </a:xfrm>
-      </p:grpSpPr>
-      <p:sp>
-        <p:nvSpPr>
-          <p:cNvPr id="2" name="Text Placeholder 1">
-            <a:extLst>
-              <a:ext uri="{FF2B5EF4-FFF2-40B4-BE49-F238E27FC236}">
-                <a16:creationId xmlns:a16="http://schemas.microsoft.com/office/drawing/2014/main" id="{9C487D5F-FC03-68BB-A41E-18A16F477269}"/>
-              </a:ext>
-            </a:extLst>
-          </p:cNvPr>
-          <p:cNvSpPr>
-            <a:spLocks noGrp="1"/>
-          </p:cNvSpPr>
-          <p:nvPr>
-            <p:ph type="body" sz="quarter" idx="10"/>
-          </p:nvPr>
-        </p:nvSpPr>
-        <p:spPr/>
-        <p:txBody>
-          <a:bodyPr/>
-          <a:lstStyle/>
-          <a:p>
-            <a:pPr marL="0" indent="0">
-              <a:buNone/>
-            </a:pPr>
-            <a:r>
-              <a:rPr lang="en-CA" b="1" dirty="0"/>
-              <a:t>Poll #2</a:t>
-            </a:r>
-          </a:p>
-        </p:txBody>
-      </p:sp>
-    </p:spTree>
-    <p:extLst>
-      <p:ext uri="{BB962C8B-B14F-4D97-AF65-F5344CB8AC3E}">
-        <p14:creationId xmlns:p14="http://schemas.microsoft.com/office/powerpoint/2010/main" val="2935903534"/>
       </p:ext>
     </p:extLst>
   </p:cSld>
@@ -9725,9 +10241,33 @@
             <a:pPr marL="0" indent="0">
               <a:buNone/>
             </a:pPr>
+            <a:endParaRPr lang="en-CA" b="1" dirty="0"/>
+          </a:p>
+          <a:p>
+            <a:pPr marL="0" indent="0">
+              <a:buNone/>
+            </a:pPr>
+            <a:endParaRPr lang="en-CA" b="1" dirty="0"/>
+          </a:p>
+          <a:p>
+            <a:pPr marL="0" indent="0">
+              <a:buNone/>
+            </a:pPr>
+            <a:endParaRPr lang="en-CA" b="1" dirty="0"/>
+          </a:p>
+          <a:p>
+            <a:pPr marL="0" indent="0">
+              <a:buNone/>
+            </a:pPr>
+            <a:endParaRPr lang="en-CA" b="1" dirty="0"/>
+          </a:p>
+          <a:p>
+            <a:pPr marL="0" indent="0">
+              <a:buNone/>
+            </a:pPr>
             <a:r>
               <a:rPr lang="en-CA" b="1" dirty="0"/>
-              <a:t>Activity #3 – Merging Branches</a:t>
+              <a:t>Activity #3 – Create a new branch</a:t>
             </a:r>
           </a:p>
         </p:txBody>
@@ -9735,7 +10275,7 @@
     </p:spTree>
     <p:extLst>
       <p:ext uri="{BB962C8B-B14F-4D97-AF65-F5344CB8AC3E}">
-        <p14:creationId xmlns:p14="http://schemas.microsoft.com/office/powerpoint/2010/main" val="1749104538"/>
+        <p14:creationId xmlns:p14="http://schemas.microsoft.com/office/powerpoint/2010/main" val="4165173319"/>
       </p:ext>
     </p:extLst>
   </p:cSld>
@@ -9796,6 +10336,152 @@
     </p:spTree>
     <p:extLst>
       <p:ext uri="{BB962C8B-B14F-4D97-AF65-F5344CB8AC3E}">
+        <p14:creationId xmlns:p14="http://schemas.microsoft.com/office/powerpoint/2010/main" val="2935903534"/>
+      </p:ext>
+    </p:extLst>
+  </p:cSld>
+  <p:clrMapOvr>
+    <a:masterClrMapping/>
+  </p:clrMapOvr>
+</p:sld>
+</file>
+
+<file path=ppt/slides/slide22.xml><?xml version="1.0" encoding="utf-8"?>
+<p:sld xmlns:a="http://schemas.openxmlformats.org/drawingml/2006/main" xmlns:r="http://schemas.openxmlformats.org/officeDocument/2006/relationships" xmlns:p="http://schemas.openxmlformats.org/presentationml/2006/main">
+  <p:cSld>
+    <p:spTree>
+      <p:nvGrpSpPr>
+        <p:cNvPr id="1" name=""/>
+        <p:cNvGrpSpPr/>
+        <p:nvPr/>
+      </p:nvGrpSpPr>
+      <p:grpSpPr>
+        <a:xfrm>
+          <a:off x="0" y="0"/>
+          <a:ext cx="0" cy="0"/>
+          <a:chOff x="0" y="0"/>
+          <a:chExt cx="0" cy="0"/>
+        </a:xfrm>
+      </p:grpSpPr>
+      <p:sp>
+        <p:nvSpPr>
+          <p:cNvPr id="2" name="Text Placeholder 1">
+            <a:extLst>
+              <a:ext uri="{FF2B5EF4-FFF2-40B4-BE49-F238E27FC236}">
+                <a16:creationId xmlns:a16="http://schemas.microsoft.com/office/drawing/2014/main" id="{F30F071A-0450-8F6E-F28D-8124D7A90523}"/>
+              </a:ext>
+            </a:extLst>
+          </p:cNvPr>
+          <p:cNvSpPr>
+            <a:spLocks noGrp="1"/>
+          </p:cNvSpPr>
+          <p:nvPr>
+            <p:ph type="body" sz="quarter" idx="10"/>
+          </p:nvPr>
+        </p:nvSpPr>
+        <p:spPr/>
+        <p:txBody>
+          <a:bodyPr/>
+          <a:lstStyle/>
+          <a:p>
+            <a:pPr marL="0" indent="0">
+              <a:buNone/>
+            </a:pPr>
+            <a:endParaRPr lang="en-CA" b="1" dirty="0"/>
+          </a:p>
+          <a:p>
+            <a:pPr marL="0" indent="0">
+              <a:buNone/>
+            </a:pPr>
+            <a:endParaRPr lang="en-CA" b="1" dirty="0"/>
+          </a:p>
+          <a:p>
+            <a:pPr marL="0" indent="0">
+              <a:buNone/>
+            </a:pPr>
+            <a:endParaRPr lang="en-CA" b="1" dirty="0"/>
+          </a:p>
+          <a:p>
+            <a:pPr marL="0" indent="0">
+              <a:buNone/>
+            </a:pPr>
+            <a:endParaRPr lang="en-CA" b="1" dirty="0"/>
+          </a:p>
+          <a:p>
+            <a:pPr marL="0" indent="0">
+              <a:buNone/>
+            </a:pPr>
+            <a:r>
+              <a:rPr lang="en-CA" b="1" dirty="0"/>
+              <a:t>Activity #4 – Merging Branches</a:t>
+            </a:r>
+          </a:p>
+        </p:txBody>
+      </p:sp>
+    </p:spTree>
+    <p:extLst>
+      <p:ext uri="{BB962C8B-B14F-4D97-AF65-F5344CB8AC3E}">
+        <p14:creationId xmlns:p14="http://schemas.microsoft.com/office/powerpoint/2010/main" val="1749104538"/>
+      </p:ext>
+    </p:extLst>
+  </p:cSld>
+  <p:clrMapOvr>
+    <a:masterClrMapping/>
+  </p:clrMapOvr>
+</p:sld>
+</file>
+
+<file path=ppt/slides/slide23.xml><?xml version="1.0" encoding="utf-8"?>
+<p:sld xmlns:a="http://schemas.openxmlformats.org/drawingml/2006/main" xmlns:r="http://schemas.openxmlformats.org/officeDocument/2006/relationships" xmlns:p="http://schemas.openxmlformats.org/presentationml/2006/main">
+  <p:cSld>
+    <p:spTree>
+      <p:nvGrpSpPr>
+        <p:cNvPr id="1" name=""/>
+        <p:cNvGrpSpPr/>
+        <p:nvPr/>
+      </p:nvGrpSpPr>
+      <p:grpSpPr>
+        <a:xfrm>
+          <a:off x="0" y="0"/>
+          <a:ext cx="0" cy="0"/>
+          <a:chOff x="0" y="0"/>
+          <a:chExt cx="0" cy="0"/>
+        </a:xfrm>
+      </p:grpSpPr>
+      <p:sp>
+        <p:nvSpPr>
+          <p:cNvPr id="2" name="Text Placeholder 1">
+            <a:extLst>
+              <a:ext uri="{FF2B5EF4-FFF2-40B4-BE49-F238E27FC236}">
+                <a16:creationId xmlns:a16="http://schemas.microsoft.com/office/drawing/2014/main" id="{9C487D5F-FC03-68BB-A41E-18A16F477269}"/>
+              </a:ext>
+            </a:extLst>
+          </p:cNvPr>
+          <p:cNvSpPr>
+            <a:spLocks noGrp="1"/>
+          </p:cNvSpPr>
+          <p:nvPr>
+            <p:ph type="body" sz="quarter" idx="10"/>
+          </p:nvPr>
+        </p:nvSpPr>
+        <p:spPr/>
+        <p:txBody>
+          <a:bodyPr/>
+          <a:lstStyle/>
+          <a:p>
+            <a:pPr marL="0" indent="0">
+              <a:buNone/>
+            </a:pPr>
+            <a:r>
+              <a:rPr lang="en-CA" b="1" dirty="0"/>
+              <a:t>Poll #2</a:t>
+            </a:r>
+          </a:p>
+        </p:txBody>
+      </p:sp>
+    </p:spTree>
+    <p:extLst>
+      <p:ext uri="{BB962C8B-B14F-4D97-AF65-F5344CB8AC3E}">
         <p14:creationId xmlns:p14="http://schemas.microsoft.com/office/powerpoint/2010/main" val="2209846115"/>
       </p:ext>
     </p:extLst>
@@ -9806,7 +10492,92 @@
 </p:sld>
 </file>
 
-<file path=ppt/slides/slide22.xml><?xml version="1.0" encoding="utf-8"?>
+<file path=ppt/slides/slide24.xml><?xml version="1.0" encoding="utf-8"?>
+<p:sld xmlns:a="http://schemas.openxmlformats.org/drawingml/2006/main" xmlns:r="http://schemas.openxmlformats.org/officeDocument/2006/relationships" xmlns:p="http://schemas.openxmlformats.org/presentationml/2006/main">
+  <p:cSld>
+    <p:spTree>
+      <p:nvGrpSpPr>
+        <p:cNvPr id="1" name=""/>
+        <p:cNvGrpSpPr/>
+        <p:nvPr/>
+      </p:nvGrpSpPr>
+      <p:grpSpPr>
+        <a:xfrm>
+          <a:off x="0" y="0"/>
+          <a:ext cx="0" cy="0"/>
+          <a:chOff x="0" y="0"/>
+          <a:chExt cx="0" cy="0"/>
+        </a:xfrm>
+      </p:grpSpPr>
+      <p:sp>
+        <p:nvSpPr>
+          <p:cNvPr id="2" name="Text Placeholder 1">
+            <a:extLst>
+              <a:ext uri="{FF2B5EF4-FFF2-40B4-BE49-F238E27FC236}">
+                <a16:creationId xmlns:a16="http://schemas.microsoft.com/office/drawing/2014/main" id="{F30F071A-0450-8F6E-F28D-8124D7A90523}"/>
+              </a:ext>
+            </a:extLst>
+          </p:cNvPr>
+          <p:cNvSpPr>
+            <a:spLocks noGrp="1"/>
+          </p:cNvSpPr>
+          <p:nvPr>
+            <p:ph type="body" sz="quarter" idx="10"/>
+          </p:nvPr>
+        </p:nvSpPr>
+        <p:spPr/>
+        <p:txBody>
+          <a:bodyPr/>
+          <a:lstStyle/>
+          <a:p>
+            <a:pPr marL="0" indent="0">
+              <a:buNone/>
+            </a:pPr>
+            <a:endParaRPr lang="en-CA" b="1" dirty="0"/>
+          </a:p>
+          <a:p>
+            <a:pPr marL="0" indent="0">
+              <a:buNone/>
+            </a:pPr>
+            <a:endParaRPr lang="en-CA" b="1" dirty="0"/>
+          </a:p>
+          <a:p>
+            <a:pPr marL="0" indent="0">
+              <a:buNone/>
+            </a:pPr>
+            <a:endParaRPr lang="en-CA" b="1" dirty="0"/>
+          </a:p>
+          <a:p>
+            <a:pPr marL="0" indent="0">
+              <a:buNone/>
+            </a:pPr>
+            <a:endParaRPr lang="en-CA" b="1" dirty="0"/>
+          </a:p>
+          <a:p>
+            <a:pPr marL="0" indent="0">
+              <a:buNone/>
+            </a:pPr>
+            <a:r>
+              <a:rPr lang="en-CA" b="1" dirty="0"/>
+              <a:t>Activity #5 – Merging Branches with different histories</a:t>
+            </a:r>
+          </a:p>
+        </p:txBody>
+      </p:sp>
+    </p:spTree>
+    <p:extLst>
+      <p:ext uri="{BB962C8B-B14F-4D97-AF65-F5344CB8AC3E}">
+        <p14:creationId xmlns:p14="http://schemas.microsoft.com/office/powerpoint/2010/main" val="1081245530"/>
+      </p:ext>
+    </p:extLst>
+  </p:cSld>
+  <p:clrMapOvr>
+    <a:masterClrMapping/>
+  </p:clrMapOvr>
+</p:sld>
+</file>
+
+<file path=ppt/slides/slide25.xml><?xml version="1.0" encoding="utf-8"?>
 <p:sld xmlns:a="http://schemas.openxmlformats.org/drawingml/2006/main" xmlns:r="http://schemas.openxmlformats.org/officeDocument/2006/relationships" xmlns:p="http://schemas.openxmlformats.org/presentationml/2006/main">
   <p:cSld>
     <p:spTree>
@@ -9864,7 +10635,7 @@
 </p:sld>
 </file>
 
-<file path=ppt/slides/slide23.xml><?xml version="1.0" encoding="utf-8"?>
+<file path=ppt/slides/slide26.xml><?xml version="1.0" encoding="utf-8"?>
 <p:sld xmlns:a="http://schemas.openxmlformats.org/drawingml/2006/main" xmlns:r="http://schemas.openxmlformats.org/officeDocument/2006/relationships" xmlns:p="http://schemas.openxmlformats.org/presentationml/2006/main">
   <p:cSld>
     <p:spTree>
@@ -9955,7 +10726,7 @@
 </p:sld>
 </file>
 
-<file path=ppt/slides/slide24.xml><?xml version="1.0" encoding="utf-8"?>
+<file path=ppt/slides/slide27.xml><?xml version="1.0" encoding="utf-8"?>
 <p:sld xmlns:a="http://schemas.openxmlformats.org/drawingml/2006/main" xmlns:r="http://schemas.openxmlformats.org/officeDocument/2006/relationships" xmlns:p="http://schemas.openxmlformats.org/presentationml/2006/main">
   <p:cSld>
     <p:spTree>
@@ -10040,7 +10811,7 @@
 </p:sld>
 </file>
 
-<file path=ppt/slides/slide25.xml><?xml version="1.0" encoding="utf-8"?>
+<file path=ppt/slides/slide28.xml><?xml version="1.0" encoding="utf-8"?>
 <p:sld xmlns:a="http://schemas.openxmlformats.org/drawingml/2006/main" xmlns:r="http://schemas.openxmlformats.org/officeDocument/2006/relationships" xmlns:p="http://schemas.openxmlformats.org/presentationml/2006/main">
   <p:cSld>
     <p:spTree>
@@ -10110,65 +10881,7 @@
 </p:sld>
 </file>
 
-<file path=ppt/slides/slide26.xml><?xml version="1.0" encoding="utf-8"?>
-<p:sld xmlns:a="http://schemas.openxmlformats.org/drawingml/2006/main" xmlns:r="http://schemas.openxmlformats.org/officeDocument/2006/relationships" xmlns:p="http://schemas.openxmlformats.org/presentationml/2006/main">
-  <p:cSld>
-    <p:spTree>
-      <p:nvGrpSpPr>
-        <p:cNvPr id="1" name=""/>
-        <p:cNvGrpSpPr/>
-        <p:nvPr/>
-      </p:nvGrpSpPr>
-      <p:grpSpPr>
-        <a:xfrm>
-          <a:off x="0" y="0"/>
-          <a:ext cx="0" cy="0"/>
-          <a:chOff x="0" y="0"/>
-          <a:chExt cx="0" cy="0"/>
-        </a:xfrm>
-      </p:grpSpPr>
-      <p:sp>
-        <p:nvSpPr>
-          <p:cNvPr id="2" name="Title 1">
-            <a:extLst>
-              <a:ext uri="{FF2B5EF4-FFF2-40B4-BE49-F238E27FC236}">
-                <a16:creationId xmlns:a16="http://schemas.microsoft.com/office/drawing/2014/main" id="{D7B3B343-8AB0-44FB-3E33-580BF410923F}"/>
-              </a:ext>
-            </a:extLst>
-          </p:cNvPr>
-          <p:cNvSpPr>
-            <a:spLocks noGrp="1"/>
-          </p:cNvSpPr>
-          <p:nvPr>
-            <p:ph type="title"/>
-          </p:nvPr>
-        </p:nvSpPr>
-        <p:spPr/>
-        <p:txBody>
-          <a:bodyPr/>
-          <a:lstStyle/>
-          <a:p>
-            <a:r>
-              <a:rPr lang="en-CA" dirty="0"/>
-              <a:t>Part V  –  Conclusion</a:t>
-            </a:r>
-          </a:p>
-        </p:txBody>
-      </p:sp>
-    </p:spTree>
-    <p:extLst>
-      <p:ext uri="{BB962C8B-B14F-4D97-AF65-F5344CB8AC3E}">
-        <p14:creationId xmlns:p14="http://schemas.microsoft.com/office/powerpoint/2010/main" val="980553902"/>
-      </p:ext>
-    </p:extLst>
-  </p:cSld>
-  <p:clrMapOvr>
-    <a:masterClrMapping/>
-  </p:clrMapOvr>
-</p:sld>
-</file>
-
-<file path=ppt/slides/slide27.xml><?xml version="1.0" encoding="utf-8"?>
+<file path=ppt/slides/slide29.xml><?xml version="1.0" encoding="utf-8"?>
 <p:sld xmlns:a="http://schemas.openxmlformats.org/drawingml/2006/main" xmlns:r="http://schemas.openxmlformats.org/officeDocument/2006/relationships" xmlns:p="http://schemas.openxmlformats.org/presentationml/2006/main">
   <p:cSld>
     <p:spTree>
@@ -10190,7 +10903,7 @@
           <p:cNvPr id="2" name="Text Placeholder 1">
             <a:extLst>
               <a:ext uri="{FF2B5EF4-FFF2-40B4-BE49-F238E27FC236}">
-                <a16:creationId xmlns:a16="http://schemas.microsoft.com/office/drawing/2014/main" id="{00D8EFDB-45D2-9A4A-6FA9-789D807BF0F3}"/>
+                <a16:creationId xmlns:a16="http://schemas.microsoft.com/office/drawing/2014/main" id="{F30F071A-0450-8F6E-F28D-8124D7A90523}"/>
               </a:ext>
             </a:extLst>
           </p:cNvPr>
@@ -10209,43 +10922,33 @@
             <a:pPr marL="0" indent="0">
               <a:buNone/>
             </a:pPr>
+            <a:endParaRPr lang="en-CA" b="1" dirty="0"/>
+          </a:p>
+          <a:p>
+            <a:pPr marL="0" indent="0">
+              <a:buNone/>
+            </a:pPr>
+            <a:endParaRPr lang="en-CA" b="1" dirty="0"/>
+          </a:p>
+          <a:p>
+            <a:pPr marL="0" indent="0">
+              <a:buNone/>
+            </a:pPr>
+            <a:endParaRPr lang="en-CA" b="1" dirty="0"/>
+          </a:p>
+          <a:p>
+            <a:pPr marL="0" indent="0">
+              <a:buNone/>
+            </a:pPr>
+            <a:endParaRPr lang="en-CA" b="1" dirty="0"/>
+          </a:p>
+          <a:p>
+            <a:pPr marL="0" indent="0">
+              <a:buNone/>
+            </a:pPr>
             <a:r>
               <a:rPr lang="en-CA" b="1" dirty="0"/>
-              <a:t>What have we learned?</a:t>
-            </a:r>
-            <a:endParaRPr lang="en-CA" dirty="0"/>
-          </a:p>
-          <a:p>
-            <a:r>
-              <a:rPr lang="en-CA" dirty="0"/>
-              <a:t>What VCS, Git and GitHub are</a:t>
-            </a:r>
-          </a:p>
-          <a:p>
-            <a:endParaRPr lang="en-CA" dirty="0"/>
-          </a:p>
-          <a:p>
-            <a:r>
-              <a:rPr lang="en-CA" dirty="0"/>
-              <a:t>Why VCS are so useful</a:t>
-            </a:r>
-          </a:p>
-          <a:p>
-            <a:endParaRPr lang="en-CA" dirty="0"/>
-          </a:p>
-          <a:p>
-            <a:r>
-              <a:rPr lang="en-CA" dirty="0"/>
-              <a:t>How to undertake basic tasks in a local and remote repository</a:t>
-            </a:r>
-          </a:p>
-          <a:p>
-            <a:endParaRPr lang="en-CA" dirty="0"/>
-          </a:p>
-          <a:p>
-            <a:r>
-              <a:rPr lang="en-CA" dirty="0"/>
-              <a:t>How services like GitHub improve code collaboration and Open Science</a:t>
+              <a:t>Activity #6 – Pushing commits to GitHub</a:t>
             </a:r>
           </a:p>
         </p:txBody>
@@ -10253,68 +10956,7 @@
     </p:spTree>
     <p:extLst>
       <p:ext uri="{BB962C8B-B14F-4D97-AF65-F5344CB8AC3E}">
-        <p14:creationId xmlns:p14="http://schemas.microsoft.com/office/powerpoint/2010/main" val="1527684309"/>
-      </p:ext>
-    </p:extLst>
-  </p:cSld>
-  <p:clrMapOvr>
-    <a:masterClrMapping/>
-  </p:clrMapOvr>
-</p:sld>
-</file>
-
-<file path=ppt/slides/slide28.xml><?xml version="1.0" encoding="utf-8"?>
-<p:sld xmlns:a="http://schemas.openxmlformats.org/drawingml/2006/main" xmlns:r="http://schemas.openxmlformats.org/officeDocument/2006/relationships" xmlns:p="http://schemas.openxmlformats.org/presentationml/2006/main">
-  <p:cSld>
-    <p:spTree>
-      <p:nvGrpSpPr>
-        <p:cNvPr id="1" name=""/>
-        <p:cNvGrpSpPr/>
-        <p:nvPr/>
-      </p:nvGrpSpPr>
-      <p:grpSpPr>
-        <a:xfrm>
-          <a:off x="0" y="0"/>
-          <a:ext cx="0" cy="0"/>
-          <a:chOff x="0" y="0"/>
-          <a:chExt cx="0" cy="0"/>
-        </a:xfrm>
-      </p:grpSpPr>
-      <p:sp>
-        <p:nvSpPr>
-          <p:cNvPr id="2" name="Text Placeholder 1">
-            <a:extLst>
-              <a:ext uri="{FF2B5EF4-FFF2-40B4-BE49-F238E27FC236}">
-                <a16:creationId xmlns:a16="http://schemas.microsoft.com/office/drawing/2014/main" id="{146A319F-99F6-E37E-4837-F8D349D874AC}"/>
-              </a:ext>
-            </a:extLst>
-          </p:cNvPr>
-          <p:cNvSpPr>
-            <a:spLocks noGrp="1"/>
-          </p:cNvSpPr>
-          <p:nvPr>
-            <p:ph type="body" sz="quarter" idx="10"/>
-          </p:nvPr>
-        </p:nvSpPr>
-        <p:spPr/>
-        <p:txBody>
-          <a:bodyPr/>
-          <a:lstStyle/>
-          <a:p>
-            <a:pPr marL="0" indent="0">
-              <a:buNone/>
-            </a:pPr>
-            <a:r>
-              <a:rPr lang="en-CA" b="1" dirty="0"/>
-              <a:t>What next?</a:t>
-            </a:r>
-          </a:p>
-        </p:txBody>
-      </p:sp>
-    </p:spTree>
-    <p:extLst>
-      <p:ext uri="{BB962C8B-B14F-4D97-AF65-F5344CB8AC3E}">
-        <p14:creationId xmlns:p14="http://schemas.microsoft.com/office/powerpoint/2010/main" val="890084902"/>
+        <p14:creationId xmlns:p14="http://schemas.microsoft.com/office/powerpoint/2010/main" val="2611691246"/>
       </p:ext>
     </p:extLst>
   </p:cSld>
@@ -10438,6 +11080,621 @@
     <p:extLst>
       <p:ext uri="{BB962C8B-B14F-4D97-AF65-F5344CB8AC3E}">
         <p14:creationId xmlns:p14="http://schemas.microsoft.com/office/powerpoint/2010/main" val="1592450976"/>
+      </p:ext>
+    </p:extLst>
+  </p:cSld>
+  <p:clrMapOvr>
+    <a:masterClrMapping/>
+  </p:clrMapOvr>
+</p:sld>
+</file>
+
+<file path=ppt/slides/slide30.xml><?xml version="1.0" encoding="utf-8"?>
+<p:sld xmlns:a="http://schemas.openxmlformats.org/drawingml/2006/main" xmlns:r="http://schemas.openxmlformats.org/officeDocument/2006/relationships" xmlns:p="http://schemas.openxmlformats.org/presentationml/2006/main">
+  <p:cSld>
+    <p:spTree>
+      <p:nvGrpSpPr>
+        <p:cNvPr id="1" name=""/>
+        <p:cNvGrpSpPr/>
+        <p:nvPr/>
+      </p:nvGrpSpPr>
+      <p:grpSpPr>
+        <a:xfrm>
+          <a:off x="0" y="0"/>
+          <a:ext cx="0" cy="0"/>
+          <a:chOff x="0" y="0"/>
+          <a:chExt cx="0" cy="0"/>
+        </a:xfrm>
+      </p:grpSpPr>
+      <p:sp>
+        <p:nvSpPr>
+          <p:cNvPr id="2" name="Text Placeholder 1">
+            <a:extLst>
+              <a:ext uri="{FF2B5EF4-FFF2-40B4-BE49-F238E27FC236}">
+                <a16:creationId xmlns:a16="http://schemas.microsoft.com/office/drawing/2014/main" id="{F30F071A-0450-8F6E-F28D-8124D7A90523}"/>
+              </a:ext>
+            </a:extLst>
+          </p:cNvPr>
+          <p:cNvSpPr>
+            <a:spLocks noGrp="1"/>
+          </p:cNvSpPr>
+          <p:nvPr>
+            <p:ph type="body" sz="quarter" idx="10"/>
+          </p:nvPr>
+        </p:nvSpPr>
+        <p:spPr/>
+        <p:txBody>
+          <a:bodyPr/>
+          <a:lstStyle/>
+          <a:p>
+            <a:pPr marL="0" indent="0">
+              <a:buNone/>
+            </a:pPr>
+            <a:endParaRPr lang="en-CA" b="1" dirty="0"/>
+          </a:p>
+          <a:p>
+            <a:pPr marL="0" indent="0">
+              <a:buNone/>
+            </a:pPr>
+            <a:endParaRPr lang="en-CA" b="1" dirty="0"/>
+          </a:p>
+          <a:p>
+            <a:pPr marL="0" indent="0">
+              <a:buNone/>
+            </a:pPr>
+            <a:endParaRPr lang="en-CA" b="1" dirty="0"/>
+          </a:p>
+          <a:p>
+            <a:pPr marL="0" indent="0">
+              <a:buNone/>
+            </a:pPr>
+            <a:endParaRPr lang="en-CA" b="1" dirty="0"/>
+          </a:p>
+          <a:p>
+            <a:pPr marL="0" indent="0">
+              <a:buNone/>
+            </a:pPr>
+            <a:r>
+              <a:rPr lang="en-CA" b="1" dirty="0"/>
+              <a:t>Activity #7 – Pulling Commits from GitHub</a:t>
+            </a:r>
+          </a:p>
+        </p:txBody>
+      </p:sp>
+    </p:spTree>
+    <p:extLst>
+      <p:ext uri="{BB962C8B-B14F-4D97-AF65-F5344CB8AC3E}">
+        <p14:creationId xmlns:p14="http://schemas.microsoft.com/office/powerpoint/2010/main" val="3458676307"/>
+      </p:ext>
+    </p:extLst>
+  </p:cSld>
+  <p:clrMapOvr>
+    <a:masterClrMapping/>
+  </p:clrMapOvr>
+</p:sld>
+</file>
+
+<file path=ppt/slides/slide31.xml><?xml version="1.0" encoding="utf-8"?>
+<p:sld xmlns:a="http://schemas.openxmlformats.org/drawingml/2006/main" xmlns:r="http://schemas.openxmlformats.org/officeDocument/2006/relationships" xmlns:p="http://schemas.openxmlformats.org/presentationml/2006/main">
+  <p:cSld>
+    <p:spTree>
+      <p:nvGrpSpPr>
+        <p:cNvPr id="1" name=""/>
+        <p:cNvGrpSpPr/>
+        <p:nvPr/>
+      </p:nvGrpSpPr>
+      <p:grpSpPr>
+        <a:xfrm>
+          <a:off x="0" y="0"/>
+          <a:ext cx="0" cy="0"/>
+          <a:chOff x="0" y="0"/>
+          <a:chExt cx="0" cy="0"/>
+        </a:xfrm>
+      </p:grpSpPr>
+      <p:sp>
+        <p:nvSpPr>
+          <p:cNvPr id="2" name="Text Placeholder 1">
+            <a:extLst>
+              <a:ext uri="{FF2B5EF4-FFF2-40B4-BE49-F238E27FC236}">
+                <a16:creationId xmlns:a16="http://schemas.microsoft.com/office/drawing/2014/main" id="{F30F071A-0450-8F6E-F28D-8124D7A90523}"/>
+              </a:ext>
+            </a:extLst>
+          </p:cNvPr>
+          <p:cNvSpPr>
+            <a:spLocks noGrp="1"/>
+          </p:cNvSpPr>
+          <p:nvPr>
+            <p:ph type="body" sz="quarter" idx="10"/>
+          </p:nvPr>
+        </p:nvSpPr>
+        <p:spPr/>
+        <p:txBody>
+          <a:bodyPr/>
+          <a:lstStyle/>
+          <a:p>
+            <a:pPr marL="0" indent="0">
+              <a:buNone/>
+            </a:pPr>
+            <a:endParaRPr lang="en-CA" b="1" dirty="0"/>
+          </a:p>
+          <a:p>
+            <a:pPr marL="0" indent="0">
+              <a:buNone/>
+            </a:pPr>
+            <a:endParaRPr lang="en-CA" b="1" dirty="0"/>
+          </a:p>
+          <a:p>
+            <a:pPr marL="0" indent="0">
+              <a:buNone/>
+            </a:pPr>
+            <a:endParaRPr lang="en-CA" b="1" dirty="0"/>
+          </a:p>
+          <a:p>
+            <a:pPr marL="0" indent="0">
+              <a:buNone/>
+            </a:pPr>
+            <a:endParaRPr lang="en-CA" b="1" dirty="0"/>
+          </a:p>
+          <a:p>
+            <a:pPr marL="0" indent="0">
+              <a:buNone/>
+            </a:pPr>
+            <a:r>
+              <a:rPr lang="en-CA" b="1" dirty="0"/>
+              <a:t>Activity #8 – Clone a Repository</a:t>
+            </a:r>
+          </a:p>
+          <a:p>
+            <a:pPr marL="0" indent="0">
+              <a:buNone/>
+            </a:pPr>
+            <a:r>
+              <a:rPr lang="en-CA" dirty="0"/>
+              <a:t>- Find a GitHub repo that interests you and clone it!</a:t>
+            </a:r>
+          </a:p>
+        </p:txBody>
+      </p:sp>
+    </p:spTree>
+    <p:extLst>
+      <p:ext uri="{BB962C8B-B14F-4D97-AF65-F5344CB8AC3E}">
+        <p14:creationId xmlns:p14="http://schemas.microsoft.com/office/powerpoint/2010/main" val="308561724"/>
+      </p:ext>
+    </p:extLst>
+  </p:cSld>
+  <p:clrMapOvr>
+    <a:masterClrMapping/>
+  </p:clrMapOvr>
+</p:sld>
+</file>
+
+<file path=ppt/slides/slide32.xml><?xml version="1.0" encoding="utf-8"?>
+<p:sld xmlns:a="http://schemas.openxmlformats.org/drawingml/2006/main" xmlns:r="http://schemas.openxmlformats.org/officeDocument/2006/relationships" xmlns:p="http://schemas.openxmlformats.org/presentationml/2006/main">
+  <p:cSld>
+    <p:spTree>
+      <p:nvGrpSpPr>
+        <p:cNvPr id="1" name=""/>
+        <p:cNvGrpSpPr/>
+        <p:nvPr/>
+      </p:nvGrpSpPr>
+      <p:grpSpPr>
+        <a:xfrm>
+          <a:off x="0" y="0"/>
+          <a:ext cx="0" cy="0"/>
+          <a:chOff x="0" y="0"/>
+          <a:chExt cx="0" cy="0"/>
+        </a:xfrm>
+      </p:grpSpPr>
+      <p:sp>
+        <p:nvSpPr>
+          <p:cNvPr id="2" name="Text Placeholder 1">
+            <a:extLst>
+              <a:ext uri="{FF2B5EF4-FFF2-40B4-BE49-F238E27FC236}">
+                <a16:creationId xmlns:a16="http://schemas.microsoft.com/office/drawing/2014/main" id="{F30F071A-0450-8F6E-F28D-8124D7A90523}"/>
+              </a:ext>
+            </a:extLst>
+          </p:cNvPr>
+          <p:cNvSpPr>
+            <a:spLocks noGrp="1"/>
+          </p:cNvSpPr>
+          <p:nvPr>
+            <p:ph type="body" sz="quarter" idx="10"/>
+          </p:nvPr>
+        </p:nvSpPr>
+        <p:spPr/>
+        <p:txBody>
+          <a:bodyPr/>
+          <a:lstStyle/>
+          <a:p>
+            <a:pPr marL="0" indent="0">
+              <a:buNone/>
+            </a:pPr>
+            <a:endParaRPr lang="en-CA" b="1" dirty="0"/>
+          </a:p>
+          <a:p>
+            <a:pPr marL="0" indent="0">
+              <a:buNone/>
+            </a:pPr>
+            <a:endParaRPr lang="en-CA" b="1" dirty="0"/>
+          </a:p>
+          <a:p>
+            <a:pPr marL="0" indent="0">
+              <a:buNone/>
+            </a:pPr>
+            <a:endParaRPr lang="en-CA" b="1" dirty="0"/>
+          </a:p>
+          <a:p>
+            <a:pPr marL="0" indent="0">
+              <a:buNone/>
+            </a:pPr>
+            <a:endParaRPr lang="en-CA" b="1" dirty="0"/>
+          </a:p>
+          <a:p>
+            <a:pPr marL="0" indent="0">
+              <a:buNone/>
+            </a:pPr>
+            <a:r>
+              <a:rPr lang="en-CA" b="1" dirty="0"/>
+              <a:t>Activity #9 – Fork a Repo and make a Pull Request</a:t>
+            </a:r>
+          </a:p>
+          <a:p>
+            <a:pPr marL="0" indent="0">
+              <a:buNone/>
+            </a:pPr>
+            <a:r>
+              <a:rPr lang="en-CA" b="1" dirty="0"/>
+              <a:t>- </a:t>
+            </a:r>
+            <a:r>
+              <a:rPr lang="en-CA" dirty="0"/>
+              <a:t>For the repo I made for this course and add a text file to it. Then, make a pull request!</a:t>
+            </a:r>
+            <a:endParaRPr lang="en-CA" b="1" dirty="0"/>
+          </a:p>
+        </p:txBody>
+      </p:sp>
+    </p:spTree>
+    <p:extLst>
+      <p:ext uri="{BB962C8B-B14F-4D97-AF65-F5344CB8AC3E}">
+        <p14:creationId xmlns:p14="http://schemas.microsoft.com/office/powerpoint/2010/main" val="4007831989"/>
+      </p:ext>
+    </p:extLst>
+  </p:cSld>
+  <p:clrMapOvr>
+    <a:masterClrMapping/>
+  </p:clrMapOvr>
+</p:sld>
+</file>
+
+<file path=ppt/slides/slide33.xml><?xml version="1.0" encoding="utf-8"?>
+<p:sld xmlns:a="http://schemas.openxmlformats.org/drawingml/2006/main" xmlns:r="http://schemas.openxmlformats.org/officeDocument/2006/relationships" xmlns:p="http://schemas.openxmlformats.org/presentationml/2006/main">
+  <p:cSld>
+    <p:spTree>
+      <p:nvGrpSpPr>
+        <p:cNvPr id="1" name=""/>
+        <p:cNvGrpSpPr/>
+        <p:nvPr/>
+      </p:nvGrpSpPr>
+      <p:grpSpPr>
+        <a:xfrm>
+          <a:off x="0" y="0"/>
+          <a:ext cx="0" cy="0"/>
+          <a:chOff x="0" y="0"/>
+          <a:chExt cx="0" cy="0"/>
+        </a:xfrm>
+      </p:grpSpPr>
+      <p:sp>
+        <p:nvSpPr>
+          <p:cNvPr id="2" name="Title 1">
+            <a:extLst>
+              <a:ext uri="{FF2B5EF4-FFF2-40B4-BE49-F238E27FC236}">
+                <a16:creationId xmlns:a16="http://schemas.microsoft.com/office/drawing/2014/main" id="{D7B3B343-8AB0-44FB-3E33-580BF410923F}"/>
+              </a:ext>
+            </a:extLst>
+          </p:cNvPr>
+          <p:cNvSpPr>
+            <a:spLocks noGrp="1"/>
+          </p:cNvSpPr>
+          <p:nvPr>
+            <p:ph type="title"/>
+          </p:nvPr>
+        </p:nvSpPr>
+        <p:spPr/>
+        <p:txBody>
+          <a:bodyPr/>
+          <a:lstStyle/>
+          <a:p>
+            <a:r>
+              <a:rPr lang="en-CA" dirty="0"/>
+              <a:t>Part V  –  Conclusion</a:t>
+            </a:r>
+          </a:p>
+        </p:txBody>
+      </p:sp>
+    </p:spTree>
+    <p:extLst>
+      <p:ext uri="{BB962C8B-B14F-4D97-AF65-F5344CB8AC3E}">
+        <p14:creationId xmlns:p14="http://schemas.microsoft.com/office/powerpoint/2010/main" val="980553902"/>
+      </p:ext>
+    </p:extLst>
+  </p:cSld>
+  <p:clrMapOvr>
+    <a:masterClrMapping/>
+  </p:clrMapOvr>
+</p:sld>
+</file>
+
+<file path=ppt/slides/slide34.xml><?xml version="1.0" encoding="utf-8"?>
+<p:sld xmlns:a="http://schemas.openxmlformats.org/drawingml/2006/main" xmlns:r="http://schemas.openxmlformats.org/officeDocument/2006/relationships" xmlns:p="http://schemas.openxmlformats.org/presentationml/2006/main">
+  <p:cSld>
+    <p:spTree>
+      <p:nvGrpSpPr>
+        <p:cNvPr id="1" name=""/>
+        <p:cNvGrpSpPr/>
+        <p:nvPr/>
+      </p:nvGrpSpPr>
+      <p:grpSpPr>
+        <a:xfrm>
+          <a:off x="0" y="0"/>
+          <a:ext cx="0" cy="0"/>
+          <a:chOff x="0" y="0"/>
+          <a:chExt cx="0" cy="0"/>
+        </a:xfrm>
+      </p:grpSpPr>
+      <p:sp>
+        <p:nvSpPr>
+          <p:cNvPr id="2" name="Text Placeholder 1">
+            <a:extLst>
+              <a:ext uri="{FF2B5EF4-FFF2-40B4-BE49-F238E27FC236}">
+                <a16:creationId xmlns:a16="http://schemas.microsoft.com/office/drawing/2014/main" id="{00D8EFDB-45D2-9A4A-6FA9-789D807BF0F3}"/>
+              </a:ext>
+            </a:extLst>
+          </p:cNvPr>
+          <p:cNvSpPr>
+            <a:spLocks noGrp="1"/>
+          </p:cNvSpPr>
+          <p:nvPr>
+            <p:ph type="body" sz="quarter" idx="10"/>
+          </p:nvPr>
+        </p:nvSpPr>
+        <p:spPr/>
+        <p:txBody>
+          <a:bodyPr/>
+          <a:lstStyle/>
+          <a:p>
+            <a:pPr marL="0" indent="0">
+              <a:buNone/>
+            </a:pPr>
+            <a:r>
+              <a:rPr lang="en-CA" b="1" dirty="0"/>
+              <a:t>What have we learned?</a:t>
+            </a:r>
+            <a:endParaRPr lang="en-CA" dirty="0"/>
+          </a:p>
+          <a:p>
+            <a:r>
+              <a:rPr lang="en-CA" dirty="0"/>
+              <a:t>What VCS, Git and GitHub are</a:t>
+            </a:r>
+          </a:p>
+          <a:p>
+            <a:endParaRPr lang="en-CA" dirty="0"/>
+          </a:p>
+          <a:p>
+            <a:r>
+              <a:rPr lang="en-CA" dirty="0"/>
+              <a:t>Why VCS are so useful</a:t>
+            </a:r>
+          </a:p>
+          <a:p>
+            <a:endParaRPr lang="en-CA" dirty="0"/>
+          </a:p>
+          <a:p>
+            <a:r>
+              <a:rPr lang="en-CA" dirty="0"/>
+              <a:t>How to undertake basic tasks in a local and remote repository</a:t>
+            </a:r>
+          </a:p>
+          <a:p>
+            <a:endParaRPr lang="en-CA" dirty="0"/>
+          </a:p>
+          <a:p>
+            <a:r>
+              <a:rPr lang="en-CA" dirty="0"/>
+              <a:t>How services like GitHub improve code collaboration and Open Science</a:t>
+            </a:r>
+          </a:p>
+        </p:txBody>
+      </p:sp>
+    </p:spTree>
+    <p:extLst>
+      <p:ext uri="{BB962C8B-B14F-4D97-AF65-F5344CB8AC3E}">
+        <p14:creationId xmlns:p14="http://schemas.microsoft.com/office/powerpoint/2010/main" val="1527684309"/>
+      </p:ext>
+    </p:extLst>
+  </p:cSld>
+  <p:clrMapOvr>
+    <a:masterClrMapping/>
+  </p:clrMapOvr>
+</p:sld>
+</file>
+
+<file path=ppt/slides/slide35.xml><?xml version="1.0" encoding="utf-8"?>
+<p:sld xmlns:a="http://schemas.openxmlformats.org/drawingml/2006/main" xmlns:r="http://schemas.openxmlformats.org/officeDocument/2006/relationships" xmlns:p="http://schemas.openxmlformats.org/presentationml/2006/main">
+  <p:cSld>
+    <p:spTree>
+      <p:nvGrpSpPr>
+        <p:cNvPr id="1" name=""/>
+        <p:cNvGrpSpPr/>
+        <p:nvPr/>
+      </p:nvGrpSpPr>
+      <p:grpSpPr>
+        <a:xfrm>
+          <a:off x="0" y="0"/>
+          <a:ext cx="0" cy="0"/>
+          <a:chOff x="0" y="0"/>
+          <a:chExt cx="0" cy="0"/>
+        </a:xfrm>
+      </p:grpSpPr>
+      <p:sp>
+        <p:nvSpPr>
+          <p:cNvPr id="2" name="Text Placeholder 1">
+            <a:extLst>
+              <a:ext uri="{FF2B5EF4-FFF2-40B4-BE49-F238E27FC236}">
+                <a16:creationId xmlns:a16="http://schemas.microsoft.com/office/drawing/2014/main" id="{146A319F-99F6-E37E-4837-F8D349D874AC}"/>
+              </a:ext>
+            </a:extLst>
+          </p:cNvPr>
+          <p:cNvSpPr>
+            <a:spLocks noGrp="1"/>
+          </p:cNvSpPr>
+          <p:nvPr>
+            <p:ph type="body" sz="quarter" idx="10"/>
+          </p:nvPr>
+        </p:nvSpPr>
+        <p:spPr/>
+        <p:txBody>
+          <a:bodyPr/>
+          <a:lstStyle/>
+          <a:p>
+            <a:pPr marL="0" indent="0">
+              <a:buNone/>
+            </a:pPr>
+            <a:r>
+              <a:rPr lang="en-CA" b="1" dirty="0"/>
+              <a:t>What next?</a:t>
+            </a:r>
+          </a:p>
+          <a:p>
+            <a:pPr marL="0" indent="0">
+              <a:buNone/>
+            </a:pPr>
+            <a:endParaRPr lang="en-CA" dirty="0"/>
+          </a:p>
+          <a:p>
+            <a:r>
+              <a:rPr lang="en-CA" dirty="0"/>
+              <a:t>Just use Git!</a:t>
+            </a:r>
+          </a:p>
+          <a:p>
+            <a:pPr lvl="1"/>
+            <a:r>
+              <a:rPr lang="en-CA" dirty="0"/>
+              <a:t>Track your hobby projects</a:t>
+            </a:r>
+          </a:p>
+          <a:p>
+            <a:pPr lvl="1"/>
+            <a:endParaRPr lang="en-CA" dirty="0"/>
+          </a:p>
+          <a:p>
+            <a:pPr lvl="1"/>
+            <a:r>
+              <a:rPr lang="en-CA" dirty="0"/>
+              <a:t>Track your research</a:t>
+            </a:r>
+          </a:p>
+          <a:p>
+            <a:pPr lvl="1"/>
+            <a:endParaRPr lang="en-CA" dirty="0"/>
+          </a:p>
+          <a:p>
+            <a:pPr lvl="1"/>
+            <a:r>
+              <a:rPr lang="en-CA" dirty="0"/>
+              <a:t>Access open-access code or software from publications</a:t>
+            </a:r>
+          </a:p>
+        </p:txBody>
+      </p:sp>
+    </p:spTree>
+    <p:extLst>
+      <p:ext uri="{BB962C8B-B14F-4D97-AF65-F5344CB8AC3E}">
+        <p14:creationId xmlns:p14="http://schemas.microsoft.com/office/powerpoint/2010/main" val="890084902"/>
+      </p:ext>
+    </p:extLst>
+  </p:cSld>
+  <p:clrMapOvr>
+    <a:masterClrMapping/>
+  </p:clrMapOvr>
+</p:sld>
+</file>
+
+<file path=ppt/slides/slide36.xml><?xml version="1.0" encoding="utf-8"?>
+<p:sld xmlns:a="http://schemas.openxmlformats.org/drawingml/2006/main" xmlns:r="http://schemas.openxmlformats.org/officeDocument/2006/relationships" xmlns:p="http://schemas.openxmlformats.org/presentationml/2006/main">
+  <p:cSld>
+    <p:spTree>
+      <p:nvGrpSpPr>
+        <p:cNvPr id="1" name=""/>
+        <p:cNvGrpSpPr/>
+        <p:nvPr/>
+      </p:nvGrpSpPr>
+      <p:grpSpPr>
+        <a:xfrm>
+          <a:off x="0" y="0"/>
+          <a:ext cx="0" cy="0"/>
+          <a:chOff x="0" y="0"/>
+          <a:chExt cx="0" cy="0"/>
+        </a:xfrm>
+      </p:grpSpPr>
+      <p:sp>
+        <p:nvSpPr>
+          <p:cNvPr id="2" name="Text Placeholder 1">
+            <a:extLst>
+              <a:ext uri="{FF2B5EF4-FFF2-40B4-BE49-F238E27FC236}">
+                <a16:creationId xmlns:a16="http://schemas.microsoft.com/office/drawing/2014/main" id="{4B362877-EC0E-5809-5772-B43E9A438950}"/>
+              </a:ext>
+            </a:extLst>
+          </p:cNvPr>
+          <p:cNvSpPr>
+            <a:spLocks noGrp="1"/>
+          </p:cNvSpPr>
+          <p:nvPr>
+            <p:ph type="body" sz="quarter" idx="10"/>
+          </p:nvPr>
+        </p:nvSpPr>
+        <p:spPr/>
+        <p:txBody>
+          <a:bodyPr/>
+          <a:lstStyle/>
+          <a:p>
+            <a:pPr marL="0" indent="0">
+              <a:buNone/>
+            </a:pPr>
+            <a:r>
+              <a:rPr lang="en-CA" b="1" dirty="0"/>
+              <a:t>References</a:t>
+            </a:r>
+          </a:p>
+          <a:p>
+            <a:pPr marL="0" indent="0">
+              <a:buNone/>
+            </a:pPr>
+            <a:endParaRPr lang="en-CA" b="1" dirty="0"/>
+          </a:p>
+          <a:p>
+            <a:pPr marL="0" indent="0">
+              <a:buNone/>
+            </a:pPr>
+            <a:r>
+              <a:rPr lang="en-CA" dirty="0">
+                <a:hlinkClick r:id="rId2"/>
+              </a:rPr>
+              <a:t>https://betterexplained.com/articles/a-visual-guide-to-version-control/</a:t>
+            </a:r>
+            <a:r>
+              <a:rPr lang="en-CA" dirty="0"/>
+              <a:t> </a:t>
+            </a:r>
+          </a:p>
+        </p:txBody>
+      </p:sp>
+    </p:spTree>
+    <p:extLst>
+      <p:ext uri="{BB962C8B-B14F-4D97-AF65-F5344CB8AC3E}">
+        <p14:creationId xmlns:p14="http://schemas.microsoft.com/office/powerpoint/2010/main" val="2212101275"/>
       </p:ext>
     </p:extLst>
   </p:cSld>
@@ -10756,6 +12013,41 @@
           </a:p>
         </p:txBody>
       </p:sp>
+      <p:sp>
+        <p:nvSpPr>
+          <p:cNvPr id="5" name="TextBox 4">
+            <a:extLst>
+              <a:ext uri="{FF2B5EF4-FFF2-40B4-BE49-F238E27FC236}">
+                <a16:creationId xmlns:a16="http://schemas.microsoft.com/office/drawing/2014/main" id="{F50C0EF4-3357-D0B4-AACB-CEAEFAD6502E}"/>
+              </a:ext>
+            </a:extLst>
+          </p:cNvPr>
+          <p:cNvSpPr txBox="1"/>
+          <p:nvPr/>
+        </p:nvSpPr>
+        <p:spPr>
+          <a:xfrm>
+            <a:off x="1371600" y="3746810"/>
+            <a:ext cx="3080084" cy="369460"/>
+          </a:xfrm>
+          <a:prstGeom prst="rect">
+            <a:avLst/>
+          </a:prstGeom>
+          <a:noFill/>
+        </p:spPr>
+        <p:txBody>
+          <a:bodyPr wrap="square" rtlCol="0">
+            <a:spAutoFit/>
+          </a:bodyPr>
+          <a:lstStyle/>
+          <a:p>
+            <a:r>
+              <a:rPr lang="en-CA" dirty="0"/>
+              <a:t>Groceries.txt</a:t>
+            </a:r>
+          </a:p>
+        </p:txBody>
+      </p:sp>
     </p:spTree>
     <p:extLst>
       <p:ext uri="{BB962C8B-B14F-4D97-AF65-F5344CB8AC3E}">
@@ -10804,7 +12096,9 @@
         </p:nvSpPr>
         <p:spPr/>
         <p:txBody>
-          <a:bodyPr/>
+          <a:bodyPr>
+            <a:normAutofit fontScale="92500" lnSpcReduction="10000"/>
+          </a:bodyPr>
           <a:lstStyle/>
           <a:p>
             <a:pPr marL="0" indent="0">
@@ -10821,8 +12115,91 @@
               <a:t>A type of version control system</a:t>
             </a:r>
           </a:p>
+          <a:p>
+            <a:endParaRPr lang="en-CA" dirty="0"/>
+          </a:p>
+          <a:p>
+            <a:r>
+              <a:rPr lang="en-CA" dirty="0"/>
+              <a:t>Made by Linus Torvalds for Linux</a:t>
+            </a:r>
+          </a:p>
+          <a:p>
+            <a:endParaRPr lang="en-CA" dirty="0"/>
+          </a:p>
+          <a:p>
+            <a:r>
+              <a:rPr lang="en-CA" dirty="0"/>
+              <a:t>Open-source</a:t>
+            </a:r>
+          </a:p>
+          <a:p>
+            <a:endParaRPr lang="en-CA" dirty="0"/>
+          </a:p>
+          <a:p>
+            <a:r>
+              <a:rPr lang="en-CA" dirty="0"/>
+              <a:t>Most popular VCS currently in use</a:t>
+            </a:r>
+          </a:p>
+          <a:p>
+            <a:endParaRPr lang="en-CA" dirty="0"/>
+          </a:p>
+          <a:p>
+            <a:r>
+              <a:rPr lang="en-CA" dirty="0"/>
+              <a:t>Create a “Git Repository” which stores all the modified instances of your project</a:t>
+            </a:r>
+          </a:p>
         </p:txBody>
       </p:sp>
+      <p:pic>
+        <p:nvPicPr>
+          <p:cNvPr id="1026" name="Picture 2" descr="Git · GitHub">
+            <a:extLst>
+              <a:ext uri="{FF2B5EF4-FFF2-40B4-BE49-F238E27FC236}">
+                <a16:creationId xmlns:a16="http://schemas.microsoft.com/office/drawing/2014/main" id="{72C526F7-AD9B-8A76-27CF-5B8208E932A9}"/>
+              </a:ext>
+            </a:extLst>
+          </p:cNvPr>
+          <p:cNvPicPr>
+            <a:picLocks noChangeAspect="1" noChangeArrowheads="1"/>
+          </p:cNvPicPr>
+          <p:nvPr/>
+        </p:nvPicPr>
+        <p:blipFill>
+          <a:blip r:embed="rId2">
+            <a:extLst>
+              <a:ext uri="{28A0092B-C50C-407E-A947-70E740481C1C}">
+                <a14:useLocalDpi xmlns:a14="http://schemas.microsoft.com/office/drawing/2010/main" val="0"/>
+              </a:ext>
+            </a:extLst>
+          </a:blip>
+          <a:srcRect/>
+          <a:stretch>
+            <a:fillRect/>
+          </a:stretch>
+        </p:blipFill>
+        <p:spPr bwMode="auto">
+          <a:xfrm>
+            <a:off x="7132134" y="1205261"/>
+            <a:ext cx="1905000" cy="1905000"/>
+          </a:xfrm>
+          <a:prstGeom prst="rect">
+            <a:avLst/>
+          </a:prstGeom>
+          <a:noFill/>
+          <a:extLst>
+            <a:ext uri="{909E8E84-426E-40DD-AFC4-6F175D3DCCD1}">
+              <a14:hiddenFill xmlns:a14="http://schemas.microsoft.com/office/drawing/2010/main">
+                <a:solidFill>
+                  <a:srgbClr val="FFFFFF"/>
+                </a:solidFill>
+              </a14:hiddenFill>
+            </a:ext>
+          </a:extLst>
+        </p:spPr>
+      </p:pic>
     </p:spTree>
     <p:extLst>
       <p:ext uri="{BB962C8B-B14F-4D97-AF65-F5344CB8AC3E}">
@@ -10902,9 +12279,30 @@
           <a:bodyPr/>
           <a:lstStyle/>
           <a:p>
+            <a:endParaRPr lang="en-CA" dirty="0"/>
+          </a:p>
+          <a:p>
             <a:r>
               <a:rPr lang="en-CA" dirty="0"/>
               <a:t>A version control system</a:t>
+            </a:r>
+          </a:p>
+          <a:p>
+            <a:endParaRPr lang="en-CA" dirty="0"/>
+          </a:p>
+          <a:p>
+            <a:r>
+              <a:rPr lang="en-CA" dirty="0"/>
+              <a:t>Works locally and remotely</a:t>
+            </a:r>
+          </a:p>
+          <a:p>
+            <a:endParaRPr lang="en-CA" dirty="0"/>
+          </a:p>
+          <a:p>
+            <a:r>
+              <a:rPr lang="en-CA" dirty="0"/>
+              <a:t>Is open-source</a:t>
             </a:r>
           </a:p>
           <a:p>
@@ -10936,6 +12334,9 @@
           <a:bodyPr/>
           <a:lstStyle/>
           <a:p>
+            <a:endParaRPr lang="en-CA" dirty="0"/>
+          </a:p>
+          <a:p>
             <a:r>
               <a:rPr lang="en-CA" dirty="0"/>
               <a:t>A server that </a:t>
@@ -10945,8 +12346,26 @@
               <a:t>hosts </a:t>
             </a:r>
             <a:r>
-              <a:rPr lang="en-CA"/>
+              <a:rPr lang="en-CA" dirty="0"/>
               <a:t>git repositories</a:t>
+            </a:r>
+          </a:p>
+          <a:p>
+            <a:endParaRPr lang="en-CA" dirty="0"/>
+          </a:p>
+          <a:p>
+            <a:r>
+              <a:rPr lang="en-CA" dirty="0"/>
+              <a:t>Works solely as a cloud-based service</a:t>
+            </a:r>
+          </a:p>
+          <a:p>
+            <a:endParaRPr lang="en-CA" dirty="0"/>
+          </a:p>
+          <a:p>
+            <a:r>
+              <a:rPr lang="en-CA" dirty="0"/>
+              <a:t>Owned by Microsoft</a:t>
             </a:r>
           </a:p>
         </p:txBody>

</xml_diff>

<commit_message>
Updated Slides and the Poster
</commit_message>
<xml_diff>
--- a/Slides/MiCM_GitHub_Workshop.pptx
+++ b/Slides/MiCM_GitHub_Workshop.pptx
@@ -5,7 +5,7 @@
     <p:sldMasterId id="2147483672" r:id="rId1"/>
   </p:sldMasterIdLst>
   <p:notesMasterIdLst>
-    <p:notesMasterId r:id="rId53"/>
+    <p:notesMasterId r:id="rId64"/>
   </p:notesMasterIdLst>
   <p:sldIdLst>
     <p:sldId id="316" r:id="rId2"/>
@@ -16,49 +16,60 @@
     <p:sldId id="332" r:id="rId7"/>
     <p:sldId id="319" r:id="rId8"/>
     <p:sldId id="320" r:id="rId9"/>
-    <p:sldId id="351" r:id="rId10"/>
-    <p:sldId id="327" r:id="rId11"/>
-    <p:sldId id="321" r:id="rId12"/>
-    <p:sldId id="339" r:id="rId13"/>
-    <p:sldId id="343" r:id="rId14"/>
-    <p:sldId id="353" r:id="rId15"/>
-    <p:sldId id="322" r:id="rId16"/>
-    <p:sldId id="354" r:id="rId17"/>
-    <p:sldId id="341" r:id="rId18"/>
-    <p:sldId id="357" r:id="rId19"/>
-    <p:sldId id="333" r:id="rId20"/>
-    <p:sldId id="344" r:id="rId21"/>
-    <p:sldId id="334" r:id="rId22"/>
-    <p:sldId id="323" r:id="rId23"/>
-    <p:sldId id="352" r:id="rId24"/>
-    <p:sldId id="355" r:id="rId25"/>
-    <p:sldId id="335" r:id="rId26"/>
-    <p:sldId id="325" r:id="rId27"/>
-    <p:sldId id="356" r:id="rId28"/>
-    <p:sldId id="337" r:id="rId29"/>
-    <p:sldId id="361" r:id="rId30"/>
-    <p:sldId id="338" r:id="rId31"/>
-    <p:sldId id="362" r:id="rId32"/>
-    <p:sldId id="345" r:id="rId33"/>
-    <p:sldId id="363" r:id="rId34"/>
-    <p:sldId id="364" r:id="rId35"/>
-    <p:sldId id="324" r:id="rId36"/>
-    <p:sldId id="368" r:id="rId37"/>
-    <p:sldId id="328" r:id="rId38"/>
-    <p:sldId id="340" r:id="rId39"/>
-    <p:sldId id="326" r:id="rId40"/>
-    <p:sldId id="346" r:id="rId41"/>
-    <p:sldId id="347" r:id="rId42"/>
-    <p:sldId id="358" r:id="rId43"/>
-    <p:sldId id="348" r:id="rId44"/>
-    <p:sldId id="359" r:id="rId45"/>
-    <p:sldId id="350" r:id="rId46"/>
-    <p:sldId id="367" r:id="rId47"/>
-    <p:sldId id="329" r:id="rId48"/>
-    <p:sldId id="330" r:id="rId49"/>
-    <p:sldId id="331" r:id="rId50"/>
-    <p:sldId id="365" r:id="rId51"/>
-    <p:sldId id="342" r:id="rId52"/>
+    <p:sldId id="381" r:id="rId10"/>
+    <p:sldId id="351" r:id="rId11"/>
+    <p:sldId id="327" r:id="rId12"/>
+    <p:sldId id="321" r:id="rId13"/>
+    <p:sldId id="339" r:id="rId14"/>
+    <p:sldId id="343" r:id="rId15"/>
+    <p:sldId id="353" r:id="rId16"/>
+    <p:sldId id="322" r:id="rId17"/>
+    <p:sldId id="354" r:id="rId18"/>
+    <p:sldId id="341" r:id="rId19"/>
+    <p:sldId id="357" r:id="rId20"/>
+    <p:sldId id="371" r:id="rId21"/>
+    <p:sldId id="333" r:id="rId22"/>
+    <p:sldId id="372" r:id="rId23"/>
+    <p:sldId id="344" r:id="rId24"/>
+    <p:sldId id="373" r:id="rId25"/>
+    <p:sldId id="334" r:id="rId26"/>
+    <p:sldId id="323" r:id="rId27"/>
+    <p:sldId id="352" r:id="rId28"/>
+    <p:sldId id="355" r:id="rId29"/>
+    <p:sldId id="335" r:id="rId30"/>
+    <p:sldId id="374" r:id="rId31"/>
+    <p:sldId id="325" r:id="rId32"/>
+    <p:sldId id="356" r:id="rId33"/>
+    <p:sldId id="337" r:id="rId34"/>
+    <p:sldId id="375" r:id="rId35"/>
+    <p:sldId id="361" r:id="rId36"/>
+    <p:sldId id="338" r:id="rId37"/>
+    <p:sldId id="362" r:id="rId38"/>
+    <p:sldId id="345" r:id="rId39"/>
+    <p:sldId id="376" r:id="rId40"/>
+    <p:sldId id="363" r:id="rId41"/>
+    <p:sldId id="364" r:id="rId42"/>
+    <p:sldId id="324" r:id="rId43"/>
+    <p:sldId id="368" r:id="rId44"/>
+    <p:sldId id="328" r:id="rId45"/>
+    <p:sldId id="340" r:id="rId46"/>
+    <p:sldId id="326" r:id="rId47"/>
+    <p:sldId id="346" r:id="rId48"/>
+    <p:sldId id="377" r:id="rId49"/>
+    <p:sldId id="347" r:id="rId50"/>
+    <p:sldId id="378" r:id="rId51"/>
+    <p:sldId id="358" r:id="rId52"/>
+    <p:sldId id="348" r:id="rId53"/>
+    <p:sldId id="379" r:id="rId54"/>
+    <p:sldId id="359" r:id="rId55"/>
+    <p:sldId id="350" r:id="rId56"/>
+    <p:sldId id="380" r:id="rId57"/>
+    <p:sldId id="367" r:id="rId58"/>
+    <p:sldId id="329" r:id="rId59"/>
+    <p:sldId id="330" r:id="rId60"/>
+    <p:sldId id="331" r:id="rId61"/>
+    <p:sldId id="365" r:id="rId62"/>
+    <p:sldId id="342" r:id="rId63"/>
   </p:sldIdLst>
   <p:sldSz cx="9144000" cy="6858000" type="screen4x3"/>
   <p:notesSz cx="6858000" cy="9144000"/>
@@ -168,7 +179,7 @@
 <file path=ppt/revisionInfo.xml><?xml version="1.0" encoding="utf-8"?>
 <p1510:revInfo xmlns:a="http://schemas.openxmlformats.org/drawingml/2006/main" xmlns:r="http://schemas.openxmlformats.org/officeDocument/2006/relationships" xmlns:p1510="http://schemas.microsoft.com/office/powerpoint/2015/10/main">
   <p1510:revLst>
-    <p1510:client id="{FC38A552-1810-4A9B-8174-E44D3C19BC43}" v="211" dt="2022-06-21T14:24:50.793"/>
+    <p1510:client id="{FC38A552-1810-4A9B-8174-E44D3C19BC43}" v="227" dt="2022-06-21T15:36:14.873"/>
   </p1510:revLst>
 </p1510:revInfo>
 </file>
@@ -2037,7 +2048,7 @@
   <pc:docChgLst>
     <pc:chgData name="Adrien Osakwe" userId="7a3e290c-eb83-484b-8e3d-d46ef2333477" providerId="ADAL" clId="{FC38A552-1810-4A9B-8174-E44D3C19BC43}"/>
     <pc:docChg chg="undo redo custSel addSld delSld modSld sldOrd modMainMaster">
-      <pc:chgData name="Adrien Osakwe" userId="7a3e290c-eb83-484b-8e3d-d46ef2333477" providerId="ADAL" clId="{FC38A552-1810-4A9B-8174-E44D3C19BC43}" dt="2022-06-21T14:28:10.910" v="12794" actId="20577"/>
+      <pc:chgData name="Adrien Osakwe" userId="7a3e290c-eb83-484b-8e3d-d46ef2333477" providerId="ADAL" clId="{FC38A552-1810-4A9B-8174-E44D3C19BC43}" dt="2022-06-21T15:52:45.196" v="16922" actId="47"/>
       <pc:docMkLst>
         <pc:docMk/>
       </pc:docMkLst>
@@ -2986,13 +2997,13 @@
         </pc:spChg>
       </pc:sldChg>
       <pc:sldChg chg="modSp add mod ord modNotesTx">
-        <pc:chgData name="Adrien Osakwe" userId="7a3e290c-eb83-484b-8e3d-d46ef2333477" providerId="ADAL" clId="{FC38A552-1810-4A9B-8174-E44D3C19BC43}" dt="2022-06-14T17:21:41.953" v="6229" actId="20577"/>
+        <pc:chgData name="Adrien Osakwe" userId="7a3e290c-eb83-484b-8e3d-d46ef2333477" providerId="ADAL" clId="{FC38A552-1810-4A9B-8174-E44D3C19BC43}" dt="2022-06-21T15:23:12.588" v="13691" actId="20577"/>
         <pc:sldMkLst>
           <pc:docMk/>
           <pc:sldMk cId="1723855522" sldId="344"/>
         </pc:sldMkLst>
         <pc:spChg chg="mod">
-          <ac:chgData name="Adrien Osakwe" userId="7a3e290c-eb83-484b-8e3d-d46ef2333477" providerId="ADAL" clId="{FC38A552-1810-4A9B-8174-E44D3C19BC43}" dt="2022-06-06T16:24:49.786" v="4598" actId="20577"/>
+          <ac:chgData name="Adrien Osakwe" userId="7a3e290c-eb83-484b-8e3d-d46ef2333477" providerId="ADAL" clId="{FC38A552-1810-4A9B-8174-E44D3C19BC43}" dt="2022-06-21T15:23:12.588" v="13691" actId="20577"/>
           <ac:spMkLst>
             <pc:docMk/>
             <pc:sldMk cId="1723855522" sldId="344"/>
@@ -3693,6 +3704,229 @@
             <pc:docMk/>
             <pc:sldMk cId="2837531258" sldId="369"/>
             <ac:spMk id="2" creationId="{09E2662B-C95B-76DF-8523-2BDCBE3A731E}"/>
+          </ac:spMkLst>
+        </pc:spChg>
+      </pc:sldChg>
+      <pc:sldChg chg="modSp new del mod ord">
+        <pc:chgData name="Adrien Osakwe" userId="7a3e290c-eb83-484b-8e3d-d46ef2333477" providerId="ADAL" clId="{FC38A552-1810-4A9B-8174-E44D3C19BC43}" dt="2022-06-21T15:52:45.196" v="16922" actId="47"/>
+        <pc:sldMkLst>
+          <pc:docMk/>
+          <pc:sldMk cId="3789468848" sldId="370"/>
+        </pc:sldMkLst>
+        <pc:spChg chg="mod">
+          <ac:chgData name="Adrien Osakwe" userId="7a3e290c-eb83-484b-8e3d-d46ef2333477" providerId="ADAL" clId="{FC38A552-1810-4A9B-8174-E44D3C19BC43}" dt="2022-06-21T15:38:40.275" v="16229" actId="27636"/>
+          <ac:spMkLst>
+            <pc:docMk/>
+            <pc:sldMk cId="3789468848" sldId="370"/>
+            <ac:spMk id="2" creationId="{2F45C8F9-A881-954E-5445-830AACF1BD97}"/>
+          </ac:spMkLst>
+        </pc:spChg>
+      </pc:sldChg>
+      <pc:sldChg chg="modSp add mod">
+        <pc:chgData name="Adrien Osakwe" userId="7a3e290c-eb83-484b-8e3d-d46ef2333477" providerId="ADAL" clId="{FC38A552-1810-4A9B-8174-E44D3C19BC43}" dt="2022-06-21T15:15:46.496" v="13083" actId="20577"/>
+        <pc:sldMkLst>
+          <pc:docMk/>
+          <pc:sldMk cId="678388880" sldId="371"/>
+        </pc:sldMkLst>
+        <pc:spChg chg="mod">
+          <ac:chgData name="Adrien Osakwe" userId="7a3e290c-eb83-484b-8e3d-d46ef2333477" providerId="ADAL" clId="{FC38A552-1810-4A9B-8174-E44D3C19BC43}" dt="2022-06-21T15:15:46.496" v="13083" actId="20577"/>
+          <ac:spMkLst>
+            <pc:docMk/>
+            <pc:sldMk cId="678388880" sldId="371"/>
+            <ac:spMk id="2" creationId="{F30F071A-0450-8F6E-F28D-8124D7A90523}"/>
+          </ac:spMkLst>
+        </pc:spChg>
+      </pc:sldChg>
+      <pc:sldChg chg="modSp add mod">
+        <pc:chgData name="Adrien Osakwe" userId="7a3e290c-eb83-484b-8e3d-d46ef2333477" providerId="ADAL" clId="{FC38A552-1810-4A9B-8174-E44D3C19BC43}" dt="2022-06-21T15:20:54.951" v="13454" actId="20577"/>
+        <pc:sldMkLst>
+          <pc:docMk/>
+          <pc:sldMk cId="907190213" sldId="372"/>
+        </pc:sldMkLst>
+        <pc:spChg chg="mod">
+          <ac:chgData name="Adrien Osakwe" userId="7a3e290c-eb83-484b-8e3d-d46ef2333477" providerId="ADAL" clId="{FC38A552-1810-4A9B-8174-E44D3C19BC43}" dt="2022-06-21T15:20:54.951" v="13454" actId="20577"/>
+          <ac:spMkLst>
+            <pc:docMk/>
+            <pc:sldMk cId="907190213" sldId="372"/>
+            <ac:spMk id="2" creationId="{F30F071A-0450-8F6E-F28D-8124D7A90523}"/>
+          </ac:spMkLst>
+        </pc:spChg>
+      </pc:sldChg>
+      <pc:sldChg chg="modSp add mod">
+        <pc:chgData name="Adrien Osakwe" userId="7a3e290c-eb83-484b-8e3d-d46ef2333477" providerId="ADAL" clId="{FC38A552-1810-4A9B-8174-E44D3C19BC43}" dt="2022-06-21T15:23:09.101" v="13690" actId="20577"/>
+        <pc:sldMkLst>
+          <pc:docMk/>
+          <pc:sldMk cId="3623309075" sldId="373"/>
+        </pc:sldMkLst>
+        <pc:spChg chg="mod">
+          <ac:chgData name="Adrien Osakwe" userId="7a3e290c-eb83-484b-8e3d-d46ef2333477" providerId="ADAL" clId="{FC38A552-1810-4A9B-8174-E44D3C19BC43}" dt="2022-06-21T15:23:09.101" v="13690" actId="20577"/>
+          <ac:spMkLst>
+            <pc:docMk/>
+            <pc:sldMk cId="3623309075" sldId="373"/>
+            <ac:spMk id="2" creationId="{F30F071A-0450-8F6E-F28D-8124D7A90523}"/>
+          </ac:spMkLst>
+        </pc:spChg>
+      </pc:sldChg>
+      <pc:sldChg chg="modSp add mod">
+        <pc:chgData name="Adrien Osakwe" userId="7a3e290c-eb83-484b-8e3d-d46ef2333477" providerId="ADAL" clId="{FC38A552-1810-4A9B-8174-E44D3C19BC43}" dt="2022-06-21T15:25:57.646" v="13957" actId="20577"/>
+        <pc:sldMkLst>
+          <pc:docMk/>
+          <pc:sldMk cId="2674360721" sldId="374"/>
+        </pc:sldMkLst>
+        <pc:spChg chg="mod">
+          <ac:chgData name="Adrien Osakwe" userId="7a3e290c-eb83-484b-8e3d-d46ef2333477" providerId="ADAL" clId="{FC38A552-1810-4A9B-8174-E44D3C19BC43}" dt="2022-06-21T15:25:57.646" v="13957" actId="20577"/>
+          <ac:spMkLst>
+            <pc:docMk/>
+            <pc:sldMk cId="2674360721" sldId="374"/>
+            <ac:spMk id="2" creationId="{F30F071A-0450-8F6E-F28D-8124D7A90523}"/>
+          </ac:spMkLst>
+        </pc:spChg>
+      </pc:sldChg>
+      <pc:sldChg chg="modSp add mod">
+        <pc:chgData name="Adrien Osakwe" userId="7a3e290c-eb83-484b-8e3d-d46ef2333477" providerId="ADAL" clId="{FC38A552-1810-4A9B-8174-E44D3C19BC43}" dt="2022-06-21T15:27:34.037" v="14270" actId="20577"/>
+        <pc:sldMkLst>
+          <pc:docMk/>
+          <pc:sldMk cId="1311449531" sldId="375"/>
+        </pc:sldMkLst>
+        <pc:spChg chg="mod">
+          <ac:chgData name="Adrien Osakwe" userId="7a3e290c-eb83-484b-8e3d-d46ef2333477" providerId="ADAL" clId="{FC38A552-1810-4A9B-8174-E44D3C19BC43}" dt="2022-06-21T15:27:34.037" v="14270" actId="20577"/>
+          <ac:spMkLst>
+            <pc:docMk/>
+            <pc:sldMk cId="1311449531" sldId="375"/>
+            <ac:spMk id="2" creationId="{F30F071A-0450-8F6E-F28D-8124D7A90523}"/>
+          </ac:spMkLst>
+        </pc:spChg>
+      </pc:sldChg>
+      <pc:sldChg chg="modSp add mod">
+        <pc:chgData name="Adrien Osakwe" userId="7a3e290c-eb83-484b-8e3d-d46ef2333477" providerId="ADAL" clId="{FC38A552-1810-4A9B-8174-E44D3C19BC43}" dt="2022-06-21T15:29:31.742" v="14733" actId="27636"/>
+        <pc:sldMkLst>
+          <pc:docMk/>
+          <pc:sldMk cId="1616421621" sldId="376"/>
+        </pc:sldMkLst>
+        <pc:spChg chg="mod">
+          <ac:chgData name="Adrien Osakwe" userId="7a3e290c-eb83-484b-8e3d-d46ef2333477" providerId="ADAL" clId="{FC38A552-1810-4A9B-8174-E44D3C19BC43}" dt="2022-06-21T15:29:31.742" v="14733" actId="27636"/>
+          <ac:spMkLst>
+            <pc:docMk/>
+            <pc:sldMk cId="1616421621" sldId="376"/>
+            <ac:spMk id="2" creationId="{F30F071A-0450-8F6E-F28D-8124D7A90523}"/>
+          </ac:spMkLst>
+        </pc:spChg>
+      </pc:sldChg>
+      <pc:sldChg chg="modSp add mod">
+        <pc:chgData name="Adrien Osakwe" userId="7a3e290c-eb83-484b-8e3d-d46ef2333477" providerId="ADAL" clId="{FC38A552-1810-4A9B-8174-E44D3C19BC43}" dt="2022-06-21T15:31:19.051" v="15035" actId="20577"/>
+        <pc:sldMkLst>
+          <pc:docMk/>
+          <pc:sldMk cId="1796213204" sldId="377"/>
+        </pc:sldMkLst>
+        <pc:spChg chg="mod">
+          <ac:chgData name="Adrien Osakwe" userId="7a3e290c-eb83-484b-8e3d-d46ef2333477" providerId="ADAL" clId="{FC38A552-1810-4A9B-8174-E44D3C19BC43}" dt="2022-06-21T15:31:19.051" v="15035" actId="20577"/>
+          <ac:spMkLst>
+            <pc:docMk/>
+            <pc:sldMk cId="1796213204" sldId="377"/>
+            <ac:spMk id="2" creationId="{F30F071A-0450-8F6E-F28D-8124D7A90523}"/>
+          </ac:spMkLst>
+        </pc:spChg>
+      </pc:sldChg>
+      <pc:sldChg chg="add del">
+        <pc:chgData name="Adrien Osakwe" userId="7a3e290c-eb83-484b-8e3d-d46ef2333477" providerId="ADAL" clId="{FC38A552-1810-4A9B-8174-E44D3C19BC43}" dt="2022-06-21T15:29:46.844" v="14735"/>
+        <pc:sldMkLst>
+          <pc:docMk/>
+          <pc:sldMk cId="2034720066" sldId="377"/>
+        </pc:sldMkLst>
+      </pc:sldChg>
+      <pc:sldChg chg="add del">
+        <pc:chgData name="Adrien Osakwe" userId="7a3e290c-eb83-484b-8e3d-d46ef2333477" providerId="ADAL" clId="{FC38A552-1810-4A9B-8174-E44D3C19BC43}" dt="2022-06-21T15:27:52.681" v="14281"/>
+        <pc:sldMkLst>
+          <pc:docMk/>
+          <pc:sldMk cId="3383581305" sldId="377"/>
+        </pc:sldMkLst>
+      </pc:sldChg>
+      <pc:sldChg chg="modSp add mod">
+        <pc:chgData name="Adrien Osakwe" userId="7a3e290c-eb83-484b-8e3d-d46ef2333477" providerId="ADAL" clId="{FC38A552-1810-4A9B-8174-E44D3C19BC43}" dt="2022-06-21T15:32:33.820" v="15283" actId="20577"/>
+        <pc:sldMkLst>
+          <pc:docMk/>
+          <pc:sldMk cId="3513683659" sldId="378"/>
+        </pc:sldMkLst>
+        <pc:spChg chg="mod">
+          <ac:chgData name="Adrien Osakwe" userId="7a3e290c-eb83-484b-8e3d-d46ef2333477" providerId="ADAL" clId="{FC38A552-1810-4A9B-8174-E44D3C19BC43}" dt="2022-06-21T15:32:33.820" v="15283" actId="20577"/>
+          <ac:spMkLst>
+            <pc:docMk/>
+            <pc:sldMk cId="3513683659" sldId="378"/>
+            <ac:spMk id="2" creationId="{F30F071A-0450-8F6E-F28D-8124D7A90523}"/>
+          </ac:spMkLst>
+        </pc:spChg>
+      </pc:sldChg>
+      <pc:sldChg chg="modSp add mod">
+        <pc:chgData name="Adrien Osakwe" userId="7a3e290c-eb83-484b-8e3d-d46ef2333477" providerId="ADAL" clId="{FC38A552-1810-4A9B-8174-E44D3C19BC43}" dt="2022-06-21T15:35:49.366" v="15783" actId="20577"/>
+        <pc:sldMkLst>
+          <pc:docMk/>
+          <pc:sldMk cId="580897146" sldId="379"/>
+        </pc:sldMkLst>
+        <pc:spChg chg="mod">
+          <ac:chgData name="Adrien Osakwe" userId="7a3e290c-eb83-484b-8e3d-d46ef2333477" providerId="ADAL" clId="{FC38A552-1810-4A9B-8174-E44D3C19BC43}" dt="2022-06-21T15:35:49.366" v="15783" actId="20577"/>
+          <ac:spMkLst>
+            <pc:docMk/>
+            <pc:sldMk cId="580897146" sldId="379"/>
+            <ac:spMk id="2" creationId="{F30F071A-0450-8F6E-F28D-8124D7A90523}"/>
+          </ac:spMkLst>
+        </pc:spChg>
+      </pc:sldChg>
+      <pc:sldChg chg="add del">
+        <pc:chgData name="Adrien Osakwe" userId="7a3e290c-eb83-484b-8e3d-d46ef2333477" providerId="ADAL" clId="{FC38A552-1810-4A9B-8174-E44D3C19BC43}" dt="2022-06-21T15:33:16.171" v="15285"/>
+        <pc:sldMkLst>
+          <pc:docMk/>
+          <pc:sldMk cId="3610788623" sldId="379"/>
+        </pc:sldMkLst>
+      </pc:sldChg>
+      <pc:sldChg chg="modSp add mod">
+        <pc:chgData name="Adrien Osakwe" userId="7a3e290c-eb83-484b-8e3d-d46ef2333477" providerId="ADAL" clId="{FC38A552-1810-4A9B-8174-E44D3C19BC43}" dt="2022-06-21T15:38:31.868" v="16227" actId="27636"/>
+        <pc:sldMkLst>
+          <pc:docMk/>
+          <pc:sldMk cId="1411733175" sldId="380"/>
+        </pc:sldMkLst>
+        <pc:spChg chg="mod">
+          <ac:chgData name="Adrien Osakwe" userId="7a3e290c-eb83-484b-8e3d-d46ef2333477" providerId="ADAL" clId="{FC38A552-1810-4A9B-8174-E44D3C19BC43}" dt="2022-06-21T15:38:31.868" v="16227" actId="27636"/>
+          <ac:spMkLst>
+            <pc:docMk/>
+            <pc:sldMk cId="1411733175" sldId="380"/>
+            <ac:spMk id="2" creationId="{F30F071A-0450-8F6E-F28D-8124D7A90523}"/>
+          </ac:spMkLst>
+        </pc:spChg>
+      </pc:sldChg>
+      <pc:sldChg chg="new del">
+        <pc:chgData name="Adrien Osakwe" userId="7a3e290c-eb83-484b-8e3d-d46ef2333477" providerId="ADAL" clId="{FC38A552-1810-4A9B-8174-E44D3C19BC43}" dt="2022-06-21T15:41:07.290" v="16281" actId="47"/>
+        <pc:sldMkLst>
+          <pc:docMk/>
+          <pc:sldMk cId="495343017" sldId="381"/>
+        </pc:sldMkLst>
+      </pc:sldChg>
+      <pc:sldChg chg="modSp new mod ord">
+        <pc:chgData name="Adrien Osakwe" userId="7a3e290c-eb83-484b-8e3d-d46ef2333477" providerId="ADAL" clId="{FC38A552-1810-4A9B-8174-E44D3C19BC43}" dt="2022-06-21T15:52:37.466" v="16921"/>
+        <pc:sldMkLst>
+          <pc:docMk/>
+          <pc:sldMk cId="1245366370" sldId="381"/>
+        </pc:sldMkLst>
+        <pc:spChg chg="mod">
+          <ac:chgData name="Adrien Osakwe" userId="7a3e290c-eb83-484b-8e3d-d46ef2333477" providerId="ADAL" clId="{FC38A552-1810-4A9B-8174-E44D3C19BC43}" dt="2022-06-21T15:52:28.760" v="16919" actId="27636"/>
+          <ac:spMkLst>
+            <pc:docMk/>
+            <pc:sldMk cId="1245366370" sldId="381"/>
+            <ac:spMk id="2" creationId="{43252691-AD7E-B9B9-8DF3-DB5BADA01947}"/>
+          </ac:spMkLst>
+        </pc:spChg>
+      </pc:sldChg>
+      <pc:sldChg chg="modSp new del mod">
+        <pc:chgData name="Adrien Osakwe" userId="7a3e290c-eb83-484b-8e3d-d46ef2333477" providerId="ADAL" clId="{FC38A552-1810-4A9B-8174-E44D3C19BC43}" dt="2022-06-21T15:39:44.737" v="16279" actId="680"/>
+        <pc:sldMkLst>
+          <pc:docMk/>
+          <pc:sldMk cId="2205532728" sldId="381"/>
+        </pc:sldMkLst>
+        <pc:spChg chg="mod">
+          <ac:chgData name="Adrien Osakwe" userId="7a3e290c-eb83-484b-8e3d-d46ef2333477" providerId="ADAL" clId="{FC38A552-1810-4A9B-8174-E44D3C19BC43}" dt="2022-06-21T15:39:44.051" v="16278" actId="5793"/>
+          <ac:spMkLst>
+            <pc:docMk/>
+            <pc:sldMk cId="2205532728" sldId="381"/>
+            <ac:spMk id="2" creationId="{742D3A5F-27B3-1727-5CDD-3528A036DED1}"/>
           </ac:spMkLst>
         </pc:spChg>
       </pc:sldChg>
@@ -4456,7 +4690,40 @@
           <a:bodyPr/>
           <a:lstStyle/>
           <a:p>
-            <a:endParaRPr lang="en-CA" dirty="0"/>
+            <a:pPr marL="228600" indent="-228600">
+              <a:buAutoNum type="arabicPeriod"/>
+            </a:pPr>
+            <a:r>
+              <a:rPr lang="en-CA" dirty="0"/>
+              <a:t>Edit your text file with an error</a:t>
+            </a:r>
+          </a:p>
+          <a:p>
+            <a:pPr marL="228600" indent="-228600">
+              <a:buAutoNum type="arabicPeriod"/>
+            </a:pPr>
+            <a:r>
+              <a:rPr lang="en-CA" dirty="0"/>
+              <a:t>Go to desktop app and reset the file to the previous commit</a:t>
+            </a:r>
+          </a:p>
+          <a:p>
+            <a:pPr marL="228600" indent="-228600">
+              <a:buAutoNum type="arabicPeriod"/>
+            </a:pPr>
+            <a:r>
+              <a:rPr lang="en-CA" dirty="0"/>
+              <a:t>Repeat BUT this time commit it</a:t>
+            </a:r>
+          </a:p>
+          <a:p>
+            <a:pPr marL="228600" indent="-228600">
+              <a:buAutoNum type="arabicPeriod"/>
+            </a:pPr>
+            <a:r>
+              <a:rPr lang="en-CA" dirty="0"/>
+              <a:t>Revert changes of the commit</a:t>
+            </a:r>
           </a:p>
         </p:txBody>
       </p:sp>
@@ -4477,7 +4744,7 @@
           <a:p>
             <a:fld id="{DACBD60B-517C-4242-AE46-E1BD2D086542}" type="slidenum">
               <a:rPr lang="fr-FR" smtClean="0"/>
-              <a:t>29</a:t>
+              <a:t>23</a:t>
             </a:fld>
             <a:endParaRPr lang="fr-FR"/>
           </a:p>
@@ -4486,7 +4753,7 @@
     </p:spTree>
     <p:extLst>
       <p:ext uri="{BB962C8B-B14F-4D97-AF65-F5344CB8AC3E}">
-        <p14:creationId xmlns:p14="http://schemas.microsoft.com/office/powerpoint/2010/main" val="2398739311"/>
+        <p14:creationId xmlns:p14="http://schemas.microsoft.com/office/powerpoint/2010/main" val="4220277172"/>
       </p:ext>
     </p:extLst>
   </p:cSld>
@@ -4540,9 +4807,39 @@
           <a:bodyPr/>
           <a:lstStyle/>
           <a:p>
-            <a:r>
-              <a:rPr lang="en-CA" dirty="0"/>
-              <a:t>On this slide I can just open GitHub and explore the different features and options</a:t>
+            <a:pPr marL="228600" indent="-228600">
+              <a:buAutoNum type="arabicPeriod"/>
+            </a:pPr>
+            <a:r>
+              <a:rPr lang="en-CA" dirty="0"/>
+              <a:t>Edit your text file with an error</a:t>
+            </a:r>
+          </a:p>
+          <a:p>
+            <a:pPr marL="228600" indent="-228600">
+              <a:buAutoNum type="arabicPeriod"/>
+            </a:pPr>
+            <a:r>
+              <a:rPr lang="en-CA" dirty="0"/>
+              <a:t>Go to desktop app and reset the file to the previous commit</a:t>
+            </a:r>
+          </a:p>
+          <a:p>
+            <a:pPr marL="228600" indent="-228600">
+              <a:buAutoNum type="arabicPeriod"/>
+            </a:pPr>
+            <a:r>
+              <a:rPr lang="en-CA" dirty="0"/>
+              <a:t>Repeat BUT this time commit it</a:t>
+            </a:r>
+          </a:p>
+          <a:p>
+            <a:pPr marL="228600" indent="-228600">
+              <a:buAutoNum type="arabicPeriod"/>
+            </a:pPr>
+            <a:r>
+              <a:rPr lang="en-CA" dirty="0"/>
+              <a:t>Revert changes of the commit</a:t>
             </a:r>
           </a:p>
         </p:txBody>
@@ -4564,7 +4861,352 @@
           <a:p>
             <a:fld id="{DACBD60B-517C-4242-AE46-E1BD2D086542}" type="slidenum">
               <a:rPr lang="fr-FR" smtClean="0"/>
-              <a:t>36</a:t>
+              <a:t>24</a:t>
+            </a:fld>
+            <a:endParaRPr lang="fr-FR"/>
+          </a:p>
+        </p:txBody>
+      </p:sp>
+    </p:spTree>
+    <p:extLst>
+      <p:ext uri="{BB962C8B-B14F-4D97-AF65-F5344CB8AC3E}">
+        <p14:creationId xmlns:p14="http://schemas.microsoft.com/office/powerpoint/2010/main" val="4238748864"/>
+      </p:ext>
+    </p:extLst>
+  </p:cSld>
+  <p:clrMapOvr>
+    <a:masterClrMapping/>
+  </p:clrMapOvr>
+</p:notes>
+</file>
+
+<file path=ppt/notesSlides/notesSlide12.xml><?xml version="1.0" encoding="utf-8"?>
+<p:notes xmlns:a="http://schemas.openxmlformats.org/drawingml/2006/main" xmlns:r="http://schemas.openxmlformats.org/officeDocument/2006/relationships" xmlns:p="http://schemas.openxmlformats.org/presentationml/2006/main">
+  <p:cSld>
+    <p:spTree>
+      <p:nvGrpSpPr>
+        <p:cNvPr id="1" name=""/>
+        <p:cNvGrpSpPr/>
+        <p:nvPr/>
+      </p:nvGrpSpPr>
+      <p:grpSpPr>
+        <a:xfrm>
+          <a:off x="0" y="0"/>
+          <a:ext cx="0" cy="0"/>
+          <a:chOff x="0" y="0"/>
+          <a:chExt cx="0" cy="0"/>
+        </a:xfrm>
+      </p:grpSpPr>
+      <p:sp>
+        <p:nvSpPr>
+          <p:cNvPr id="2" name="Slide Image Placeholder 1"/>
+          <p:cNvSpPr>
+            <a:spLocks noGrp="1" noRot="1" noChangeAspect="1"/>
+          </p:cNvSpPr>
+          <p:nvPr>
+            <p:ph type="sldImg"/>
+          </p:nvPr>
+        </p:nvSpPr>
+        <p:spPr/>
+      </p:sp>
+      <p:sp>
+        <p:nvSpPr>
+          <p:cNvPr id="3" name="Notes Placeholder 2"/>
+          <p:cNvSpPr>
+            <a:spLocks noGrp="1"/>
+          </p:cNvSpPr>
+          <p:nvPr>
+            <p:ph type="body" idx="1"/>
+          </p:nvPr>
+        </p:nvSpPr>
+        <p:spPr/>
+        <p:txBody>
+          <a:bodyPr/>
+          <a:lstStyle/>
+          <a:p>
+            <a:r>
+              <a:rPr lang="en-CA" dirty="0"/>
+              <a:t>Create new branch and make changes</a:t>
+            </a:r>
+          </a:p>
+        </p:txBody>
+      </p:sp>
+      <p:sp>
+        <p:nvSpPr>
+          <p:cNvPr id="4" name="Slide Number Placeholder 3"/>
+          <p:cNvSpPr>
+            <a:spLocks noGrp="1"/>
+          </p:cNvSpPr>
+          <p:nvPr>
+            <p:ph type="sldNum" sz="quarter" idx="5"/>
+          </p:nvPr>
+        </p:nvSpPr>
+        <p:spPr/>
+        <p:txBody>
+          <a:bodyPr/>
+          <a:lstStyle/>
+          <a:p>
+            <a:fld id="{DACBD60B-517C-4242-AE46-E1BD2D086542}" type="slidenum">
+              <a:rPr lang="fr-FR" smtClean="0"/>
+              <a:t>29</a:t>
+            </a:fld>
+            <a:endParaRPr lang="fr-FR"/>
+          </a:p>
+        </p:txBody>
+      </p:sp>
+    </p:spTree>
+    <p:extLst>
+      <p:ext uri="{BB962C8B-B14F-4D97-AF65-F5344CB8AC3E}">
+        <p14:creationId xmlns:p14="http://schemas.microsoft.com/office/powerpoint/2010/main" val="1675639307"/>
+      </p:ext>
+    </p:extLst>
+  </p:cSld>
+  <p:clrMapOvr>
+    <a:masterClrMapping/>
+  </p:clrMapOvr>
+</p:notes>
+</file>
+
+<file path=ppt/notesSlides/notesSlide13.xml><?xml version="1.0" encoding="utf-8"?>
+<p:notes xmlns:a="http://schemas.openxmlformats.org/drawingml/2006/main" xmlns:r="http://schemas.openxmlformats.org/officeDocument/2006/relationships" xmlns:p="http://schemas.openxmlformats.org/presentationml/2006/main">
+  <p:cSld>
+    <p:spTree>
+      <p:nvGrpSpPr>
+        <p:cNvPr id="1" name=""/>
+        <p:cNvGrpSpPr/>
+        <p:nvPr/>
+      </p:nvGrpSpPr>
+      <p:grpSpPr>
+        <a:xfrm>
+          <a:off x="0" y="0"/>
+          <a:ext cx="0" cy="0"/>
+          <a:chOff x="0" y="0"/>
+          <a:chExt cx="0" cy="0"/>
+        </a:xfrm>
+      </p:grpSpPr>
+      <p:sp>
+        <p:nvSpPr>
+          <p:cNvPr id="2" name="Slide Image Placeholder 1"/>
+          <p:cNvSpPr>
+            <a:spLocks noGrp="1" noRot="1" noChangeAspect="1"/>
+          </p:cNvSpPr>
+          <p:nvPr>
+            <p:ph type="sldImg"/>
+          </p:nvPr>
+        </p:nvSpPr>
+        <p:spPr/>
+      </p:sp>
+      <p:sp>
+        <p:nvSpPr>
+          <p:cNvPr id="3" name="Notes Placeholder 2"/>
+          <p:cNvSpPr>
+            <a:spLocks noGrp="1"/>
+          </p:cNvSpPr>
+          <p:nvPr>
+            <p:ph type="body" idx="1"/>
+          </p:nvPr>
+        </p:nvSpPr>
+        <p:spPr/>
+        <p:txBody>
+          <a:bodyPr/>
+          <a:lstStyle/>
+          <a:p>
+            <a:r>
+              <a:rPr lang="en-CA" dirty="0"/>
+              <a:t>Create new branch and make changes</a:t>
+            </a:r>
+          </a:p>
+        </p:txBody>
+      </p:sp>
+      <p:sp>
+        <p:nvSpPr>
+          <p:cNvPr id="4" name="Slide Number Placeholder 3"/>
+          <p:cNvSpPr>
+            <a:spLocks noGrp="1"/>
+          </p:cNvSpPr>
+          <p:nvPr>
+            <p:ph type="sldNum" sz="quarter" idx="5"/>
+          </p:nvPr>
+        </p:nvSpPr>
+        <p:spPr/>
+        <p:txBody>
+          <a:bodyPr/>
+          <a:lstStyle/>
+          <a:p>
+            <a:fld id="{DACBD60B-517C-4242-AE46-E1BD2D086542}" type="slidenum">
+              <a:rPr lang="fr-FR" smtClean="0"/>
+              <a:t>30</a:t>
+            </a:fld>
+            <a:endParaRPr lang="fr-FR"/>
+          </a:p>
+        </p:txBody>
+      </p:sp>
+    </p:spTree>
+    <p:extLst>
+      <p:ext uri="{BB962C8B-B14F-4D97-AF65-F5344CB8AC3E}">
+        <p14:creationId xmlns:p14="http://schemas.microsoft.com/office/powerpoint/2010/main" val="356948245"/>
+      </p:ext>
+    </p:extLst>
+  </p:cSld>
+  <p:clrMapOvr>
+    <a:masterClrMapping/>
+  </p:clrMapOvr>
+</p:notes>
+</file>
+
+<file path=ppt/notesSlides/notesSlide14.xml><?xml version="1.0" encoding="utf-8"?>
+<p:notes xmlns:a="http://schemas.openxmlformats.org/drawingml/2006/main" xmlns:r="http://schemas.openxmlformats.org/officeDocument/2006/relationships" xmlns:p="http://schemas.openxmlformats.org/presentationml/2006/main">
+  <p:cSld>
+    <p:spTree>
+      <p:nvGrpSpPr>
+        <p:cNvPr id="1" name=""/>
+        <p:cNvGrpSpPr/>
+        <p:nvPr/>
+      </p:nvGrpSpPr>
+      <p:grpSpPr>
+        <a:xfrm>
+          <a:off x="0" y="0"/>
+          <a:ext cx="0" cy="0"/>
+          <a:chOff x="0" y="0"/>
+          <a:chExt cx="0" cy="0"/>
+        </a:xfrm>
+      </p:grpSpPr>
+      <p:sp>
+        <p:nvSpPr>
+          <p:cNvPr id="2" name="Slide Image Placeholder 1"/>
+          <p:cNvSpPr>
+            <a:spLocks noGrp="1" noRot="1" noChangeAspect="1"/>
+          </p:cNvSpPr>
+          <p:nvPr>
+            <p:ph type="sldImg"/>
+          </p:nvPr>
+        </p:nvSpPr>
+        <p:spPr/>
+      </p:sp>
+      <p:sp>
+        <p:nvSpPr>
+          <p:cNvPr id="3" name="Notes Placeholder 2"/>
+          <p:cNvSpPr>
+            <a:spLocks noGrp="1"/>
+          </p:cNvSpPr>
+          <p:nvPr>
+            <p:ph type="body" idx="1"/>
+          </p:nvPr>
+        </p:nvSpPr>
+        <p:spPr/>
+        <p:txBody>
+          <a:bodyPr/>
+          <a:lstStyle/>
+          <a:p>
+            <a:endParaRPr lang="en-CA" dirty="0"/>
+          </a:p>
+        </p:txBody>
+      </p:sp>
+      <p:sp>
+        <p:nvSpPr>
+          <p:cNvPr id="4" name="Slide Number Placeholder 3"/>
+          <p:cNvSpPr>
+            <a:spLocks noGrp="1"/>
+          </p:cNvSpPr>
+          <p:nvPr>
+            <p:ph type="sldNum" sz="quarter" idx="5"/>
+          </p:nvPr>
+        </p:nvSpPr>
+        <p:spPr/>
+        <p:txBody>
+          <a:bodyPr/>
+          <a:lstStyle/>
+          <a:p>
+            <a:fld id="{DACBD60B-517C-4242-AE46-E1BD2D086542}" type="slidenum">
+              <a:rPr lang="fr-FR" smtClean="0"/>
+              <a:t>35</a:t>
+            </a:fld>
+            <a:endParaRPr lang="fr-FR"/>
+          </a:p>
+        </p:txBody>
+      </p:sp>
+    </p:spTree>
+    <p:extLst>
+      <p:ext uri="{BB962C8B-B14F-4D97-AF65-F5344CB8AC3E}">
+        <p14:creationId xmlns:p14="http://schemas.microsoft.com/office/powerpoint/2010/main" val="2398739311"/>
+      </p:ext>
+    </p:extLst>
+  </p:cSld>
+  <p:clrMapOvr>
+    <a:masterClrMapping/>
+  </p:clrMapOvr>
+</p:notes>
+</file>
+
+<file path=ppt/notesSlides/notesSlide15.xml><?xml version="1.0" encoding="utf-8"?>
+<p:notes xmlns:a="http://schemas.openxmlformats.org/drawingml/2006/main" xmlns:r="http://schemas.openxmlformats.org/officeDocument/2006/relationships" xmlns:p="http://schemas.openxmlformats.org/presentationml/2006/main">
+  <p:cSld>
+    <p:spTree>
+      <p:nvGrpSpPr>
+        <p:cNvPr id="1" name=""/>
+        <p:cNvGrpSpPr/>
+        <p:nvPr/>
+      </p:nvGrpSpPr>
+      <p:grpSpPr>
+        <a:xfrm>
+          <a:off x="0" y="0"/>
+          <a:ext cx="0" cy="0"/>
+          <a:chOff x="0" y="0"/>
+          <a:chExt cx="0" cy="0"/>
+        </a:xfrm>
+      </p:grpSpPr>
+      <p:sp>
+        <p:nvSpPr>
+          <p:cNvPr id="2" name="Slide Image Placeholder 1"/>
+          <p:cNvSpPr>
+            <a:spLocks noGrp="1" noRot="1" noChangeAspect="1"/>
+          </p:cNvSpPr>
+          <p:nvPr>
+            <p:ph type="sldImg"/>
+          </p:nvPr>
+        </p:nvSpPr>
+        <p:spPr/>
+      </p:sp>
+      <p:sp>
+        <p:nvSpPr>
+          <p:cNvPr id="3" name="Notes Placeholder 2"/>
+          <p:cNvSpPr>
+            <a:spLocks noGrp="1"/>
+          </p:cNvSpPr>
+          <p:nvPr>
+            <p:ph type="body" idx="1"/>
+          </p:nvPr>
+        </p:nvSpPr>
+        <p:spPr/>
+        <p:txBody>
+          <a:bodyPr/>
+          <a:lstStyle/>
+          <a:p>
+            <a:r>
+              <a:rPr lang="en-CA" dirty="0"/>
+              <a:t>On this slide I can just open GitHub and explore the different features and options</a:t>
+            </a:r>
+          </a:p>
+        </p:txBody>
+      </p:sp>
+      <p:sp>
+        <p:nvSpPr>
+          <p:cNvPr id="4" name="Slide Number Placeholder 3"/>
+          <p:cNvSpPr>
+            <a:spLocks noGrp="1"/>
+          </p:cNvSpPr>
+          <p:nvPr>
+            <p:ph type="sldNum" sz="quarter" idx="5"/>
+          </p:nvPr>
+        </p:nvSpPr>
+        <p:spPr/>
+        <p:txBody>
+          <a:bodyPr/>
+          <a:lstStyle/>
+          <a:p>
+            <a:fld id="{DACBD60B-517C-4242-AE46-E1BD2D086542}" type="slidenum">
+              <a:rPr lang="fr-FR" smtClean="0"/>
+              <a:t>43</a:t>
             </a:fld>
             <a:endParaRPr lang="fr-FR"/>
           </a:p>
@@ -4741,7 +5383,7 @@
           <a:p>
             <a:fld id="{DACBD60B-517C-4242-AE46-E1BD2D086542}" type="slidenum">
               <a:rPr lang="fr-FR" smtClean="0"/>
-              <a:t>11</a:t>
+              <a:t>12</a:t>
             </a:fld>
             <a:endParaRPr lang="fr-FR"/>
           </a:p>
@@ -4828,7 +5470,7 @@
           <a:p>
             <a:fld id="{DACBD60B-517C-4242-AE46-E1BD2D086542}" type="slidenum">
               <a:rPr lang="fr-FR" smtClean="0"/>
-              <a:t>14</a:t>
+              <a:t>15</a:t>
             </a:fld>
             <a:endParaRPr lang="fr-FR"/>
           </a:p>
@@ -4912,7 +5554,7 @@
           <a:p>
             <a:fld id="{DACBD60B-517C-4242-AE46-E1BD2D086542}" type="slidenum">
               <a:rPr lang="fr-FR" smtClean="0"/>
-              <a:t>15</a:t>
+              <a:t>16</a:t>
             </a:fld>
             <a:endParaRPr lang="fr-FR"/>
           </a:p>
@@ -5029,7 +5671,7 @@
           <a:p>
             <a:fld id="{DACBD60B-517C-4242-AE46-E1BD2D086542}" type="slidenum">
               <a:rPr lang="fr-FR" smtClean="0"/>
-              <a:t>18</a:t>
+              <a:t>19</a:t>
             </a:fld>
             <a:endParaRPr lang="fr-FR"/>
           </a:p>
@@ -5146,7 +5788,7 @@
           <a:p>
             <a:fld id="{DACBD60B-517C-4242-AE46-E1BD2D086542}" type="slidenum">
               <a:rPr lang="fr-FR" smtClean="0"/>
-              <a:t>19</a:t>
+              <a:t>20</a:t>
             </a:fld>
             <a:endParaRPr lang="fr-FR"/>
           </a:p>
@@ -5155,7 +5797,7 @@
     </p:spTree>
     <p:extLst>
       <p:ext uri="{BB962C8B-B14F-4D97-AF65-F5344CB8AC3E}">
-        <p14:creationId xmlns:p14="http://schemas.microsoft.com/office/powerpoint/2010/main" val="25833951"/>
+        <p14:creationId xmlns:p14="http://schemas.microsoft.com/office/powerpoint/2010/main" val="4190049230"/>
       </p:ext>
     </p:extLst>
   </p:cSld>
@@ -5214,7 +5856,7 @@
             </a:pPr>
             <a:r>
               <a:rPr lang="en-CA" dirty="0"/>
-              <a:t>Edit your text file with an error</a:t>
+              <a:t>Make a new git repo through desktop App</a:t>
             </a:r>
           </a:p>
           <a:p>
@@ -5223,7 +5865,7 @@
             </a:pPr>
             <a:r>
               <a:rPr lang="en-CA" dirty="0"/>
-              <a:t>Go to desktop app and reset the file to the previous commit</a:t>
+              <a:t>Add a file to the directory</a:t>
             </a:r>
           </a:p>
           <a:p>
@@ -5232,7 +5874,7 @@
             </a:pPr>
             <a:r>
               <a:rPr lang="en-CA" dirty="0"/>
-              <a:t>Repeat BUT this time commit it</a:t>
+              <a:t>Return to desktop app and track the file</a:t>
             </a:r>
           </a:p>
           <a:p>
@@ -5241,7 +5883,7 @@
             </a:pPr>
             <a:r>
               <a:rPr lang="en-CA" dirty="0"/>
-              <a:t>Revert changes of the commit</a:t>
+              <a:t>Create it, edit it, move it, remove it</a:t>
             </a:r>
           </a:p>
         </p:txBody>
@@ -5263,7 +5905,7 @@
           <a:p>
             <a:fld id="{DACBD60B-517C-4242-AE46-E1BD2D086542}" type="slidenum">
               <a:rPr lang="fr-FR" smtClean="0"/>
-              <a:t>20</a:t>
+              <a:t>21</a:t>
             </a:fld>
             <a:endParaRPr lang="fr-FR"/>
           </a:p>
@@ -5272,7 +5914,7 @@
     </p:spTree>
     <p:extLst>
       <p:ext uri="{BB962C8B-B14F-4D97-AF65-F5344CB8AC3E}">
-        <p14:creationId xmlns:p14="http://schemas.microsoft.com/office/powerpoint/2010/main" val="4220277172"/>
+        <p14:creationId xmlns:p14="http://schemas.microsoft.com/office/powerpoint/2010/main" val="25833951"/>
       </p:ext>
     </p:extLst>
   </p:cSld>
@@ -5326,9 +5968,39 @@
           <a:bodyPr/>
           <a:lstStyle/>
           <a:p>
-            <a:r>
-              <a:rPr lang="en-CA" dirty="0"/>
-              <a:t>Create new branch and make changes</a:t>
+            <a:pPr marL="228600" indent="-228600">
+              <a:buAutoNum type="arabicPeriod"/>
+            </a:pPr>
+            <a:r>
+              <a:rPr lang="en-CA" dirty="0"/>
+              <a:t>Make a new git repo through desktop App</a:t>
+            </a:r>
+          </a:p>
+          <a:p>
+            <a:pPr marL="228600" indent="-228600">
+              <a:buAutoNum type="arabicPeriod"/>
+            </a:pPr>
+            <a:r>
+              <a:rPr lang="en-CA" dirty="0"/>
+              <a:t>Add a file to the directory</a:t>
+            </a:r>
+          </a:p>
+          <a:p>
+            <a:pPr marL="228600" indent="-228600">
+              <a:buAutoNum type="arabicPeriod"/>
+            </a:pPr>
+            <a:r>
+              <a:rPr lang="en-CA" dirty="0"/>
+              <a:t>Return to desktop app and track the file</a:t>
+            </a:r>
+          </a:p>
+          <a:p>
+            <a:pPr marL="228600" indent="-228600">
+              <a:buAutoNum type="arabicPeriod"/>
+            </a:pPr>
+            <a:r>
+              <a:rPr lang="en-CA" dirty="0"/>
+              <a:t>Create it, edit it, move it, remove it</a:t>
             </a:r>
           </a:p>
         </p:txBody>
@@ -5350,7 +6022,7 @@
           <a:p>
             <a:fld id="{DACBD60B-517C-4242-AE46-E1BD2D086542}" type="slidenum">
               <a:rPr lang="fr-FR" smtClean="0"/>
-              <a:t>25</a:t>
+              <a:t>22</a:t>
             </a:fld>
             <a:endParaRPr lang="fr-FR"/>
           </a:p>
@@ -5359,7 +6031,7 @@
     </p:spTree>
     <p:extLst>
       <p:ext uri="{BB962C8B-B14F-4D97-AF65-F5344CB8AC3E}">
-        <p14:creationId xmlns:p14="http://schemas.microsoft.com/office/powerpoint/2010/main" val="1675639307"/>
+        <p14:creationId xmlns:p14="http://schemas.microsoft.com/office/powerpoint/2010/main" val="3063011709"/>
       </p:ext>
     </p:extLst>
   </p:cSld>
@@ -9856,6 +10528,525 @@
           <p:cNvPr id="2" name="Text Placeholder 1">
             <a:extLst>
               <a:ext uri="{FF2B5EF4-FFF2-40B4-BE49-F238E27FC236}">
+                <a16:creationId xmlns:a16="http://schemas.microsoft.com/office/drawing/2014/main" id="{4A4CAD59-1F6A-FED7-6EE0-E9E97EE35FCD}"/>
+              </a:ext>
+            </a:extLst>
+          </p:cNvPr>
+          <p:cNvSpPr>
+            <a:spLocks noGrp="1"/>
+          </p:cNvSpPr>
+          <p:nvPr>
+            <p:ph type="body" sz="quarter" idx="10"/>
+          </p:nvPr>
+        </p:nvSpPr>
+        <p:spPr>
+          <a:xfrm>
+            <a:off x="242372" y="1454228"/>
+            <a:ext cx="8658743" cy="430328"/>
+          </a:xfrm>
+        </p:spPr>
+        <p:txBody>
+          <a:bodyPr>
+            <a:normAutofit fontScale="92500" lnSpcReduction="10000"/>
+          </a:bodyPr>
+          <a:lstStyle/>
+          <a:p>
+            <a:pPr marL="0" indent="0" algn="ctr">
+              <a:buNone/>
+            </a:pPr>
+            <a:r>
+              <a:rPr lang="en-CA" b="1" dirty="0"/>
+              <a:t>Git 			vs.			 GitHub</a:t>
+            </a:r>
+          </a:p>
+        </p:txBody>
+      </p:sp>
+      <p:sp>
+        <p:nvSpPr>
+          <p:cNvPr id="3" name="Espace réservé du contenu 2">
+            <a:extLst>
+              <a:ext uri="{FF2B5EF4-FFF2-40B4-BE49-F238E27FC236}">
+                <a16:creationId xmlns:a16="http://schemas.microsoft.com/office/drawing/2014/main" id="{CAE263CC-C949-1C99-4A6D-072B34B0459A}"/>
+              </a:ext>
+            </a:extLst>
+          </p:cNvPr>
+          <p:cNvSpPr txBox="1">
+            <a:spLocks/>
+          </p:cNvSpPr>
+          <p:nvPr/>
+        </p:nvSpPr>
+        <p:spPr>
+          <a:xfrm>
+            <a:off x="628650" y="1825627"/>
+            <a:ext cx="3886200" cy="4351335"/>
+          </a:xfrm>
+          <a:prstGeom prst="rect">
+            <a:avLst/>
+          </a:prstGeom>
+        </p:spPr>
+        <p:txBody>
+          <a:bodyPr/>
+          <a:lstStyle>
+            <a:lvl1pPr marL="228540" indent="-228540" algn="l" defTabSz="914175" rtl="0" eaLnBrk="1" latinLnBrk="0" hangingPunct="1">
+              <a:lnSpc>
+                <a:spcPct val="90000"/>
+              </a:lnSpc>
+              <a:spcBef>
+                <a:spcPts val="998"/>
+              </a:spcBef>
+              <a:buFont typeface="Arial" panose="020B0604020202020204" pitchFamily="34" charset="0"/>
+              <a:buChar char="•"/>
+              <a:defRPr sz="2798" kern="1200">
+                <a:solidFill>
+                  <a:schemeClr val="tx1"/>
+                </a:solidFill>
+                <a:latin typeface="+mn-lt"/>
+                <a:ea typeface="+mn-ea"/>
+                <a:cs typeface="+mn-cs"/>
+              </a:defRPr>
+            </a:lvl1pPr>
+            <a:lvl2pPr marL="685628" indent="-228540" algn="l" defTabSz="914175" rtl="0" eaLnBrk="1" latinLnBrk="0" hangingPunct="1">
+              <a:lnSpc>
+                <a:spcPct val="90000"/>
+              </a:lnSpc>
+              <a:spcBef>
+                <a:spcPts val="503"/>
+              </a:spcBef>
+              <a:buFont typeface="Arial" panose="020B0604020202020204" pitchFamily="34" charset="0"/>
+              <a:buChar char="•"/>
+              <a:defRPr sz="2400" kern="1200">
+                <a:solidFill>
+                  <a:schemeClr val="tx1"/>
+                </a:solidFill>
+                <a:latin typeface="+mn-lt"/>
+                <a:ea typeface="+mn-ea"/>
+                <a:cs typeface="+mn-cs"/>
+              </a:defRPr>
+            </a:lvl2pPr>
+            <a:lvl3pPr marL="1142715" indent="-228540" algn="l" defTabSz="914175" rtl="0" eaLnBrk="1" latinLnBrk="0" hangingPunct="1">
+              <a:lnSpc>
+                <a:spcPct val="90000"/>
+              </a:lnSpc>
+              <a:spcBef>
+                <a:spcPts val="503"/>
+              </a:spcBef>
+              <a:buFont typeface="Arial" panose="020B0604020202020204" pitchFamily="34" charset="0"/>
+              <a:buChar char="•"/>
+              <a:defRPr sz="2002" kern="1200">
+                <a:solidFill>
+                  <a:schemeClr val="tx1"/>
+                </a:solidFill>
+                <a:latin typeface="+mn-lt"/>
+                <a:ea typeface="+mn-ea"/>
+                <a:cs typeface="+mn-cs"/>
+              </a:defRPr>
+            </a:lvl3pPr>
+            <a:lvl4pPr marL="1599803" indent="-228540" algn="l" defTabSz="914175" rtl="0" eaLnBrk="1" latinLnBrk="0" hangingPunct="1">
+              <a:lnSpc>
+                <a:spcPct val="90000"/>
+              </a:lnSpc>
+              <a:spcBef>
+                <a:spcPts val="503"/>
+              </a:spcBef>
+              <a:buFont typeface="Arial" panose="020B0604020202020204" pitchFamily="34" charset="0"/>
+              <a:buChar char="•"/>
+              <a:defRPr sz="1800" kern="1200">
+                <a:solidFill>
+                  <a:schemeClr val="tx1"/>
+                </a:solidFill>
+                <a:latin typeface="+mn-lt"/>
+                <a:ea typeface="+mn-ea"/>
+                <a:cs typeface="+mn-cs"/>
+              </a:defRPr>
+            </a:lvl4pPr>
+            <a:lvl5pPr marL="2056883" indent="-228540" algn="l" defTabSz="914175" rtl="0" eaLnBrk="1" latinLnBrk="0" hangingPunct="1">
+              <a:lnSpc>
+                <a:spcPct val="90000"/>
+              </a:lnSpc>
+              <a:spcBef>
+                <a:spcPts val="503"/>
+              </a:spcBef>
+              <a:buFont typeface="Arial" panose="020B0604020202020204" pitchFamily="34" charset="0"/>
+              <a:buChar char="•"/>
+              <a:defRPr sz="1800" kern="1200">
+                <a:solidFill>
+                  <a:schemeClr val="tx1"/>
+                </a:solidFill>
+                <a:latin typeface="+mn-lt"/>
+                <a:ea typeface="+mn-ea"/>
+                <a:cs typeface="+mn-cs"/>
+              </a:defRPr>
+            </a:lvl5pPr>
+            <a:lvl6pPr marL="2513970" indent="-228540" algn="l" defTabSz="914175" rtl="0" eaLnBrk="1" latinLnBrk="0" hangingPunct="1">
+              <a:lnSpc>
+                <a:spcPct val="90000"/>
+              </a:lnSpc>
+              <a:spcBef>
+                <a:spcPts val="503"/>
+              </a:spcBef>
+              <a:buFont typeface="Arial" panose="020B0604020202020204" pitchFamily="34" charset="0"/>
+              <a:buChar char="•"/>
+              <a:defRPr sz="1800" kern="1200">
+                <a:solidFill>
+                  <a:schemeClr val="tx1"/>
+                </a:solidFill>
+                <a:latin typeface="+mn-lt"/>
+                <a:ea typeface="+mn-ea"/>
+                <a:cs typeface="+mn-cs"/>
+              </a:defRPr>
+            </a:lvl6pPr>
+            <a:lvl7pPr marL="2971058" indent="-228540" algn="l" defTabSz="914175" rtl="0" eaLnBrk="1" latinLnBrk="0" hangingPunct="1">
+              <a:lnSpc>
+                <a:spcPct val="90000"/>
+              </a:lnSpc>
+              <a:spcBef>
+                <a:spcPts val="503"/>
+              </a:spcBef>
+              <a:buFont typeface="Arial" panose="020B0604020202020204" pitchFamily="34" charset="0"/>
+              <a:buChar char="•"/>
+              <a:defRPr sz="1800" kern="1200">
+                <a:solidFill>
+                  <a:schemeClr val="tx1"/>
+                </a:solidFill>
+                <a:latin typeface="+mn-lt"/>
+                <a:ea typeface="+mn-ea"/>
+                <a:cs typeface="+mn-cs"/>
+              </a:defRPr>
+            </a:lvl7pPr>
+            <a:lvl8pPr marL="3428145" indent="-228540" algn="l" defTabSz="914175" rtl="0" eaLnBrk="1" latinLnBrk="0" hangingPunct="1">
+              <a:lnSpc>
+                <a:spcPct val="90000"/>
+              </a:lnSpc>
+              <a:spcBef>
+                <a:spcPts val="503"/>
+              </a:spcBef>
+              <a:buFont typeface="Arial" panose="020B0604020202020204" pitchFamily="34" charset="0"/>
+              <a:buChar char="•"/>
+              <a:defRPr sz="1800" kern="1200">
+                <a:solidFill>
+                  <a:schemeClr val="tx1"/>
+                </a:solidFill>
+                <a:latin typeface="+mn-lt"/>
+                <a:ea typeface="+mn-ea"/>
+                <a:cs typeface="+mn-cs"/>
+              </a:defRPr>
+            </a:lvl8pPr>
+            <a:lvl9pPr marL="3885225" indent="-228540" algn="l" defTabSz="914175" rtl="0" eaLnBrk="1" latinLnBrk="0" hangingPunct="1">
+              <a:lnSpc>
+                <a:spcPct val="90000"/>
+              </a:lnSpc>
+              <a:spcBef>
+                <a:spcPts val="503"/>
+              </a:spcBef>
+              <a:buFont typeface="Arial" panose="020B0604020202020204" pitchFamily="34" charset="0"/>
+              <a:buChar char="•"/>
+              <a:defRPr sz="1800" kern="1200">
+                <a:solidFill>
+                  <a:schemeClr val="tx1"/>
+                </a:solidFill>
+                <a:latin typeface="+mn-lt"/>
+                <a:ea typeface="+mn-ea"/>
+                <a:cs typeface="+mn-cs"/>
+              </a:defRPr>
+            </a:lvl9pPr>
+          </a:lstStyle>
+          <a:p>
+            <a:endParaRPr lang="en-CA"/>
+          </a:p>
+          <a:p>
+            <a:r>
+              <a:rPr lang="en-CA"/>
+              <a:t>A version control system</a:t>
+            </a:r>
+          </a:p>
+          <a:p>
+            <a:endParaRPr lang="en-CA"/>
+          </a:p>
+          <a:p>
+            <a:r>
+              <a:rPr lang="en-CA"/>
+              <a:t>Works locally and remotely</a:t>
+            </a:r>
+          </a:p>
+          <a:p>
+            <a:endParaRPr lang="en-CA"/>
+          </a:p>
+          <a:p>
+            <a:r>
+              <a:rPr lang="en-CA"/>
+              <a:t>Is open-source</a:t>
+            </a:r>
+          </a:p>
+          <a:p>
+            <a:pPr marL="0" indent="0">
+              <a:buFont typeface="Arial" panose="020B0604020202020204" pitchFamily="34" charset="0"/>
+              <a:buNone/>
+            </a:pPr>
+            <a:endParaRPr lang="en-CA" dirty="0"/>
+          </a:p>
+        </p:txBody>
+      </p:sp>
+      <p:sp>
+        <p:nvSpPr>
+          <p:cNvPr id="4" name="Espace réservé du contenu 3">
+            <a:extLst>
+              <a:ext uri="{FF2B5EF4-FFF2-40B4-BE49-F238E27FC236}">
+                <a16:creationId xmlns:a16="http://schemas.microsoft.com/office/drawing/2014/main" id="{2794B09C-4A6C-6F4A-182A-60D6A6403924}"/>
+              </a:ext>
+            </a:extLst>
+          </p:cNvPr>
+          <p:cNvSpPr txBox="1">
+            <a:spLocks/>
+          </p:cNvSpPr>
+          <p:nvPr/>
+        </p:nvSpPr>
+        <p:spPr>
+          <a:xfrm>
+            <a:off x="4629150" y="1825627"/>
+            <a:ext cx="3886200" cy="4351335"/>
+          </a:xfrm>
+          <a:prstGeom prst="rect">
+            <a:avLst/>
+          </a:prstGeom>
+        </p:spPr>
+        <p:txBody>
+          <a:bodyPr/>
+          <a:lstStyle>
+            <a:lvl1pPr marL="228540" indent="-228540" algn="l" defTabSz="914175" rtl="0" eaLnBrk="1" latinLnBrk="0" hangingPunct="1">
+              <a:lnSpc>
+                <a:spcPct val="90000"/>
+              </a:lnSpc>
+              <a:spcBef>
+                <a:spcPts val="998"/>
+              </a:spcBef>
+              <a:buFont typeface="Arial" panose="020B0604020202020204" pitchFamily="34" charset="0"/>
+              <a:buChar char="•"/>
+              <a:defRPr sz="2798" kern="1200">
+                <a:solidFill>
+                  <a:schemeClr val="tx1"/>
+                </a:solidFill>
+                <a:latin typeface="+mn-lt"/>
+                <a:ea typeface="+mn-ea"/>
+                <a:cs typeface="+mn-cs"/>
+              </a:defRPr>
+            </a:lvl1pPr>
+            <a:lvl2pPr marL="685628" indent="-228540" algn="l" defTabSz="914175" rtl="0" eaLnBrk="1" latinLnBrk="0" hangingPunct="1">
+              <a:lnSpc>
+                <a:spcPct val="90000"/>
+              </a:lnSpc>
+              <a:spcBef>
+                <a:spcPts val="503"/>
+              </a:spcBef>
+              <a:buFont typeface="Arial" panose="020B0604020202020204" pitchFamily="34" charset="0"/>
+              <a:buChar char="•"/>
+              <a:defRPr sz="2400" kern="1200">
+                <a:solidFill>
+                  <a:schemeClr val="tx1"/>
+                </a:solidFill>
+                <a:latin typeface="+mn-lt"/>
+                <a:ea typeface="+mn-ea"/>
+                <a:cs typeface="+mn-cs"/>
+              </a:defRPr>
+            </a:lvl2pPr>
+            <a:lvl3pPr marL="1142715" indent="-228540" algn="l" defTabSz="914175" rtl="0" eaLnBrk="1" latinLnBrk="0" hangingPunct="1">
+              <a:lnSpc>
+                <a:spcPct val="90000"/>
+              </a:lnSpc>
+              <a:spcBef>
+                <a:spcPts val="503"/>
+              </a:spcBef>
+              <a:buFont typeface="Arial" panose="020B0604020202020204" pitchFamily="34" charset="0"/>
+              <a:buChar char="•"/>
+              <a:defRPr sz="2002" kern="1200">
+                <a:solidFill>
+                  <a:schemeClr val="tx1"/>
+                </a:solidFill>
+                <a:latin typeface="+mn-lt"/>
+                <a:ea typeface="+mn-ea"/>
+                <a:cs typeface="+mn-cs"/>
+              </a:defRPr>
+            </a:lvl3pPr>
+            <a:lvl4pPr marL="1599803" indent="-228540" algn="l" defTabSz="914175" rtl="0" eaLnBrk="1" latinLnBrk="0" hangingPunct="1">
+              <a:lnSpc>
+                <a:spcPct val="90000"/>
+              </a:lnSpc>
+              <a:spcBef>
+                <a:spcPts val="503"/>
+              </a:spcBef>
+              <a:buFont typeface="Arial" panose="020B0604020202020204" pitchFamily="34" charset="0"/>
+              <a:buChar char="•"/>
+              <a:defRPr sz="1800" kern="1200">
+                <a:solidFill>
+                  <a:schemeClr val="tx1"/>
+                </a:solidFill>
+                <a:latin typeface="+mn-lt"/>
+                <a:ea typeface="+mn-ea"/>
+                <a:cs typeface="+mn-cs"/>
+              </a:defRPr>
+            </a:lvl4pPr>
+            <a:lvl5pPr marL="2056883" indent="-228540" algn="l" defTabSz="914175" rtl="0" eaLnBrk="1" latinLnBrk="0" hangingPunct="1">
+              <a:lnSpc>
+                <a:spcPct val="90000"/>
+              </a:lnSpc>
+              <a:spcBef>
+                <a:spcPts val="503"/>
+              </a:spcBef>
+              <a:buFont typeface="Arial" panose="020B0604020202020204" pitchFamily="34" charset="0"/>
+              <a:buChar char="•"/>
+              <a:defRPr sz="1800" kern="1200">
+                <a:solidFill>
+                  <a:schemeClr val="tx1"/>
+                </a:solidFill>
+                <a:latin typeface="+mn-lt"/>
+                <a:ea typeface="+mn-ea"/>
+                <a:cs typeface="+mn-cs"/>
+              </a:defRPr>
+            </a:lvl5pPr>
+            <a:lvl6pPr marL="2513970" indent="-228540" algn="l" defTabSz="914175" rtl="0" eaLnBrk="1" latinLnBrk="0" hangingPunct="1">
+              <a:lnSpc>
+                <a:spcPct val="90000"/>
+              </a:lnSpc>
+              <a:spcBef>
+                <a:spcPts val="503"/>
+              </a:spcBef>
+              <a:buFont typeface="Arial" panose="020B0604020202020204" pitchFamily="34" charset="0"/>
+              <a:buChar char="•"/>
+              <a:defRPr sz="1800" kern="1200">
+                <a:solidFill>
+                  <a:schemeClr val="tx1"/>
+                </a:solidFill>
+                <a:latin typeface="+mn-lt"/>
+                <a:ea typeface="+mn-ea"/>
+                <a:cs typeface="+mn-cs"/>
+              </a:defRPr>
+            </a:lvl6pPr>
+            <a:lvl7pPr marL="2971058" indent="-228540" algn="l" defTabSz="914175" rtl="0" eaLnBrk="1" latinLnBrk="0" hangingPunct="1">
+              <a:lnSpc>
+                <a:spcPct val="90000"/>
+              </a:lnSpc>
+              <a:spcBef>
+                <a:spcPts val="503"/>
+              </a:spcBef>
+              <a:buFont typeface="Arial" panose="020B0604020202020204" pitchFamily="34" charset="0"/>
+              <a:buChar char="•"/>
+              <a:defRPr sz="1800" kern="1200">
+                <a:solidFill>
+                  <a:schemeClr val="tx1"/>
+                </a:solidFill>
+                <a:latin typeface="+mn-lt"/>
+                <a:ea typeface="+mn-ea"/>
+                <a:cs typeface="+mn-cs"/>
+              </a:defRPr>
+            </a:lvl7pPr>
+            <a:lvl8pPr marL="3428145" indent="-228540" algn="l" defTabSz="914175" rtl="0" eaLnBrk="1" latinLnBrk="0" hangingPunct="1">
+              <a:lnSpc>
+                <a:spcPct val="90000"/>
+              </a:lnSpc>
+              <a:spcBef>
+                <a:spcPts val="503"/>
+              </a:spcBef>
+              <a:buFont typeface="Arial" panose="020B0604020202020204" pitchFamily="34" charset="0"/>
+              <a:buChar char="•"/>
+              <a:defRPr sz="1800" kern="1200">
+                <a:solidFill>
+                  <a:schemeClr val="tx1"/>
+                </a:solidFill>
+                <a:latin typeface="+mn-lt"/>
+                <a:ea typeface="+mn-ea"/>
+                <a:cs typeface="+mn-cs"/>
+              </a:defRPr>
+            </a:lvl8pPr>
+            <a:lvl9pPr marL="3885225" indent="-228540" algn="l" defTabSz="914175" rtl="0" eaLnBrk="1" latinLnBrk="0" hangingPunct="1">
+              <a:lnSpc>
+                <a:spcPct val="90000"/>
+              </a:lnSpc>
+              <a:spcBef>
+                <a:spcPts val="503"/>
+              </a:spcBef>
+              <a:buFont typeface="Arial" panose="020B0604020202020204" pitchFamily="34" charset="0"/>
+              <a:buChar char="•"/>
+              <a:defRPr sz="1800" kern="1200">
+                <a:solidFill>
+                  <a:schemeClr val="tx1"/>
+                </a:solidFill>
+                <a:latin typeface="+mn-lt"/>
+                <a:ea typeface="+mn-ea"/>
+                <a:cs typeface="+mn-cs"/>
+              </a:defRPr>
+            </a:lvl9pPr>
+          </a:lstStyle>
+          <a:p>
+            <a:endParaRPr lang="en-CA" dirty="0"/>
+          </a:p>
+          <a:p>
+            <a:r>
+              <a:rPr lang="en-CA" dirty="0"/>
+              <a:t>A server that </a:t>
+            </a:r>
+            <a:r>
+              <a:rPr lang="en-CA" b="1" dirty="0"/>
+              <a:t>hosts </a:t>
+            </a:r>
+            <a:r>
+              <a:rPr lang="en-CA" dirty="0"/>
+              <a:t>Git repositories</a:t>
+            </a:r>
+          </a:p>
+          <a:p>
+            <a:endParaRPr lang="en-CA" dirty="0"/>
+          </a:p>
+          <a:p>
+            <a:r>
+              <a:rPr lang="en-CA" dirty="0"/>
+              <a:t>Works solely as a cloud-based service</a:t>
+            </a:r>
+          </a:p>
+          <a:p>
+            <a:endParaRPr lang="en-CA" dirty="0"/>
+          </a:p>
+          <a:p>
+            <a:r>
+              <a:rPr lang="en-CA" dirty="0"/>
+              <a:t>Owned by Microsoft</a:t>
+            </a:r>
+          </a:p>
+        </p:txBody>
+      </p:sp>
+    </p:spTree>
+    <p:extLst>
+      <p:ext uri="{BB962C8B-B14F-4D97-AF65-F5344CB8AC3E}">
+        <p14:creationId xmlns:p14="http://schemas.microsoft.com/office/powerpoint/2010/main" val="3449938012"/>
+      </p:ext>
+    </p:extLst>
+  </p:cSld>
+  <p:clrMapOvr>
+    <a:masterClrMapping/>
+  </p:clrMapOvr>
+</p:sld>
+</file>
+
+<file path=ppt/slides/slide11.xml><?xml version="1.0" encoding="utf-8"?>
+<p:sld xmlns:a="http://schemas.openxmlformats.org/drawingml/2006/main" xmlns:r="http://schemas.openxmlformats.org/officeDocument/2006/relationships" xmlns:p="http://schemas.openxmlformats.org/presentationml/2006/main">
+  <p:cSld>
+    <p:spTree>
+      <p:nvGrpSpPr>
+        <p:cNvPr id="1" name=""/>
+        <p:cNvGrpSpPr/>
+        <p:nvPr/>
+      </p:nvGrpSpPr>
+      <p:grpSpPr>
+        <a:xfrm>
+          <a:off x="0" y="0"/>
+          <a:ext cx="0" cy="0"/>
+          <a:chOff x="0" y="0"/>
+          <a:chExt cx="0" cy="0"/>
+        </a:xfrm>
+      </p:grpSpPr>
+      <p:sp>
+        <p:nvSpPr>
+          <p:cNvPr id="2" name="Text Placeholder 1">
+            <a:extLst>
+              <a:ext uri="{FF2B5EF4-FFF2-40B4-BE49-F238E27FC236}">
                 <a16:creationId xmlns:a16="http://schemas.microsoft.com/office/drawing/2014/main" id="{BC71840A-47BB-D406-2B18-5DF99FE82427}"/>
               </a:ext>
             </a:extLst>
@@ -9932,7 +11123,7 @@
 </p:sld>
 </file>
 
-<file path=ppt/slides/slide11.xml><?xml version="1.0" encoding="utf-8"?>
+<file path=ppt/slides/slide12.xml><?xml version="1.0" encoding="utf-8"?>
 <p:sld xmlns:a="http://schemas.openxmlformats.org/drawingml/2006/main" xmlns:r="http://schemas.openxmlformats.org/officeDocument/2006/relationships" xmlns:p="http://schemas.openxmlformats.org/presentationml/2006/main">
   <p:cSld>
     <p:spTree>
@@ -11319,7 +12510,7 @@
 </p:sld>
 </file>
 
-<file path=ppt/slides/slide12.xml><?xml version="1.0" encoding="utf-8"?>
+<file path=ppt/slides/slide13.xml><?xml version="1.0" encoding="utf-8"?>
 <p:sld xmlns:a="http://schemas.openxmlformats.org/drawingml/2006/main" xmlns:r="http://schemas.openxmlformats.org/officeDocument/2006/relationships" xmlns:p="http://schemas.openxmlformats.org/presentationml/2006/main">
   <p:cSld>
     <p:spTree>
@@ -11421,7 +12612,7 @@
 </p:sld>
 </file>
 
-<file path=ppt/slides/slide13.xml><?xml version="1.0" encoding="utf-8"?>
+<file path=ppt/slides/slide14.xml><?xml version="1.0" encoding="utf-8"?>
 <p:sld xmlns:a="http://schemas.openxmlformats.org/drawingml/2006/main" xmlns:r="http://schemas.openxmlformats.org/officeDocument/2006/relationships" xmlns:p="http://schemas.openxmlformats.org/presentationml/2006/main">
   <p:cSld>
     <p:spTree>
@@ -11520,7 +12711,7 @@
 </p:sld>
 </file>
 
-<file path=ppt/slides/slide14.xml><?xml version="1.0" encoding="utf-8"?>
+<file path=ppt/slides/slide15.xml><?xml version="1.0" encoding="utf-8"?>
 <p:sld xmlns:a="http://schemas.openxmlformats.org/drawingml/2006/main" xmlns:r="http://schemas.openxmlformats.org/officeDocument/2006/relationships" xmlns:p="http://schemas.openxmlformats.org/presentationml/2006/main">
   <p:cSld>
     <p:spTree>
@@ -11715,7 +12906,7 @@
 </p:sld>
 </file>
 
-<file path=ppt/slides/slide15.xml><?xml version="1.0" encoding="utf-8"?>
+<file path=ppt/slides/slide16.xml><?xml version="1.0" encoding="utf-8"?>
 <p:sld xmlns:a="http://schemas.openxmlformats.org/drawingml/2006/main" xmlns:r="http://schemas.openxmlformats.org/officeDocument/2006/relationships" xmlns:p="http://schemas.openxmlformats.org/presentationml/2006/main">
   <p:cSld>
     <p:spTree>
@@ -11846,7 +13037,7 @@
 </p:sld>
 </file>
 
-<file path=ppt/slides/slide16.xml><?xml version="1.0" encoding="utf-8"?>
+<file path=ppt/slides/slide17.xml><?xml version="1.0" encoding="utf-8"?>
 <p:sld xmlns:a="http://schemas.openxmlformats.org/drawingml/2006/main" xmlns:r="http://schemas.openxmlformats.org/officeDocument/2006/relationships" xmlns:p="http://schemas.openxmlformats.org/presentationml/2006/main">
   <p:cSld>
     <p:spTree>
@@ -12140,7 +13331,7 @@
 </p:sld>
 </file>
 
-<file path=ppt/slides/slide17.xml><?xml version="1.0" encoding="utf-8"?>
+<file path=ppt/slides/slide18.xml><?xml version="1.0" encoding="utf-8"?>
 <p:sld xmlns:a="http://schemas.openxmlformats.org/drawingml/2006/main" xmlns:r="http://schemas.openxmlformats.org/officeDocument/2006/relationships" xmlns:p="http://schemas.openxmlformats.org/presentationml/2006/main">
   <p:cSld>
     <p:spTree>
@@ -12189,97 +13380,6 @@
     <p:extLst>
       <p:ext uri="{BB962C8B-B14F-4D97-AF65-F5344CB8AC3E}">
         <p14:creationId xmlns:p14="http://schemas.microsoft.com/office/powerpoint/2010/main" val="1442157030"/>
-      </p:ext>
-    </p:extLst>
-  </p:cSld>
-  <p:clrMapOvr>
-    <a:masterClrMapping/>
-  </p:clrMapOvr>
-</p:sld>
-</file>
-
-<file path=ppt/slides/slide18.xml><?xml version="1.0" encoding="utf-8"?>
-<p:sld xmlns:a="http://schemas.openxmlformats.org/drawingml/2006/main" xmlns:r="http://schemas.openxmlformats.org/officeDocument/2006/relationships" xmlns:p="http://schemas.openxmlformats.org/presentationml/2006/main">
-  <p:cSld>
-    <p:spTree>
-      <p:nvGrpSpPr>
-        <p:cNvPr id="1" name=""/>
-        <p:cNvGrpSpPr/>
-        <p:nvPr/>
-      </p:nvGrpSpPr>
-      <p:grpSpPr>
-        <a:xfrm>
-          <a:off x="0" y="0"/>
-          <a:ext cx="0" cy="0"/>
-          <a:chOff x="0" y="0"/>
-          <a:chExt cx="0" cy="0"/>
-        </a:xfrm>
-      </p:grpSpPr>
-      <p:sp>
-        <p:nvSpPr>
-          <p:cNvPr id="2" name="Text Placeholder 1">
-            <a:extLst>
-              <a:ext uri="{FF2B5EF4-FFF2-40B4-BE49-F238E27FC236}">
-                <a16:creationId xmlns:a16="http://schemas.microsoft.com/office/drawing/2014/main" id="{F30F071A-0450-8F6E-F28D-8124D7A90523}"/>
-              </a:ext>
-            </a:extLst>
-          </p:cNvPr>
-          <p:cNvSpPr>
-            <a:spLocks noGrp="1"/>
-          </p:cNvSpPr>
-          <p:nvPr>
-            <p:ph type="body" sz="quarter" idx="10"/>
-          </p:nvPr>
-        </p:nvSpPr>
-        <p:spPr/>
-        <p:txBody>
-          <a:bodyPr/>
-          <a:lstStyle/>
-          <a:p>
-            <a:pPr marL="0" indent="0">
-              <a:buNone/>
-            </a:pPr>
-            <a:endParaRPr lang="en-CA" b="1" dirty="0"/>
-          </a:p>
-          <a:p>
-            <a:pPr marL="0" indent="0">
-              <a:buNone/>
-            </a:pPr>
-            <a:endParaRPr lang="en-CA" b="1" dirty="0"/>
-          </a:p>
-          <a:p>
-            <a:pPr marL="0" indent="0">
-              <a:buNone/>
-            </a:pPr>
-            <a:endParaRPr lang="en-CA" b="1" dirty="0"/>
-          </a:p>
-          <a:p>
-            <a:pPr marL="0" indent="0">
-              <a:buNone/>
-            </a:pPr>
-            <a:endParaRPr lang="en-CA" b="1" dirty="0"/>
-          </a:p>
-          <a:p>
-            <a:pPr marL="0" indent="0">
-              <a:buNone/>
-            </a:pPr>
-            <a:r>
-              <a:rPr lang="en-CA" b="1" dirty="0"/>
-              <a:t>Activity #0 – Initialize a Git Repository</a:t>
-            </a:r>
-          </a:p>
-          <a:p>
-            <a:pPr marL="0" indent="0">
-              <a:buNone/>
-            </a:pPr>
-            <a:endParaRPr lang="en-CA" b="1" dirty="0"/>
-          </a:p>
-        </p:txBody>
-      </p:sp>
-    </p:spTree>
-    <p:extLst>
-      <p:ext uri="{BB962C8B-B14F-4D97-AF65-F5344CB8AC3E}">
-        <p14:creationId xmlns:p14="http://schemas.microsoft.com/office/powerpoint/2010/main" val="4084145476"/>
       </p:ext>
     </p:extLst>
   </p:cSld>
@@ -12356,15 +13456,21 @@
             </a:pPr>
             <a:r>
               <a:rPr lang="en-CA" b="1" dirty="0"/>
-              <a:t>Activity #1 – Create and track a Text File with Git</a:t>
-            </a:r>
+              <a:t>Activity #0 – Initialize a Git Repository</a:t>
+            </a:r>
+          </a:p>
+          <a:p>
+            <a:pPr marL="0" indent="0">
+              <a:buNone/>
+            </a:pPr>
+            <a:endParaRPr lang="en-CA" b="1" dirty="0"/>
           </a:p>
         </p:txBody>
       </p:sp>
     </p:spTree>
     <p:extLst>
       <p:ext uri="{BB962C8B-B14F-4D97-AF65-F5344CB8AC3E}">
-        <p14:creationId xmlns:p14="http://schemas.microsoft.com/office/powerpoint/2010/main" val="634442937"/>
+        <p14:creationId xmlns:p14="http://schemas.microsoft.com/office/powerpoint/2010/main" val="4084145476"/>
       </p:ext>
     </p:extLst>
   </p:cSld>
@@ -12445,14 +13551,118 @@
             <a:pPr marL="0" indent="0">
               <a:buNone/>
             </a:pPr>
+            <a:r>
+              <a:rPr lang="en-CA" b="1" dirty="0"/>
+              <a:t>Activity #0 – Initialize a Git Repository</a:t>
+            </a:r>
+          </a:p>
+          <a:p>
+            <a:pPr marL="0" indent="0">
+              <a:buNone/>
+            </a:pPr>
             <a:endParaRPr lang="en-CA" b="1" dirty="0"/>
           </a:p>
           <a:p>
+            <a:pPr marL="514350" indent="-514350">
+              <a:buFont typeface="+mj-lt"/>
+              <a:buAutoNum type="arabicPeriod"/>
+            </a:pPr>
+            <a:r>
+              <a:rPr lang="en-CA" dirty="0"/>
+              <a:t>Create a new Git Repository (File </a:t>
+            </a:r>
+            <a:r>
+              <a:rPr lang="en-CA" dirty="0">
+                <a:sym typeface="Wingdings" panose="05000000000000000000" pitchFamily="2" charset="2"/>
+              </a:rPr>
+              <a:t> new repo OR “create a new repository on your hard drive)</a:t>
+            </a:r>
+          </a:p>
+          <a:p>
+            <a:pPr marL="514350" indent="-514350">
+              <a:buFont typeface="+mj-lt"/>
+              <a:buAutoNum type="arabicPeriod"/>
+            </a:pPr>
+            <a:endParaRPr lang="en-CA" dirty="0">
+              <a:sym typeface="Wingdings" panose="05000000000000000000" pitchFamily="2" charset="2"/>
+            </a:endParaRPr>
+          </a:p>
+          <a:p>
+            <a:pPr marL="514350" indent="-514350">
+              <a:buFont typeface="+mj-lt"/>
+              <a:buAutoNum type="arabicPeriod"/>
+            </a:pPr>
+            <a:r>
+              <a:rPr lang="en-CA" dirty="0">
+                <a:sym typeface="Wingdings" panose="05000000000000000000" pitchFamily="2" charset="2"/>
+              </a:rPr>
+              <a:t>Open the generated project folder, what do you see?</a:t>
+            </a:r>
+          </a:p>
+          <a:p>
             <a:pPr marL="0" indent="0">
               <a:buNone/>
             </a:pPr>
+            <a:endParaRPr lang="en-CA" dirty="0"/>
+          </a:p>
+          <a:p>
+            <a:pPr marL="0" indent="0">
+              <a:buNone/>
+            </a:pPr>
             <a:endParaRPr lang="en-CA" b="1" dirty="0"/>
           </a:p>
+        </p:txBody>
+      </p:sp>
+    </p:spTree>
+    <p:extLst>
+      <p:ext uri="{BB962C8B-B14F-4D97-AF65-F5344CB8AC3E}">
+        <p14:creationId xmlns:p14="http://schemas.microsoft.com/office/powerpoint/2010/main" val="678388880"/>
+      </p:ext>
+    </p:extLst>
+  </p:cSld>
+  <p:clrMapOvr>
+    <a:masterClrMapping/>
+  </p:clrMapOvr>
+</p:sld>
+</file>
+
+<file path=ppt/slides/slide21.xml><?xml version="1.0" encoding="utf-8"?>
+<p:sld xmlns:a="http://schemas.openxmlformats.org/drawingml/2006/main" xmlns:r="http://schemas.openxmlformats.org/officeDocument/2006/relationships" xmlns:p="http://schemas.openxmlformats.org/presentationml/2006/main">
+  <p:cSld>
+    <p:spTree>
+      <p:nvGrpSpPr>
+        <p:cNvPr id="1" name=""/>
+        <p:cNvGrpSpPr/>
+        <p:nvPr/>
+      </p:nvGrpSpPr>
+      <p:grpSpPr>
+        <a:xfrm>
+          <a:off x="0" y="0"/>
+          <a:ext cx="0" cy="0"/>
+          <a:chOff x="0" y="0"/>
+          <a:chExt cx="0" cy="0"/>
+        </a:xfrm>
+      </p:grpSpPr>
+      <p:sp>
+        <p:nvSpPr>
+          <p:cNvPr id="2" name="Text Placeholder 1">
+            <a:extLst>
+              <a:ext uri="{FF2B5EF4-FFF2-40B4-BE49-F238E27FC236}">
+                <a16:creationId xmlns:a16="http://schemas.microsoft.com/office/drawing/2014/main" id="{F30F071A-0450-8F6E-F28D-8124D7A90523}"/>
+              </a:ext>
+            </a:extLst>
+          </p:cNvPr>
+          <p:cNvSpPr>
+            <a:spLocks noGrp="1"/>
+          </p:cNvSpPr>
+          <p:nvPr>
+            <p:ph type="body" sz="quarter" idx="10"/>
+          </p:nvPr>
+        </p:nvSpPr>
+        <p:spPr/>
+        <p:txBody>
+          <a:bodyPr/>
+          <a:lstStyle/>
           <a:p>
             <a:pPr marL="0" indent="0">
               <a:buNone/>
@@ -12469,9 +13679,236 @@
             <a:pPr marL="0" indent="0">
               <a:buNone/>
             </a:pPr>
+            <a:endParaRPr lang="en-CA" b="1" dirty="0"/>
+          </a:p>
+          <a:p>
+            <a:pPr marL="0" indent="0">
+              <a:buNone/>
+            </a:pPr>
+            <a:endParaRPr lang="en-CA" b="1" dirty="0"/>
+          </a:p>
+          <a:p>
+            <a:pPr marL="0" indent="0">
+              <a:buNone/>
+            </a:pPr>
             <a:r>
               <a:rPr lang="en-CA" b="1" dirty="0"/>
-              <a:t>Activity #2 – Revert a text file to a previous commit</a:t>
+              <a:t>Activity #1 – Create and track a Text File with Git</a:t>
+            </a:r>
+          </a:p>
+        </p:txBody>
+      </p:sp>
+    </p:spTree>
+    <p:extLst>
+      <p:ext uri="{BB962C8B-B14F-4D97-AF65-F5344CB8AC3E}">
+        <p14:creationId xmlns:p14="http://schemas.microsoft.com/office/powerpoint/2010/main" val="634442937"/>
+      </p:ext>
+    </p:extLst>
+  </p:cSld>
+  <p:clrMapOvr>
+    <a:masterClrMapping/>
+  </p:clrMapOvr>
+</p:sld>
+</file>
+
+<file path=ppt/slides/slide22.xml><?xml version="1.0" encoding="utf-8"?>
+<p:sld xmlns:a="http://schemas.openxmlformats.org/drawingml/2006/main" xmlns:r="http://schemas.openxmlformats.org/officeDocument/2006/relationships" xmlns:p="http://schemas.openxmlformats.org/presentationml/2006/main">
+  <p:cSld>
+    <p:spTree>
+      <p:nvGrpSpPr>
+        <p:cNvPr id="1" name=""/>
+        <p:cNvGrpSpPr/>
+        <p:nvPr/>
+      </p:nvGrpSpPr>
+      <p:grpSpPr>
+        <a:xfrm>
+          <a:off x="0" y="0"/>
+          <a:ext cx="0" cy="0"/>
+          <a:chOff x="0" y="0"/>
+          <a:chExt cx="0" cy="0"/>
+        </a:xfrm>
+      </p:grpSpPr>
+      <p:sp>
+        <p:nvSpPr>
+          <p:cNvPr id="2" name="Text Placeholder 1">
+            <a:extLst>
+              <a:ext uri="{FF2B5EF4-FFF2-40B4-BE49-F238E27FC236}">
+                <a16:creationId xmlns:a16="http://schemas.microsoft.com/office/drawing/2014/main" id="{F30F071A-0450-8F6E-F28D-8124D7A90523}"/>
+              </a:ext>
+            </a:extLst>
+          </p:cNvPr>
+          <p:cNvSpPr>
+            <a:spLocks noGrp="1"/>
+          </p:cNvSpPr>
+          <p:nvPr>
+            <p:ph type="body" sz="quarter" idx="10"/>
+          </p:nvPr>
+        </p:nvSpPr>
+        <p:spPr/>
+        <p:txBody>
+          <a:bodyPr>
+            <a:normAutofit lnSpcReduction="10000"/>
+          </a:bodyPr>
+          <a:lstStyle/>
+          <a:p>
+            <a:pPr marL="0" indent="0">
+              <a:buNone/>
+            </a:pPr>
+            <a:r>
+              <a:rPr lang="en-CA" b="1" dirty="0"/>
+              <a:t>Activity #1 – Create and track a Text File with Git</a:t>
+            </a:r>
+          </a:p>
+          <a:p>
+            <a:pPr marL="0" indent="0">
+              <a:buNone/>
+            </a:pPr>
+            <a:endParaRPr lang="en-CA" b="1" dirty="0"/>
+          </a:p>
+          <a:p>
+            <a:pPr marL="514350" indent="-514350">
+              <a:buFont typeface="+mj-lt"/>
+              <a:buAutoNum type="arabicPeriod"/>
+            </a:pPr>
+            <a:r>
+              <a:rPr lang="en-CA" dirty="0"/>
+              <a:t>Create a text file (or code script) in the project folder</a:t>
+            </a:r>
+          </a:p>
+          <a:p>
+            <a:pPr marL="514350" indent="-514350">
+              <a:buFont typeface="+mj-lt"/>
+              <a:buAutoNum type="arabicPeriod"/>
+            </a:pPr>
+            <a:endParaRPr lang="en-CA" dirty="0"/>
+          </a:p>
+          <a:p>
+            <a:pPr marL="514350" indent="-514350">
+              <a:buFont typeface="+mj-lt"/>
+              <a:buAutoNum type="arabicPeriod"/>
+            </a:pPr>
+            <a:r>
+              <a:rPr lang="en-CA" dirty="0"/>
+              <a:t>Open the GitHub Desktop App and add + commit the file to track it. </a:t>
+            </a:r>
+          </a:p>
+          <a:p>
+            <a:pPr marL="514350" indent="-514350">
+              <a:buFont typeface="+mj-lt"/>
+              <a:buAutoNum type="arabicPeriod"/>
+            </a:pPr>
+            <a:endParaRPr lang="en-CA" dirty="0"/>
+          </a:p>
+          <a:p>
+            <a:pPr marL="514350" indent="-514350">
+              <a:buFont typeface="+mj-lt"/>
+              <a:buAutoNum type="arabicPeriod"/>
+            </a:pPr>
+            <a:r>
+              <a:rPr lang="en-CA" dirty="0"/>
+              <a:t>Look at your commit history to see your commit!</a:t>
+            </a:r>
+          </a:p>
+          <a:p>
+            <a:pPr marL="514350" indent="-514350">
+              <a:buFont typeface="+mj-lt"/>
+              <a:buAutoNum type="arabicPeriod"/>
+            </a:pPr>
+            <a:endParaRPr lang="en-CA" dirty="0"/>
+          </a:p>
+          <a:p>
+            <a:pPr marL="514350" indent="-514350">
+              <a:buFont typeface="+mj-lt"/>
+              <a:buAutoNum type="arabicPeriod"/>
+            </a:pPr>
+            <a:r>
+              <a:rPr lang="en-CA" dirty="0"/>
+              <a:t>Modify the file and commit the changes. Try and make informative commit messages!</a:t>
+            </a:r>
+          </a:p>
+        </p:txBody>
+      </p:sp>
+    </p:spTree>
+    <p:extLst>
+      <p:ext uri="{BB962C8B-B14F-4D97-AF65-F5344CB8AC3E}">
+        <p14:creationId xmlns:p14="http://schemas.microsoft.com/office/powerpoint/2010/main" val="907190213"/>
+      </p:ext>
+    </p:extLst>
+  </p:cSld>
+  <p:clrMapOvr>
+    <a:masterClrMapping/>
+  </p:clrMapOvr>
+</p:sld>
+</file>
+
+<file path=ppt/slides/slide23.xml><?xml version="1.0" encoding="utf-8"?>
+<p:sld xmlns:a="http://schemas.openxmlformats.org/drawingml/2006/main" xmlns:r="http://schemas.openxmlformats.org/officeDocument/2006/relationships" xmlns:p="http://schemas.openxmlformats.org/presentationml/2006/main">
+  <p:cSld>
+    <p:spTree>
+      <p:nvGrpSpPr>
+        <p:cNvPr id="1" name=""/>
+        <p:cNvGrpSpPr/>
+        <p:nvPr/>
+      </p:nvGrpSpPr>
+      <p:grpSpPr>
+        <a:xfrm>
+          <a:off x="0" y="0"/>
+          <a:ext cx="0" cy="0"/>
+          <a:chOff x="0" y="0"/>
+          <a:chExt cx="0" cy="0"/>
+        </a:xfrm>
+      </p:grpSpPr>
+      <p:sp>
+        <p:nvSpPr>
+          <p:cNvPr id="2" name="Text Placeholder 1">
+            <a:extLst>
+              <a:ext uri="{FF2B5EF4-FFF2-40B4-BE49-F238E27FC236}">
+                <a16:creationId xmlns:a16="http://schemas.microsoft.com/office/drawing/2014/main" id="{F30F071A-0450-8F6E-F28D-8124D7A90523}"/>
+              </a:ext>
+            </a:extLst>
+          </p:cNvPr>
+          <p:cNvSpPr>
+            <a:spLocks noGrp="1"/>
+          </p:cNvSpPr>
+          <p:nvPr>
+            <p:ph type="body" sz="quarter" idx="10"/>
+          </p:nvPr>
+        </p:nvSpPr>
+        <p:spPr/>
+        <p:txBody>
+          <a:bodyPr/>
+          <a:lstStyle/>
+          <a:p>
+            <a:pPr marL="0" indent="0">
+              <a:buNone/>
+            </a:pPr>
+            <a:endParaRPr lang="en-CA" b="1" dirty="0"/>
+          </a:p>
+          <a:p>
+            <a:pPr marL="0" indent="0">
+              <a:buNone/>
+            </a:pPr>
+            <a:endParaRPr lang="en-CA" b="1" dirty="0"/>
+          </a:p>
+          <a:p>
+            <a:pPr marL="0" indent="0">
+              <a:buNone/>
+            </a:pPr>
+            <a:endParaRPr lang="en-CA" b="1" dirty="0"/>
+          </a:p>
+          <a:p>
+            <a:pPr marL="0" indent="0">
+              <a:buNone/>
+            </a:pPr>
+            <a:endParaRPr lang="en-CA" b="1" dirty="0"/>
+          </a:p>
+          <a:p>
+            <a:pPr marL="0" indent="0">
+              <a:buNone/>
+            </a:pPr>
+            <a:r>
+              <a:rPr lang="en-CA" b="1" dirty="0"/>
+              <a:t>Activity #2 – Revert a file to a previous commit</a:t>
             </a:r>
           </a:p>
         </p:txBody>
@@ -12489,7 +13926,121 @@
 </p:sld>
 </file>
 
-<file path=ppt/slides/slide21.xml><?xml version="1.0" encoding="utf-8"?>
+<file path=ppt/slides/slide24.xml><?xml version="1.0" encoding="utf-8"?>
+<p:sld xmlns:a="http://schemas.openxmlformats.org/drawingml/2006/main" xmlns:r="http://schemas.openxmlformats.org/officeDocument/2006/relationships" xmlns:p="http://schemas.openxmlformats.org/presentationml/2006/main">
+  <p:cSld>
+    <p:spTree>
+      <p:nvGrpSpPr>
+        <p:cNvPr id="1" name=""/>
+        <p:cNvGrpSpPr/>
+        <p:nvPr/>
+      </p:nvGrpSpPr>
+      <p:grpSpPr>
+        <a:xfrm>
+          <a:off x="0" y="0"/>
+          <a:ext cx="0" cy="0"/>
+          <a:chOff x="0" y="0"/>
+          <a:chExt cx="0" cy="0"/>
+        </a:xfrm>
+      </p:grpSpPr>
+      <p:sp>
+        <p:nvSpPr>
+          <p:cNvPr id="2" name="Text Placeholder 1">
+            <a:extLst>
+              <a:ext uri="{FF2B5EF4-FFF2-40B4-BE49-F238E27FC236}">
+                <a16:creationId xmlns:a16="http://schemas.microsoft.com/office/drawing/2014/main" id="{F30F071A-0450-8F6E-F28D-8124D7A90523}"/>
+              </a:ext>
+            </a:extLst>
+          </p:cNvPr>
+          <p:cNvSpPr>
+            <a:spLocks noGrp="1"/>
+          </p:cNvSpPr>
+          <p:nvPr>
+            <p:ph type="body" sz="quarter" idx="10"/>
+          </p:nvPr>
+        </p:nvSpPr>
+        <p:spPr/>
+        <p:txBody>
+          <a:bodyPr/>
+          <a:lstStyle/>
+          <a:p>
+            <a:pPr marL="0" indent="0">
+              <a:buNone/>
+            </a:pPr>
+            <a:r>
+              <a:rPr lang="en-CA" b="1" dirty="0"/>
+              <a:t>Activity #2 – Revert a file to a previous commit</a:t>
+            </a:r>
+          </a:p>
+          <a:p>
+            <a:pPr marL="0" indent="0">
+              <a:buNone/>
+            </a:pPr>
+            <a:endParaRPr lang="en-CA" b="1" dirty="0"/>
+          </a:p>
+          <a:p>
+            <a:pPr marL="514350" indent="-514350">
+              <a:buFont typeface="+mj-lt"/>
+              <a:buAutoNum type="arabicPeriod"/>
+            </a:pPr>
+            <a:r>
+              <a:rPr lang="en-CA" dirty="0"/>
+              <a:t>Make an unwanted change to your file</a:t>
+            </a:r>
+          </a:p>
+          <a:p>
+            <a:pPr marL="514350" indent="-514350">
+              <a:buFont typeface="+mj-lt"/>
+              <a:buAutoNum type="arabicPeriod"/>
+            </a:pPr>
+            <a:r>
+              <a:rPr lang="en-CA" dirty="0"/>
+              <a:t>Use your commit history to revert to the previous commit</a:t>
+            </a:r>
+          </a:p>
+          <a:p>
+            <a:pPr marL="514350" indent="-514350">
+              <a:buFont typeface="+mj-lt"/>
+              <a:buAutoNum type="arabicPeriod"/>
+            </a:pPr>
+            <a:endParaRPr lang="en-CA" dirty="0"/>
+          </a:p>
+          <a:p>
+            <a:pPr marL="514350" indent="-514350">
+              <a:buFont typeface="+mj-lt"/>
+              <a:buAutoNum type="arabicPeriod"/>
+            </a:pPr>
+            <a:r>
+              <a:rPr lang="en-CA" dirty="0"/>
+              <a:t>Make another unwanted change and commit it</a:t>
+            </a:r>
+          </a:p>
+          <a:p>
+            <a:pPr marL="514350" indent="-514350">
+              <a:buFont typeface="+mj-lt"/>
+              <a:buAutoNum type="arabicPeriod"/>
+            </a:pPr>
+            <a:r>
+              <a:rPr lang="en-CA" dirty="0"/>
+              <a:t>Now use your commit history to revert the commit!</a:t>
+            </a:r>
+          </a:p>
+        </p:txBody>
+      </p:sp>
+    </p:spTree>
+    <p:extLst>
+      <p:ext uri="{BB962C8B-B14F-4D97-AF65-F5344CB8AC3E}">
+        <p14:creationId xmlns:p14="http://schemas.microsoft.com/office/powerpoint/2010/main" val="3623309075"/>
+      </p:ext>
+    </p:extLst>
+  </p:cSld>
+  <p:clrMapOvr>
+    <a:masterClrMapping/>
+  </p:clrMapOvr>
+</p:sld>
+</file>
+
+<file path=ppt/slides/slide25.xml><?xml version="1.0" encoding="utf-8"?>
 <p:sld xmlns:a="http://schemas.openxmlformats.org/drawingml/2006/main" xmlns:r="http://schemas.openxmlformats.org/officeDocument/2006/relationships" xmlns:p="http://schemas.openxmlformats.org/presentationml/2006/main">
   <p:cSld>
     <p:spTree>
@@ -12778,7 +14329,7 @@
 </p:sld>
 </file>
 
-<file path=ppt/slides/slide22.xml><?xml version="1.0" encoding="utf-8"?>
+<file path=ppt/slides/slide26.xml><?xml version="1.0" encoding="utf-8"?>
 <p:sld xmlns:a="http://schemas.openxmlformats.org/drawingml/2006/main" xmlns:r="http://schemas.openxmlformats.org/officeDocument/2006/relationships" xmlns:p="http://schemas.openxmlformats.org/presentationml/2006/main">
   <p:cSld>
     <p:spTree>
@@ -12836,7 +14387,7 @@
 </p:sld>
 </file>
 
-<file path=ppt/slides/slide23.xml><?xml version="1.0" encoding="utf-8"?>
+<file path=ppt/slides/slide27.xml><?xml version="1.0" encoding="utf-8"?>
 <p:sld xmlns:a="http://schemas.openxmlformats.org/drawingml/2006/main" xmlns:r="http://schemas.openxmlformats.org/officeDocument/2006/relationships" xmlns:p="http://schemas.openxmlformats.org/presentationml/2006/main">
   <p:cSld>
     <p:spTree>
@@ -12994,7 +14545,7 @@
 </p:sld>
 </file>
 
-<file path=ppt/slides/slide24.xml><?xml version="1.0" encoding="utf-8"?>
+<file path=ppt/slides/slide28.xml><?xml version="1.0" encoding="utf-8"?>
 <p:sld xmlns:a="http://schemas.openxmlformats.org/drawingml/2006/main" xmlns:r="http://schemas.openxmlformats.org/officeDocument/2006/relationships" xmlns:p="http://schemas.openxmlformats.org/presentationml/2006/main">
   <p:cSld>
     <p:spTree>
@@ -14102,7 +15653,7 @@
 </p:sld>
 </file>
 
-<file path=ppt/slides/slide25.xml><?xml version="1.0" encoding="utf-8"?>
+<file path=ppt/slides/slide29.xml><?xml version="1.0" encoding="utf-8"?>
 <p:sld xmlns:a="http://schemas.openxmlformats.org/drawingml/2006/main" xmlns:r="http://schemas.openxmlformats.org/officeDocument/2006/relationships" xmlns:p="http://schemas.openxmlformats.org/presentationml/2006/main">
   <p:cSld>
     <p:spTree>
@@ -14187,7 +15738,252 @@
 </p:sld>
 </file>
 
-<file path=ppt/slides/slide26.xml><?xml version="1.0" encoding="utf-8"?>
+<file path=ppt/slides/slide3.xml><?xml version="1.0" encoding="utf-8"?>
+<p:sld xmlns:a="http://schemas.openxmlformats.org/drawingml/2006/main" xmlns:r="http://schemas.openxmlformats.org/officeDocument/2006/relationships" xmlns:p="http://schemas.openxmlformats.org/presentationml/2006/main">
+  <p:cSld>
+    <p:spTree>
+      <p:nvGrpSpPr>
+        <p:cNvPr id="1" name=""/>
+        <p:cNvGrpSpPr/>
+        <p:nvPr/>
+      </p:nvGrpSpPr>
+      <p:grpSpPr>
+        <a:xfrm>
+          <a:off x="0" y="0"/>
+          <a:ext cx="0" cy="0"/>
+          <a:chOff x="0" y="0"/>
+          <a:chExt cx="0" cy="0"/>
+        </a:xfrm>
+      </p:grpSpPr>
+      <p:sp>
+        <p:nvSpPr>
+          <p:cNvPr id="2" name="Text Placeholder 1">
+            <a:extLst>
+              <a:ext uri="{FF2B5EF4-FFF2-40B4-BE49-F238E27FC236}">
+                <a16:creationId xmlns:a16="http://schemas.microsoft.com/office/drawing/2014/main" id="{17E543B8-96E5-F2A9-6F87-38F12D86B60B}"/>
+              </a:ext>
+            </a:extLst>
+          </p:cNvPr>
+          <p:cNvSpPr>
+            <a:spLocks noGrp="1"/>
+          </p:cNvSpPr>
+          <p:nvPr>
+            <p:ph type="body" sz="quarter" idx="10"/>
+          </p:nvPr>
+        </p:nvSpPr>
+        <p:spPr/>
+        <p:txBody>
+          <a:bodyPr>
+            <a:normAutofit lnSpcReduction="10000"/>
+          </a:bodyPr>
+          <a:lstStyle/>
+          <a:p>
+            <a:pPr marL="0" indent="0">
+              <a:buNone/>
+            </a:pPr>
+            <a:r>
+              <a:rPr lang="en-CA" b="1" dirty="0"/>
+              <a:t>Outline for this workshop:</a:t>
+            </a:r>
+          </a:p>
+          <a:p>
+            <a:pPr marL="514350" indent="-514350">
+              <a:buFont typeface="+mj-lt"/>
+              <a:buAutoNum type="arabicPeriod"/>
+            </a:pPr>
+            <a:r>
+              <a:rPr lang="en-CA" dirty="0"/>
+              <a:t>Intro to Git and Version Control Systems</a:t>
+            </a:r>
+          </a:p>
+          <a:p>
+            <a:pPr marL="514350" indent="-514350">
+              <a:buFont typeface="+mj-lt"/>
+              <a:buAutoNum type="arabicPeriod"/>
+            </a:pPr>
+            <a:endParaRPr lang="en-CA" dirty="0"/>
+          </a:p>
+          <a:p>
+            <a:pPr marL="514350" indent="-514350">
+              <a:buFont typeface="+mj-lt"/>
+              <a:buAutoNum type="arabicPeriod"/>
+            </a:pPr>
+            <a:r>
+              <a:rPr lang="en-CA" dirty="0"/>
+              <a:t>Basic Git functions</a:t>
+            </a:r>
+          </a:p>
+          <a:p>
+            <a:pPr marL="514350" indent="-514350">
+              <a:buFont typeface="+mj-lt"/>
+              <a:buAutoNum type="arabicPeriod"/>
+            </a:pPr>
+            <a:endParaRPr lang="en-CA" dirty="0"/>
+          </a:p>
+          <a:p>
+            <a:pPr marL="514350" indent="-514350">
+              <a:buFont typeface="+mj-lt"/>
+              <a:buAutoNum type="arabicPeriod"/>
+            </a:pPr>
+            <a:r>
+              <a:rPr lang="en-CA" dirty="0"/>
+              <a:t>Advanced Git functions</a:t>
+            </a:r>
+          </a:p>
+          <a:p>
+            <a:pPr marL="457088" lvl="1" indent="0">
+              <a:buNone/>
+            </a:pPr>
+            <a:endParaRPr lang="en-CA" dirty="0"/>
+          </a:p>
+          <a:p>
+            <a:pPr marL="514350" indent="-514350">
+              <a:buFont typeface="+mj-lt"/>
+              <a:buAutoNum type="arabicPeriod"/>
+            </a:pPr>
+            <a:r>
+              <a:rPr lang="en-CA" dirty="0"/>
+              <a:t>Working with GitHub</a:t>
+            </a:r>
+          </a:p>
+          <a:p>
+            <a:pPr marL="514350" indent="-514350">
+              <a:buFont typeface="+mj-lt"/>
+              <a:buAutoNum type="arabicPeriod"/>
+            </a:pPr>
+            <a:endParaRPr lang="en-CA" dirty="0"/>
+          </a:p>
+          <a:p>
+            <a:pPr marL="514350" indent="-514350">
+              <a:buFont typeface="+mj-lt"/>
+              <a:buAutoNum type="arabicPeriod"/>
+            </a:pPr>
+            <a:r>
+              <a:rPr lang="en-CA" dirty="0"/>
+              <a:t>Conclusions</a:t>
+            </a:r>
+          </a:p>
+        </p:txBody>
+      </p:sp>
+    </p:spTree>
+    <p:extLst>
+      <p:ext uri="{BB962C8B-B14F-4D97-AF65-F5344CB8AC3E}">
+        <p14:creationId xmlns:p14="http://schemas.microsoft.com/office/powerpoint/2010/main" val="1592450976"/>
+      </p:ext>
+    </p:extLst>
+  </p:cSld>
+  <p:clrMapOvr>
+    <a:masterClrMapping/>
+  </p:clrMapOvr>
+</p:sld>
+</file>
+
+<file path=ppt/slides/slide30.xml><?xml version="1.0" encoding="utf-8"?>
+<p:sld xmlns:a="http://schemas.openxmlformats.org/drawingml/2006/main" xmlns:r="http://schemas.openxmlformats.org/officeDocument/2006/relationships" xmlns:p="http://schemas.openxmlformats.org/presentationml/2006/main">
+  <p:cSld>
+    <p:spTree>
+      <p:nvGrpSpPr>
+        <p:cNvPr id="1" name=""/>
+        <p:cNvGrpSpPr/>
+        <p:nvPr/>
+      </p:nvGrpSpPr>
+      <p:grpSpPr>
+        <a:xfrm>
+          <a:off x="0" y="0"/>
+          <a:ext cx="0" cy="0"/>
+          <a:chOff x="0" y="0"/>
+          <a:chExt cx="0" cy="0"/>
+        </a:xfrm>
+      </p:grpSpPr>
+      <p:sp>
+        <p:nvSpPr>
+          <p:cNvPr id="2" name="Text Placeholder 1">
+            <a:extLst>
+              <a:ext uri="{FF2B5EF4-FFF2-40B4-BE49-F238E27FC236}">
+                <a16:creationId xmlns:a16="http://schemas.microsoft.com/office/drawing/2014/main" id="{F30F071A-0450-8F6E-F28D-8124D7A90523}"/>
+              </a:ext>
+            </a:extLst>
+          </p:cNvPr>
+          <p:cNvSpPr>
+            <a:spLocks noGrp="1"/>
+          </p:cNvSpPr>
+          <p:nvPr>
+            <p:ph type="body" sz="quarter" idx="10"/>
+          </p:nvPr>
+        </p:nvSpPr>
+        <p:spPr/>
+        <p:txBody>
+          <a:bodyPr/>
+          <a:lstStyle/>
+          <a:p>
+            <a:pPr marL="0" indent="0">
+              <a:buNone/>
+            </a:pPr>
+            <a:r>
+              <a:rPr lang="en-CA" b="1" dirty="0"/>
+              <a:t>Activity #3 – Create a new branch</a:t>
+            </a:r>
+          </a:p>
+          <a:p>
+            <a:pPr marL="514350" indent="-514350">
+              <a:buFont typeface="+mj-lt"/>
+              <a:buAutoNum type="arabicPeriod"/>
+            </a:pPr>
+            <a:r>
+              <a:rPr lang="en-CA" dirty="0"/>
+              <a:t>Click the “current branch” button and select “new branch”</a:t>
+            </a:r>
+          </a:p>
+          <a:p>
+            <a:pPr marL="514350" indent="-514350">
+              <a:buFont typeface="+mj-lt"/>
+              <a:buAutoNum type="arabicPeriod"/>
+            </a:pPr>
+            <a:endParaRPr lang="en-CA" dirty="0"/>
+          </a:p>
+          <a:p>
+            <a:pPr marL="514350" indent="-514350">
+              <a:buFont typeface="+mj-lt"/>
+              <a:buAutoNum type="arabicPeriod"/>
+            </a:pPr>
+            <a:r>
+              <a:rPr lang="en-CA" dirty="0"/>
+              <a:t>Make changes to your file in the new branch and commit it</a:t>
+            </a:r>
+          </a:p>
+          <a:p>
+            <a:pPr marL="514350" indent="-514350">
+              <a:buFont typeface="+mj-lt"/>
+              <a:buAutoNum type="arabicPeriod"/>
+            </a:pPr>
+            <a:endParaRPr lang="en-CA" dirty="0"/>
+          </a:p>
+          <a:p>
+            <a:pPr marL="514350" indent="-514350">
+              <a:buFont typeface="+mj-lt"/>
+              <a:buAutoNum type="arabicPeriod"/>
+            </a:pPr>
+            <a:r>
+              <a:rPr lang="en-CA" dirty="0"/>
+              <a:t>Switch back to the main branch and open the file, what do you notice?</a:t>
+            </a:r>
+          </a:p>
+        </p:txBody>
+      </p:sp>
+    </p:spTree>
+    <p:extLst>
+      <p:ext uri="{BB962C8B-B14F-4D97-AF65-F5344CB8AC3E}">
+        <p14:creationId xmlns:p14="http://schemas.microsoft.com/office/powerpoint/2010/main" val="2674360721"/>
+      </p:ext>
+    </p:extLst>
+  </p:cSld>
+  <p:clrMapOvr>
+    <a:masterClrMapping/>
+  </p:clrMapOvr>
+</p:sld>
+</file>
+
+<file path=ppt/slides/slide31.xml><?xml version="1.0" encoding="utf-8"?>
 <p:sld xmlns:a="http://schemas.openxmlformats.org/drawingml/2006/main" xmlns:r="http://schemas.openxmlformats.org/officeDocument/2006/relationships" xmlns:p="http://schemas.openxmlformats.org/presentationml/2006/main">
   <p:cSld>
     <p:spTree>
@@ -14345,7 +16141,7 @@
 </p:sld>
 </file>
 
-<file path=ppt/slides/slide27.xml><?xml version="1.0" encoding="utf-8"?>
+<file path=ppt/slides/slide32.xml><?xml version="1.0" encoding="utf-8"?>
 <p:sld xmlns:a="http://schemas.openxmlformats.org/drawingml/2006/main" xmlns:r="http://schemas.openxmlformats.org/officeDocument/2006/relationships" xmlns:p="http://schemas.openxmlformats.org/presentationml/2006/main">
   <p:cSld>
     <p:spTree>
@@ -15434,7 +17230,7 @@
 </p:sld>
 </file>
 
-<file path=ppt/slides/slide28.xml><?xml version="1.0" encoding="utf-8"?>
+<file path=ppt/slides/slide33.xml><?xml version="1.0" encoding="utf-8"?>
 <p:sld xmlns:a="http://schemas.openxmlformats.org/drawingml/2006/main" xmlns:r="http://schemas.openxmlformats.org/officeDocument/2006/relationships" xmlns:p="http://schemas.openxmlformats.org/presentationml/2006/main">
   <p:cSld>
     <p:spTree>
@@ -15519,7 +17315,131 @@
 </p:sld>
 </file>
 
-<file path=ppt/slides/slide29.xml><?xml version="1.0" encoding="utf-8"?>
+<file path=ppt/slides/slide34.xml><?xml version="1.0" encoding="utf-8"?>
+<p:sld xmlns:a="http://schemas.openxmlformats.org/drawingml/2006/main" xmlns:r="http://schemas.openxmlformats.org/officeDocument/2006/relationships" xmlns:p="http://schemas.openxmlformats.org/presentationml/2006/main">
+  <p:cSld>
+    <p:spTree>
+      <p:nvGrpSpPr>
+        <p:cNvPr id="1" name=""/>
+        <p:cNvGrpSpPr/>
+        <p:nvPr/>
+      </p:nvGrpSpPr>
+      <p:grpSpPr>
+        <a:xfrm>
+          <a:off x="0" y="0"/>
+          <a:ext cx="0" cy="0"/>
+          <a:chOff x="0" y="0"/>
+          <a:chExt cx="0" cy="0"/>
+        </a:xfrm>
+      </p:grpSpPr>
+      <p:sp>
+        <p:nvSpPr>
+          <p:cNvPr id="2" name="Text Placeholder 1">
+            <a:extLst>
+              <a:ext uri="{FF2B5EF4-FFF2-40B4-BE49-F238E27FC236}">
+                <a16:creationId xmlns:a16="http://schemas.microsoft.com/office/drawing/2014/main" id="{F30F071A-0450-8F6E-F28D-8124D7A90523}"/>
+              </a:ext>
+            </a:extLst>
+          </p:cNvPr>
+          <p:cNvSpPr>
+            <a:spLocks noGrp="1"/>
+          </p:cNvSpPr>
+          <p:nvPr>
+            <p:ph type="body" sz="quarter" idx="10"/>
+          </p:nvPr>
+        </p:nvSpPr>
+        <p:spPr/>
+        <p:txBody>
+          <a:bodyPr>
+            <a:normAutofit/>
+          </a:bodyPr>
+          <a:lstStyle/>
+          <a:p>
+            <a:pPr marL="0" indent="0">
+              <a:buNone/>
+            </a:pPr>
+            <a:r>
+              <a:rPr lang="en-CA" b="1" dirty="0"/>
+              <a:t>Activity #4 – Merging Branches</a:t>
+            </a:r>
+          </a:p>
+          <a:p>
+            <a:pPr marL="514350" indent="-514350">
+              <a:buFont typeface="+mj-lt"/>
+              <a:buAutoNum type="arabicPeriod"/>
+            </a:pPr>
+            <a:r>
+              <a:rPr lang="en-CA" dirty="0"/>
+              <a:t>Switch to the main branch</a:t>
+            </a:r>
+          </a:p>
+          <a:p>
+            <a:pPr marL="514350" indent="-514350">
+              <a:buFont typeface="+mj-lt"/>
+              <a:buAutoNum type="arabicPeriod"/>
+            </a:pPr>
+            <a:endParaRPr lang="en-CA" dirty="0"/>
+          </a:p>
+          <a:p>
+            <a:pPr marL="514350" indent="-514350">
+              <a:buFont typeface="+mj-lt"/>
+              <a:buAutoNum type="arabicPeriod"/>
+            </a:pPr>
+            <a:r>
+              <a:rPr lang="en-CA" dirty="0"/>
+              <a:t>Open the branch menu</a:t>
+            </a:r>
+          </a:p>
+          <a:p>
+            <a:pPr marL="514350" indent="-514350">
+              <a:buFont typeface="+mj-lt"/>
+              <a:buAutoNum type="arabicPeriod"/>
+            </a:pPr>
+            <a:endParaRPr lang="en-CA" dirty="0"/>
+          </a:p>
+          <a:p>
+            <a:pPr marL="514350" indent="-514350">
+              <a:buFont typeface="+mj-lt"/>
+              <a:buAutoNum type="arabicPeriod"/>
+            </a:pPr>
+            <a:r>
+              <a:rPr lang="en-CA" dirty="0"/>
+              <a:t>Select the “choose a branch to merge into main” button and select your second branch.</a:t>
+            </a:r>
+          </a:p>
+          <a:p>
+            <a:pPr marL="514350" indent="-514350">
+              <a:buFont typeface="+mj-lt"/>
+              <a:buAutoNum type="arabicPeriod"/>
+            </a:pPr>
+            <a:endParaRPr lang="en-CA" dirty="0"/>
+          </a:p>
+          <a:p>
+            <a:pPr marL="514350" indent="-514350">
+              <a:buFont typeface="+mj-lt"/>
+              <a:buAutoNum type="arabicPeriod"/>
+            </a:pPr>
+            <a:r>
+              <a:rPr lang="en-CA" dirty="0"/>
+              <a:t>Compare the branches again, the file should now be identical in both!</a:t>
+            </a:r>
+          </a:p>
+        </p:txBody>
+      </p:sp>
+    </p:spTree>
+    <p:extLst>
+      <p:ext uri="{BB962C8B-B14F-4D97-AF65-F5344CB8AC3E}">
+        <p14:creationId xmlns:p14="http://schemas.microsoft.com/office/powerpoint/2010/main" val="1311449531"/>
+      </p:ext>
+    </p:extLst>
+  </p:cSld>
+  <p:clrMapOvr>
+    <a:masterClrMapping/>
+  </p:clrMapOvr>
+</p:sld>
+</file>
+
+<file path=ppt/slides/slide35.xml><?xml version="1.0" encoding="utf-8"?>
 <p:sld xmlns:a="http://schemas.openxmlformats.org/drawingml/2006/main" xmlns:r="http://schemas.openxmlformats.org/officeDocument/2006/relationships" xmlns:p="http://schemas.openxmlformats.org/presentationml/2006/main">
   <p:cSld>
     <p:spTree>
@@ -15677,147 +17597,7 @@
 </p:sld>
 </file>
 
-<file path=ppt/slides/slide3.xml><?xml version="1.0" encoding="utf-8"?>
-<p:sld xmlns:a="http://schemas.openxmlformats.org/drawingml/2006/main" xmlns:r="http://schemas.openxmlformats.org/officeDocument/2006/relationships" xmlns:p="http://schemas.openxmlformats.org/presentationml/2006/main">
-  <p:cSld>
-    <p:spTree>
-      <p:nvGrpSpPr>
-        <p:cNvPr id="1" name=""/>
-        <p:cNvGrpSpPr/>
-        <p:nvPr/>
-      </p:nvGrpSpPr>
-      <p:grpSpPr>
-        <a:xfrm>
-          <a:off x="0" y="0"/>
-          <a:ext cx="0" cy="0"/>
-          <a:chOff x="0" y="0"/>
-          <a:chExt cx="0" cy="0"/>
-        </a:xfrm>
-      </p:grpSpPr>
-      <p:sp>
-        <p:nvSpPr>
-          <p:cNvPr id="2" name="Text Placeholder 1">
-            <a:extLst>
-              <a:ext uri="{FF2B5EF4-FFF2-40B4-BE49-F238E27FC236}">
-                <a16:creationId xmlns:a16="http://schemas.microsoft.com/office/drawing/2014/main" id="{17E543B8-96E5-F2A9-6F87-38F12D86B60B}"/>
-              </a:ext>
-            </a:extLst>
-          </p:cNvPr>
-          <p:cNvSpPr>
-            <a:spLocks noGrp="1"/>
-          </p:cNvSpPr>
-          <p:nvPr>
-            <p:ph type="body" sz="quarter" idx="10"/>
-          </p:nvPr>
-        </p:nvSpPr>
-        <p:spPr/>
-        <p:txBody>
-          <a:bodyPr>
-            <a:normAutofit lnSpcReduction="10000"/>
-          </a:bodyPr>
-          <a:lstStyle/>
-          <a:p>
-            <a:pPr marL="0" indent="0">
-              <a:buNone/>
-            </a:pPr>
-            <a:r>
-              <a:rPr lang="en-CA" b="1" dirty="0"/>
-              <a:t>Outline for this workshop:</a:t>
-            </a:r>
-          </a:p>
-          <a:p>
-            <a:pPr marL="514350" indent="-514350">
-              <a:buFont typeface="+mj-lt"/>
-              <a:buAutoNum type="arabicPeriod"/>
-            </a:pPr>
-            <a:r>
-              <a:rPr lang="en-CA" dirty="0"/>
-              <a:t>Intro to Git and Version Control Systems</a:t>
-            </a:r>
-          </a:p>
-          <a:p>
-            <a:pPr marL="514350" indent="-514350">
-              <a:buFont typeface="+mj-lt"/>
-              <a:buAutoNum type="arabicPeriod"/>
-            </a:pPr>
-            <a:endParaRPr lang="en-CA" dirty="0"/>
-          </a:p>
-          <a:p>
-            <a:pPr marL="514350" indent="-514350">
-              <a:buFont typeface="+mj-lt"/>
-              <a:buAutoNum type="arabicPeriod"/>
-            </a:pPr>
-            <a:r>
-              <a:rPr lang="en-CA" dirty="0"/>
-              <a:t>Basic Git functions</a:t>
-            </a:r>
-          </a:p>
-          <a:p>
-            <a:pPr marL="514350" indent="-514350">
-              <a:buFont typeface="+mj-lt"/>
-              <a:buAutoNum type="arabicPeriod"/>
-            </a:pPr>
-            <a:endParaRPr lang="en-CA" dirty="0"/>
-          </a:p>
-          <a:p>
-            <a:pPr marL="514350" indent="-514350">
-              <a:buFont typeface="+mj-lt"/>
-              <a:buAutoNum type="arabicPeriod"/>
-            </a:pPr>
-            <a:r>
-              <a:rPr lang="en-CA" dirty="0"/>
-              <a:t>Advanced Git functions</a:t>
-            </a:r>
-          </a:p>
-          <a:p>
-            <a:pPr marL="457088" lvl="1" indent="0">
-              <a:buNone/>
-            </a:pPr>
-            <a:endParaRPr lang="en-CA" dirty="0"/>
-          </a:p>
-          <a:p>
-            <a:pPr marL="514350" indent="-514350">
-              <a:buFont typeface="+mj-lt"/>
-              <a:buAutoNum type="arabicPeriod"/>
-            </a:pPr>
-            <a:r>
-              <a:rPr lang="en-CA" dirty="0"/>
-              <a:t>Working with GitHub</a:t>
-            </a:r>
-          </a:p>
-          <a:p>
-            <a:pPr marL="514350" indent="-514350">
-              <a:buFont typeface="+mj-lt"/>
-              <a:buAutoNum type="arabicPeriod"/>
-            </a:pPr>
-            <a:endParaRPr lang="en-CA" dirty="0"/>
-          </a:p>
-          <a:p>
-            <a:pPr marL="514350" indent="-514350">
-              <a:buFont typeface="+mj-lt"/>
-              <a:buAutoNum type="arabicPeriod"/>
-            </a:pPr>
-            <a:r>
-              <a:rPr lang="en-CA" dirty="0"/>
-              <a:t>Conclusions</a:t>
-            </a:r>
-          </a:p>
-        </p:txBody>
-      </p:sp>
-    </p:spTree>
-    <p:extLst>
-      <p:ext uri="{BB962C8B-B14F-4D97-AF65-F5344CB8AC3E}">
-        <p14:creationId xmlns:p14="http://schemas.microsoft.com/office/powerpoint/2010/main" val="1592450976"/>
-      </p:ext>
-    </p:extLst>
-  </p:cSld>
-  <p:clrMapOvr>
-    <a:masterClrMapping/>
-  </p:clrMapOvr>
-</p:sld>
-</file>
-
-<file path=ppt/slides/slide30.xml><?xml version="1.0" encoding="utf-8"?>
+<file path=ppt/slides/slide36.xml><?xml version="1.0" encoding="utf-8"?>
 <p:sld xmlns:a="http://schemas.openxmlformats.org/drawingml/2006/main" xmlns:r="http://schemas.openxmlformats.org/officeDocument/2006/relationships" xmlns:p="http://schemas.openxmlformats.org/presentationml/2006/main">
   <p:cSld>
     <p:spTree>
@@ -16642,7 +18422,7 @@
 </p:sld>
 </file>
 
-<file path=ppt/slides/slide31.xml><?xml version="1.0" encoding="utf-8"?>
+<file path=ppt/slides/slide37.xml><?xml version="1.0" encoding="utf-8"?>
 <p:sld xmlns:a="http://schemas.openxmlformats.org/drawingml/2006/main" xmlns:r="http://schemas.openxmlformats.org/officeDocument/2006/relationships" xmlns:p="http://schemas.openxmlformats.org/presentationml/2006/main">
   <p:cSld>
     <p:spTree>
@@ -16932,7 +18712,7 @@
 </p:sld>
 </file>
 
-<file path=ppt/slides/slide32.xml><?xml version="1.0" encoding="utf-8"?>
+<file path=ppt/slides/slide38.xml><?xml version="1.0" encoding="utf-8"?>
 <p:sld xmlns:a="http://schemas.openxmlformats.org/drawingml/2006/main" xmlns:r="http://schemas.openxmlformats.org/officeDocument/2006/relationships" xmlns:p="http://schemas.openxmlformats.org/presentationml/2006/main">
   <p:cSld>
     <p:spTree>
@@ -17017,7 +18797,299 @@
 </p:sld>
 </file>
 
-<file path=ppt/slides/slide33.xml><?xml version="1.0" encoding="utf-8"?>
+<file path=ppt/slides/slide39.xml><?xml version="1.0" encoding="utf-8"?>
+<p:sld xmlns:a="http://schemas.openxmlformats.org/drawingml/2006/main" xmlns:r="http://schemas.openxmlformats.org/officeDocument/2006/relationships" xmlns:p="http://schemas.openxmlformats.org/presentationml/2006/main">
+  <p:cSld>
+    <p:spTree>
+      <p:nvGrpSpPr>
+        <p:cNvPr id="1" name=""/>
+        <p:cNvGrpSpPr/>
+        <p:nvPr/>
+      </p:nvGrpSpPr>
+      <p:grpSpPr>
+        <a:xfrm>
+          <a:off x="0" y="0"/>
+          <a:ext cx="0" cy="0"/>
+          <a:chOff x="0" y="0"/>
+          <a:chExt cx="0" cy="0"/>
+        </a:xfrm>
+      </p:grpSpPr>
+      <p:sp>
+        <p:nvSpPr>
+          <p:cNvPr id="2" name="Text Placeholder 1">
+            <a:extLst>
+              <a:ext uri="{FF2B5EF4-FFF2-40B4-BE49-F238E27FC236}">
+                <a16:creationId xmlns:a16="http://schemas.microsoft.com/office/drawing/2014/main" id="{F30F071A-0450-8F6E-F28D-8124D7A90523}"/>
+              </a:ext>
+            </a:extLst>
+          </p:cNvPr>
+          <p:cNvSpPr>
+            <a:spLocks noGrp="1"/>
+          </p:cNvSpPr>
+          <p:nvPr>
+            <p:ph type="body" sz="quarter" idx="10"/>
+          </p:nvPr>
+        </p:nvSpPr>
+        <p:spPr/>
+        <p:txBody>
+          <a:bodyPr>
+            <a:normAutofit fontScale="92500" lnSpcReduction="20000"/>
+          </a:bodyPr>
+          <a:lstStyle/>
+          <a:p>
+            <a:pPr marL="0" indent="0">
+              <a:buNone/>
+            </a:pPr>
+            <a:r>
+              <a:rPr lang="en-CA" b="1" dirty="0"/>
+              <a:t>Activity #5 – Resolving Conflicts</a:t>
+            </a:r>
+          </a:p>
+          <a:p>
+            <a:pPr marL="514350" indent="-514350">
+              <a:buFont typeface="+mj-lt"/>
+              <a:buAutoNum type="arabicPeriod"/>
+            </a:pPr>
+            <a:r>
+              <a:rPr lang="en-CA" dirty="0"/>
+              <a:t>In both branches, make a change on the </a:t>
+            </a:r>
+            <a:r>
+              <a:rPr lang="en-CA" b="1" dirty="0"/>
+              <a:t>same line</a:t>
+            </a:r>
+            <a:r>
+              <a:rPr lang="en-CA" dirty="0"/>
+              <a:t> and commit it</a:t>
+            </a:r>
+          </a:p>
+          <a:p>
+            <a:pPr marL="514350" indent="-514350">
+              <a:buFont typeface="+mj-lt"/>
+              <a:buAutoNum type="arabicPeriod"/>
+            </a:pPr>
+            <a:endParaRPr lang="en-CA" dirty="0"/>
+          </a:p>
+          <a:p>
+            <a:pPr marL="514350" indent="-514350">
+              <a:buFont typeface="+mj-lt"/>
+              <a:buAutoNum type="arabicPeriod"/>
+            </a:pPr>
+            <a:r>
+              <a:rPr lang="en-CA" dirty="0"/>
+              <a:t>Try and merge your second branch into the main</a:t>
+            </a:r>
+          </a:p>
+          <a:p>
+            <a:pPr marL="514350" indent="-514350">
+              <a:buFont typeface="+mj-lt"/>
+              <a:buAutoNum type="arabicPeriod"/>
+            </a:pPr>
+            <a:endParaRPr lang="en-CA" dirty="0"/>
+          </a:p>
+          <a:p>
+            <a:pPr marL="514350" indent="-514350">
+              <a:buFont typeface="+mj-lt"/>
+              <a:buAutoNum type="arabicPeriod"/>
+            </a:pPr>
+            <a:r>
+              <a:rPr lang="en-CA" dirty="0"/>
+              <a:t>When the merge conflict occurs, open the text file and resolve the issue</a:t>
+            </a:r>
+          </a:p>
+          <a:p>
+            <a:pPr marL="514350" indent="-514350">
+              <a:buFont typeface="+mj-lt"/>
+              <a:buAutoNum type="arabicPeriod"/>
+            </a:pPr>
+            <a:endParaRPr lang="en-CA" dirty="0"/>
+          </a:p>
+          <a:p>
+            <a:pPr marL="514350" indent="-514350">
+              <a:buFont typeface="+mj-lt"/>
+              <a:buAutoNum type="arabicPeriod"/>
+            </a:pPr>
+            <a:r>
+              <a:rPr lang="en-CA" dirty="0"/>
+              <a:t>Try to merge again</a:t>
+            </a:r>
+          </a:p>
+          <a:p>
+            <a:pPr marL="514350" indent="-514350">
+              <a:buFont typeface="+mj-lt"/>
+              <a:buAutoNum type="arabicPeriod"/>
+            </a:pPr>
+            <a:endParaRPr lang="en-CA" dirty="0"/>
+          </a:p>
+          <a:p>
+            <a:pPr marL="514350" indent="-514350">
+              <a:buFont typeface="+mj-lt"/>
+              <a:buAutoNum type="arabicPeriod"/>
+            </a:pPr>
+            <a:r>
+              <a:rPr lang="en-CA" dirty="0"/>
+              <a:t>Look at your commit history, how is your resolved merge shown in the commit?</a:t>
+            </a:r>
+          </a:p>
+        </p:txBody>
+      </p:sp>
+    </p:spTree>
+    <p:extLst>
+      <p:ext uri="{BB962C8B-B14F-4D97-AF65-F5344CB8AC3E}">
+        <p14:creationId xmlns:p14="http://schemas.microsoft.com/office/powerpoint/2010/main" val="1616421621"/>
+      </p:ext>
+    </p:extLst>
+  </p:cSld>
+  <p:clrMapOvr>
+    <a:masterClrMapping/>
+  </p:clrMapOvr>
+</p:sld>
+</file>
+
+<file path=ppt/slides/slide4.xml><?xml version="1.0" encoding="utf-8"?>
+<p:sld xmlns:a="http://schemas.openxmlformats.org/drawingml/2006/main" xmlns:r="http://schemas.openxmlformats.org/officeDocument/2006/relationships" xmlns:p="http://schemas.openxmlformats.org/presentationml/2006/main">
+  <p:cSld>
+    <p:spTree>
+      <p:nvGrpSpPr>
+        <p:cNvPr id="1" name=""/>
+        <p:cNvGrpSpPr/>
+        <p:nvPr/>
+      </p:nvGrpSpPr>
+      <p:grpSpPr>
+        <a:xfrm>
+          <a:off x="0" y="0"/>
+          <a:ext cx="0" cy="0"/>
+          <a:chOff x="0" y="0"/>
+          <a:chExt cx="0" cy="0"/>
+        </a:xfrm>
+      </p:grpSpPr>
+      <p:sp>
+        <p:nvSpPr>
+          <p:cNvPr id="2" name="Text Placeholder 1">
+            <a:extLst>
+              <a:ext uri="{FF2B5EF4-FFF2-40B4-BE49-F238E27FC236}">
+                <a16:creationId xmlns:a16="http://schemas.microsoft.com/office/drawing/2014/main" id="{FC7A004E-DF48-DFF4-8D27-CC4C90721AC0}"/>
+              </a:ext>
+            </a:extLst>
+          </p:cNvPr>
+          <p:cNvSpPr>
+            <a:spLocks noGrp="1"/>
+          </p:cNvSpPr>
+          <p:nvPr>
+            <p:ph type="body" sz="quarter" idx="10"/>
+          </p:nvPr>
+        </p:nvSpPr>
+        <p:spPr/>
+        <p:txBody>
+          <a:bodyPr>
+            <a:normAutofit lnSpcReduction="10000"/>
+          </a:bodyPr>
+          <a:lstStyle/>
+          <a:p>
+            <a:pPr marL="0" indent="0">
+              <a:buNone/>
+            </a:pPr>
+            <a:r>
+              <a:rPr lang="en-CA" b="1" dirty="0"/>
+              <a:t>Hands-on Activities:</a:t>
+            </a:r>
+          </a:p>
+          <a:p>
+            <a:r>
+              <a:rPr lang="en-CA" dirty="0"/>
+              <a:t>Quick Review Polls</a:t>
+            </a:r>
+          </a:p>
+          <a:p>
+            <a:r>
+              <a:rPr lang="en-CA" dirty="0"/>
+              <a:t>Git/GitHub exercises</a:t>
+            </a:r>
+          </a:p>
+          <a:p>
+            <a:pPr marL="0" indent="0">
+              <a:buNone/>
+            </a:pPr>
+            <a:endParaRPr lang="en-CA" b="1" dirty="0"/>
+          </a:p>
+          <a:p>
+            <a:pPr marL="0" indent="0">
+              <a:buNone/>
+            </a:pPr>
+            <a:r>
+              <a:rPr lang="en-CA" b="1" dirty="0"/>
+              <a:t>What you will need:</a:t>
+            </a:r>
+          </a:p>
+          <a:p>
+            <a:pPr marL="514350" indent="-514350">
+              <a:buFont typeface="+mj-lt"/>
+              <a:buAutoNum type="arabicPeriod"/>
+            </a:pPr>
+            <a:r>
+              <a:rPr lang="en-CA" dirty="0"/>
+              <a:t>GitHub Desktop App</a:t>
+            </a:r>
+          </a:p>
+          <a:p>
+            <a:pPr marL="514350" indent="-514350">
+              <a:buFont typeface="+mj-lt"/>
+              <a:buAutoNum type="arabicPeriod"/>
+            </a:pPr>
+            <a:r>
+              <a:rPr lang="en-CA" dirty="0"/>
+              <a:t>A Text editor</a:t>
+            </a:r>
+          </a:p>
+          <a:p>
+            <a:pPr marL="0" indent="0">
+              <a:buNone/>
+            </a:pPr>
+            <a:endParaRPr lang="en-CA" dirty="0"/>
+          </a:p>
+          <a:p>
+            <a:pPr marL="0" indent="0">
+              <a:buNone/>
+            </a:pPr>
+            <a:r>
+              <a:rPr lang="en-CA" b="1" dirty="0"/>
+              <a:t>Note</a:t>
+            </a:r>
+            <a:r>
+              <a:rPr lang="en-CA" dirty="0"/>
+              <a:t>: Feel free to complete the workshop through the terminal</a:t>
+            </a:r>
+            <a:endParaRPr lang="en-CA" b="1" dirty="0"/>
+          </a:p>
+          <a:p>
+            <a:pPr marL="514350" indent="-514350">
+              <a:buFont typeface="+mj-lt"/>
+              <a:buAutoNum type="arabicPeriod"/>
+            </a:pPr>
+            <a:endParaRPr lang="en-CA" dirty="0"/>
+          </a:p>
+          <a:p>
+            <a:pPr marL="0" indent="0">
+              <a:buNone/>
+            </a:pPr>
+            <a:endParaRPr lang="en-CA" dirty="0"/>
+          </a:p>
+        </p:txBody>
+      </p:sp>
+    </p:spTree>
+    <p:extLst>
+      <p:ext uri="{BB962C8B-B14F-4D97-AF65-F5344CB8AC3E}">
+        <p14:creationId xmlns:p14="http://schemas.microsoft.com/office/powerpoint/2010/main" val="4043592756"/>
+      </p:ext>
+    </p:extLst>
+  </p:cSld>
+  <p:clrMapOvr>
+    <a:masterClrMapping/>
+  </p:clrMapOvr>
+</p:sld>
+</file>
+
+<file path=ppt/slides/slide40.xml><?xml version="1.0" encoding="utf-8"?>
 <p:sld xmlns:a="http://schemas.openxmlformats.org/drawingml/2006/main" xmlns:r="http://schemas.openxmlformats.org/officeDocument/2006/relationships" xmlns:p="http://schemas.openxmlformats.org/presentationml/2006/main">
   <p:cSld>
     <p:spTree>
@@ -17105,7 +19177,7 @@
 </p:sld>
 </file>
 
-<file path=ppt/slides/slide34.xml><?xml version="1.0" encoding="utf-8"?>
+<file path=ppt/slides/slide41.xml><?xml version="1.0" encoding="utf-8"?>
 <p:sld xmlns:a="http://schemas.openxmlformats.org/drawingml/2006/main" xmlns:r="http://schemas.openxmlformats.org/officeDocument/2006/relationships" xmlns:p="http://schemas.openxmlformats.org/presentationml/2006/main">
   <p:cSld>
     <p:spTree>
@@ -17400,7 +19472,7 @@
 </p:sld>
 </file>
 
-<file path=ppt/slides/slide35.xml><?xml version="1.0" encoding="utf-8"?>
+<file path=ppt/slides/slide42.xml><?xml version="1.0" encoding="utf-8"?>
 <p:sld xmlns:a="http://schemas.openxmlformats.org/drawingml/2006/main" xmlns:r="http://schemas.openxmlformats.org/officeDocument/2006/relationships" xmlns:p="http://schemas.openxmlformats.org/presentationml/2006/main">
   <p:cSld>
     <p:spTree>
@@ -17458,7 +19530,7 @@
 </p:sld>
 </file>
 
-<file path=ppt/slides/slide36.xml><?xml version="1.0" encoding="utf-8"?>
+<file path=ppt/slides/slide43.xml><?xml version="1.0" encoding="utf-8"?>
 <p:sld xmlns:a="http://schemas.openxmlformats.org/drawingml/2006/main" xmlns:r="http://schemas.openxmlformats.org/officeDocument/2006/relationships" xmlns:p="http://schemas.openxmlformats.org/presentationml/2006/main">
   <p:cSld>
     <p:spTree>
@@ -17516,7 +19588,7 @@
 </p:sld>
 </file>
 
-<file path=ppt/slides/slide37.xml><?xml version="1.0" encoding="utf-8"?>
+<file path=ppt/slides/slide44.xml><?xml version="1.0" encoding="utf-8"?>
 <p:sld xmlns:a="http://schemas.openxmlformats.org/drawingml/2006/main" xmlns:r="http://schemas.openxmlformats.org/officeDocument/2006/relationships" xmlns:p="http://schemas.openxmlformats.org/presentationml/2006/main">
   <p:cSld>
     <p:spTree>
@@ -17679,7 +19751,7 @@
 </p:sld>
 </file>
 
-<file path=ppt/slides/slide38.xml><?xml version="1.0" encoding="utf-8"?>
+<file path=ppt/slides/slide45.xml><?xml version="1.0" encoding="utf-8"?>
 <p:sld xmlns:a="http://schemas.openxmlformats.org/drawingml/2006/main" xmlns:r="http://schemas.openxmlformats.org/officeDocument/2006/relationships" xmlns:p="http://schemas.openxmlformats.org/presentationml/2006/main">
   <p:cSld>
     <p:spTree>
@@ -17764,7 +19836,7 @@
 </p:sld>
 </file>
 
-<file path=ppt/slides/slide39.xml><?xml version="1.0" encoding="utf-8"?>
+<file path=ppt/slides/slide46.xml><?xml version="1.0" encoding="utf-8"?>
 <p:sld xmlns:a="http://schemas.openxmlformats.org/drawingml/2006/main" xmlns:r="http://schemas.openxmlformats.org/officeDocument/2006/relationships" xmlns:p="http://schemas.openxmlformats.org/presentationml/2006/main">
   <p:cSld>
     <p:spTree>
@@ -17882,150 +19954,7 @@
 </p:sld>
 </file>
 
-<file path=ppt/slides/slide4.xml><?xml version="1.0" encoding="utf-8"?>
-<p:sld xmlns:a="http://schemas.openxmlformats.org/drawingml/2006/main" xmlns:r="http://schemas.openxmlformats.org/officeDocument/2006/relationships" xmlns:p="http://schemas.openxmlformats.org/presentationml/2006/main">
-  <p:cSld>
-    <p:spTree>
-      <p:nvGrpSpPr>
-        <p:cNvPr id="1" name=""/>
-        <p:cNvGrpSpPr/>
-        <p:nvPr/>
-      </p:nvGrpSpPr>
-      <p:grpSpPr>
-        <a:xfrm>
-          <a:off x="0" y="0"/>
-          <a:ext cx="0" cy="0"/>
-          <a:chOff x="0" y="0"/>
-          <a:chExt cx="0" cy="0"/>
-        </a:xfrm>
-      </p:grpSpPr>
-      <p:sp>
-        <p:nvSpPr>
-          <p:cNvPr id="2" name="Text Placeholder 1">
-            <a:extLst>
-              <a:ext uri="{FF2B5EF4-FFF2-40B4-BE49-F238E27FC236}">
-                <a16:creationId xmlns:a16="http://schemas.microsoft.com/office/drawing/2014/main" id="{FC7A004E-DF48-DFF4-8D27-CC4C90721AC0}"/>
-              </a:ext>
-            </a:extLst>
-          </p:cNvPr>
-          <p:cNvSpPr>
-            <a:spLocks noGrp="1"/>
-          </p:cNvSpPr>
-          <p:nvPr>
-            <p:ph type="body" sz="quarter" idx="10"/>
-          </p:nvPr>
-        </p:nvSpPr>
-        <p:spPr/>
-        <p:txBody>
-          <a:bodyPr>
-            <a:normAutofit lnSpcReduction="10000"/>
-          </a:bodyPr>
-          <a:lstStyle/>
-          <a:p>
-            <a:pPr marL="0" indent="0">
-              <a:buNone/>
-            </a:pPr>
-            <a:r>
-              <a:rPr lang="en-CA" b="1" dirty="0"/>
-              <a:t>Hands-on Activities:</a:t>
-            </a:r>
-          </a:p>
-          <a:p>
-            <a:r>
-              <a:rPr lang="en-CA" dirty="0"/>
-              <a:t>Quick Review Polls</a:t>
-            </a:r>
-          </a:p>
-          <a:p>
-            <a:r>
-              <a:rPr lang="en-CA" dirty="0"/>
-              <a:t>Git/GitHub exercises</a:t>
-            </a:r>
-          </a:p>
-          <a:p>
-            <a:pPr marL="0" indent="0">
-              <a:buNone/>
-            </a:pPr>
-            <a:endParaRPr lang="en-CA" b="1" dirty="0"/>
-          </a:p>
-          <a:p>
-            <a:pPr marL="0" indent="0">
-              <a:buNone/>
-            </a:pPr>
-            <a:r>
-              <a:rPr lang="en-CA" b="1" dirty="0"/>
-              <a:t>What you will need:</a:t>
-            </a:r>
-          </a:p>
-          <a:p>
-            <a:pPr marL="514350" indent="-514350">
-              <a:buFont typeface="+mj-lt"/>
-              <a:buAutoNum type="arabicPeriod"/>
-            </a:pPr>
-            <a:r>
-              <a:rPr lang="en-CA" dirty="0"/>
-              <a:t>GitHub Desktop App</a:t>
-            </a:r>
-          </a:p>
-          <a:p>
-            <a:pPr marL="514350" indent="-514350">
-              <a:buFont typeface="+mj-lt"/>
-              <a:buAutoNum type="arabicPeriod"/>
-            </a:pPr>
-            <a:r>
-              <a:rPr lang="en-CA" dirty="0"/>
-              <a:t>A Text editor</a:t>
-            </a:r>
-          </a:p>
-          <a:p>
-            <a:pPr marL="0" indent="0">
-              <a:buNone/>
-            </a:pPr>
-            <a:endParaRPr lang="en-CA" dirty="0"/>
-          </a:p>
-          <a:p>
-            <a:pPr marL="0" indent="0">
-              <a:buNone/>
-            </a:pPr>
-            <a:r>
-              <a:rPr lang="en-CA" b="1" dirty="0"/>
-              <a:t>Note</a:t>
-            </a:r>
-            <a:r>
-              <a:rPr lang="en-CA" dirty="0"/>
-              <a:t>: Feel free to complete the workshop through the terminal</a:t>
-            </a:r>
-            <a:endParaRPr lang="en-CA" b="1" dirty="0"/>
-          </a:p>
-          <a:p>
-            <a:pPr marL="514350" indent="-514350">
-              <a:buFont typeface="+mj-lt"/>
-              <a:buAutoNum type="arabicPeriod"/>
-            </a:pPr>
-            <a:endParaRPr lang="en-CA" dirty="0"/>
-          </a:p>
-          <a:p>
-            <a:pPr marL="0" indent="0">
-              <a:buNone/>
-            </a:pPr>
-            <a:endParaRPr lang="en-CA" dirty="0"/>
-          </a:p>
-        </p:txBody>
-      </p:sp>
-    </p:spTree>
-    <p:extLst>
-      <p:ext uri="{BB962C8B-B14F-4D97-AF65-F5344CB8AC3E}">
-        <p14:creationId xmlns:p14="http://schemas.microsoft.com/office/powerpoint/2010/main" val="4043592756"/>
-      </p:ext>
-    </p:extLst>
-  </p:cSld>
-  <p:clrMapOvr>
-    <a:masterClrMapping/>
-  </p:clrMapOvr>
-</p:sld>
-</file>
-
-<file path=ppt/slides/slide40.xml><?xml version="1.0" encoding="utf-8"?>
+<file path=ppt/slides/slide47.xml><?xml version="1.0" encoding="utf-8"?>
 <p:sld xmlns:a="http://schemas.openxmlformats.org/drawingml/2006/main" xmlns:r="http://schemas.openxmlformats.org/officeDocument/2006/relationships" xmlns:p="http://schemas.openxmlformats.org/presentationml/2006/main">
   <p:cSld>
     <p:spTree>
@@ -18110,7 +20039,7 @@
 </p:sld>
 </file>
 
-<file path=ppt/slides/slide41.xml><?xml version="1.0" encoding="utf-8"?>
+<file path=ppt/slides/slide48.xml><?xml version="1.0" encoding="utf-8"?>
 <p:sld xmlns:a="http://schemas.openxmlformats.org/drawingml/2006/main" xmlns:r="http://schemas.openxmlformats.org/officeDocument/2006/relationships" xmlns:p="http://schemas.openxmlformats.org/presentationml/2006/main">
   <p:cSld>
     <p:spTree>
@@ -18151,6 +20080,100 @@
             <a:pPr marL="0" indent="0">
               <a:buNone/>
             </a:pPr>
+            <a:r>
+              <a:rPr lang="en-CA" b="1" dirty="0"/>
+              <a:t>Activity #6 – Pushing commits to GitHub</a:t>
+            </a:r>
+          </a:p>
+          <a:p>
+            <a:pPr marL="0" indent="0">
+              <a:buNone/>
+            </a:pPr>
+            <a:endParaRPr lang="en-CA" b="1" dirty="0"/>
+          </a:p>
+          <a:p>
+            <a:pPr marL="514350" indent="-514350">
+              <a:buFont typeface="+mj-lt"/>
+              <a:buAutoNum type="arabicPeriod"/>
+            </a:pPr>
+            <a:r>
+              <a:rPr lang="en-CA" dirty="0"/>
+              <a:t>Click the “Publish Repository” button</a:t>
+            </a:r>
+          </a:p>
+          <a:p>
+            <a:pPr marL="514350" indent="-514350">
+              <a:buFont typeface="+mj-lt"/>
+              <a:buAutoNum type="arabicPeriod"/>
+            </a:pPr>
+            <a:endParaRPr lang="en-CA" dirty="0"/>
+          </a:p>
+          <a:p>
+            <a:pPr marL="514350" indent="-514350">
+              <a:buFont typeface="+mj-lt"/>
+              <a:buAutoNum type="arabicPeriod"/>
+            </a:pPr>
+            <a:r>
+              <a:rPr lang="en-CA" dirty="0"/>
+              <a:t>Now open your GitHub account in the browser and find your repository. See if your commit history is the same as in your local repo.</a:t>
+            </a:r>
+          </a:p>
+        </p:txBody>
+      </p:sp>
+    </p:spTree>
+    <p:extLst>
+      <p:ext uri="{BB962C8B-B14F-4D97-AF65-F5344CB8AC3E}">
+        <p14:creationId xmlns:p14="http://schemas.microsoft.com/office/powerpoint/2010/main" val="1796213204"/>
+      </p:ext>
+    </p:extLst>
+  </p:cSld>
+  <p:clrMapOvr>
+    <a:masterClrMapping/>
+  </p:clrMapOvr>
+</p:sld>
+</file>
+
+<file path=ppt/slides/slide49.xml><?xml version="1.0" encoding="utf-8"?>
+<p:sld xmlns:a="http://schemas.openxmlformats.org/drawingml/2006/main" xmlns:r="http://schemas.openxmlformats.org/officeDocument/2006/relationships" xmlns:p="http://schemas.openxmlformats.org/presentationml/2006/main">
+  <p:cSld>
+    <p:spTree>
+      <p:nvGrpSpPr>
+        <p:cNvPr id="1" name=""/>
+        <p:cNvGrpSpPr/>
+        <p:nvPr/>
+      </p:nvGrpSpPr>
+      <p:grpSpPr>
+        <a:xfrm>
+          <a:off x="0" y="0"/>
+          <a:ext cx="0" cy="0"/>
+          <a:chOff x="0" y="0"/>
+          <a:chExt cx="0" cy="0"/>
+        </a:xfrm>
+      </p:grpSpPr>
+      <p:sp>
+        <p:nvSpPr>
+          <p:cNvPr id="2" name="Text Placeholder 1">
+            <a:extLst>
+              <a:ext uri="{FF2B5EF4-FFF2-40B4-BE49-F238E27FC236}">
+                <a16:creationId xmlns:a16="http://schemas.microsoft.com/office/drawing/2014/main" id="{F30F071A-0450-8F6E-F28D-8124D7A90523}"/>
+              </a:ext>
+            </a:extLst>
+          </p:cNvPr>
+          <p:cNvSpPr>
+            <a:spLocks noGrp="1"/>
+          </p:cNvSpPr>
+          <p:nvPr>
+            <p:ph type="body" sz="quarter" idx="10"/>
+          </p:nvPr>
+        </p:nvSpPr>
+        <p:spPr/>
+        <p:txBody>
+          <a:bodyPr/>
+          <a:lstStyle/>
+          <a:p>
+            <a:pPr marL="0" indent="0">
+              <a:buNone/>
+            </a:pPr>
             <a:endParaRPr lang="en-CA" b="1" dirty="0"/>
           </a:p>
           <a:p>
@@ -18195,7 +20218,229 @@
 </p:sld>
 </file>
 
-<file path=ppt/slides/slide42.xml><?xml version="1.0" encoding="utf-8"?>
+<file path=ppt/slides/slide5.xml><?xml version="1.0" encoding="utf-8"?>
+<p:sld xmlns:a="http://schemas.openxmlformats.org/drawingml/2006/main" xmlns:r="http://schemas.openxmlformats.org/officeDocument/2006/relationships" xmlns:p="http://schemas.openxmlformats.org/presentationml/2006/main">
+  <p:cSld>
+    <p:spTree>
+      <p:nvGrpSpPr>
+        <p:cNvPr id="1" name=""/>
+        <p:cNvGrpSpPr/>
+        <p:nvPr/>
+      </p:nvGrpSpPr>
+      <p:grpSpPr>
+        <a:xfrm>
+          <a:off x="0" y="0"/>
+          <a:ext cx="0" cy="0"/>
+          <a:chOff x="0" y="0"/>
+          <a:chExt cx="0" cy="0"/>
+        </a:xfrm>
+      </p:grpSpPr>
+      <p:sp>
+        <p:nvSpPr>
+          <p:cNvPr id="2" name="Text Placeholder 1">
+            <a:extLst>
+              <a:ext uri="{FF2B5EF4-FFF2-40B4-BE49-F238E27FC236}">
+                <a16:creationId xmlns:a16="http://schemas.microsoft.com/office/drawing/2014/main" id="{09E2662B-C95B-76DF-8523-2BDCBE3A731E}"/>
+              </a:ext>
+            </a:extLst>
+          </p:cNvPr>
+          <p:cNvSpPr>
+            <a:spLocks noGrp="1"/>
+          </p:cNvSpPr>
+          <p:nvPr>
+            <p:ph type="body" sz="quarter" idx="10"/>
+          </p:nvPr>
+        </p:nvSpPr>
+        <p:spPr/>
+        <p:txBody>
+          <a:bodyPr/>
+          <a:lstStyle/>
+          <a:p>
+            <a:pPr marL="0" indent="0">
+              <a:buNone/>
+            </a:pPr>
+            <a:r>
+              <a:rPr lang="en-CA" b="1" dirty="0"/>
+              <a:t>What you WILL learn</a:t>
+            </a:r>
+          </a:p>
+          <a:p>
+            <a:r>
+              <a:rPr lang="en-CA" dirty="0"/>
+              <a:t>Basic theory and features behind Git and GitHub</a:t>
+            </a:r>
+          </a:p>
+          <a:p>
+            <a:r>
+              <a:rPr lang="en-CA" dirty="0"/>
+              <a:t>How to manage local and remote repositories</a:t>
+            </a:r>
+          </a:p>
+          <a:p>
+            <a:pPr marL="0" indent="0">
+              <a:buNone/>
+            </a:pPr>
+            <a:endParaRPr lang="en-CA" dirty="0"/>
+          </a:p>
+          <a:p>
+            <a:pPr marL="0" indent="0">
+              <a:buNone/>
+            </a:pPr>
+            <a:r>
+              <a:rPr lang="en-CA" b="1" dirty="0"/>
+              <a:t>What you will NOT learn</a:t>
+            </a:r>
+          </a:p>
+          <a:p>
+            <a:r>
+              <a:rPr lang="en-CA" dirty="0"/>
+              <a:t>How to code</a:t>
+            </a:r>
+          </a:p>
+          <a:p>
+            <a:r>
+              <a:rPr lang="en-CA" dirty="0"/>
+              <a:t>Data Analysis</a:t>
+            </a:r>
+          </a:p>
+        </p:txBody>
+      </p:sp>
+    </p:spTree>
+    <p:extLst>
+      <p:ext uri="{BB962C8B-B14F-4D97-AF65-F5344CB8AC3E}">
+        <p14:creationId xmlns:p14="http://schemas.microsoft.com/office/powerpoint/2010/main" val="2837531258"/>
+      </p:ext>
+    </p:extLst>
+  </p:cSld>
+  <p:clrMapOvr>
+    <a:masterClrMapping/>
+  </p:clrMapOvr>
+</p:sld>
+</file>
+
+<file path=ppt/slides/slide50.xml><?xml version="1.0" encoding="utf-8"?>
+<p:sld xmlns:a="http://schemas.openxmlformats.org/drawingml/2006/main" xmlns:r="http://schemas.openxmlformats.org/officeDocument/2006/relationships" xmlns:p="http://schemas.openxmlformats.org/presentationml/2006/main">
+  <p:cSld>
+    <p:spTree>
+      <p:nvGrpSpPr>
+        <p:cNvPr id="1" name=""/>
+        <p:cNvGrpSpPr/>
+        <p:nvPr/>
+      </p:nvGrpSpPr>
+      <p:grpSpPr>
+        <a:xfrm>
+          <a:off x="0" y="0"/>
+          <a:ext cx="0" cy="0"/>
+          <a:chOff x="0" y="0"/>
+          <a:chExt cx="0" cy="0"/>
+        </a:xfrm>
+      </p:grpSpPr>
+      <p:sp>
+        <p:nvSpPr>
+          <p:cNvPr id="2" name="Text Placeholder 1">
+            <a:extLst>
+              <a:ext uri="{FF2B5EF4-FFF2-40B4-BE49-F238E27FC236}">
+                <a16:creationId xmlns:a16="http://schemas.microsoft.com/office/drawing/2014/main" id="{F30F071A-0450-8F6E-F28D-8124D7A90523}"/>
+              </a:ext>
+            </a:extLst>
+          </p:cNvPr>
+          <p:cNvSpPr>
+            <a:spLocks noGrp="1"/>
+          </p:cNvSpPr>
+          <p:nvPr>
+            <p:ph type="body" sz="quarter" idx="10"/>
+          </p:nvPr>
+        </p:nvSpPr>
+        <p:spPr/>
+        <p:txBody>
+          <a:bodyPr/>
+          <a:lstStyle/>
+          <a:p>
+            <a:pPr marL="0" indent="0">
+              <a:buNone/>
+            </a:pPr>
+            <a:r>
+              <a:rPr lang="en-CA" b="1" dirty="0"/>
+              <a:t>Activity #7 – Pulling Commits from GitHub</a:t>
+            </a:r>
+          </a:p>
+          <a:p>
+            <a:pPr marL="514350" indent="-514350">
+              <a:buFont typeface="+mj-lt"/>
+              <a:buAutoNum type="arabicPeriod"/>
+            </a:pPr>
+            <a:r>
+              <a:rPr lang="en-CA" dirty="0"/>
+              <a:t>From the GitHub website, open your file and select the edit option</a:t>
+            </a:r>
+          </a:p>
+          <a:p>
+            <a:pPr marL="514350" indent="-514350">
+              <a:buFont typeface="+mj-lt"/>
+              <a:buAutoNum type="arabicPeriod"/>
+            </a:pPr>
+            <a:endParaRPr lang="en-CA" dirty="0"/>
+          </a:p>
+          <a:p>
+            <a:pPr marL="514350" indent="-514350">
+              <a:buFont typeface="+mj-lt"/>
+              <a:buAutoNum type="arabicPeriod"/>
+            </a:pPr>
+            <a:r>
+              <a:rPr lang="en-CA" dirty="0"/>
+              <a:t>Make a change to the file and commit it.</a:t>
+            </a:r>
+          </a:p>
+          <a:p>
+            <a:pPr marL="514350" indent="-514350">
+              <a:buFont typeface="+mj-lt"/>
+              <a:buAutoNum type="arabicPeriod"/>
+            </a:pPr>
+            <a:endParaRPr lang="en-CA" dirty="0"/>
+          </a:p>
+          <a:p>
+            <a:pPr marL="514350" indent="-514350">
+              <a:buFont typeface="+mj-lt"/>
+              <a:buAutoNum type="arabicPeriod"/>
+            </a:pPr>
+            <a:r>
+              <a:rPr lang="en-CA" dirty="0"/>
+              <a:t>Return to the desktop app and do Repository -&gt; Pull</a:t>
+            </a:r>
+          </a:p>
+          <a:p>
+            <a:pPr marL="514350" indent="-514350">
+              <a:buFont typeface="+mj-lt"/>
+              <a:buAutoNum type="arabicPeriod"/>
+            </a:pPr>
+            <a:endParaRPr lang="en-CA" dirty="0"/>
+          </a:p>
+          <a:p>
+            <a:pPr marL="514350" indent="-514350">
+              <a:buFont typeface="+mj-lt"/>
+              <a:buAutoNum type="arabicPeriod"/>
+            </a:pPr>
+            <a:r>
+              <a:rPr lang="en-CA" dirty="0"/>
+              <a:t>Look at your commit history and your file, what do you see?</a:t>
+            </a:r>
+          </a:p>
+        </p:txBody>
+      </p:sp>
+    </p:spTree>
+    <p:extLst>
+      <p:ext uri="{BB962C8B-B14F-4D97-AF65-F5344CB8AC3E}">
+        <p14:creationId xmlns:p14="http://schemas.microsoft.com/office/powerpoint/2010/main" val="3513683659"/>
+      </p:ext>
+    </p:extLst>
+  </p:cSld>
+  <p:clrMapOvr>
+    <a:masterClrMapping/>
+  </p:clrMapOvr>
+</p:sld>
+</file>
+
+<file path=ppt/slides/slide51.xml><?xml version="1.0" encoding="utf-8"?>
 <p:sld xmlns:a="http://schemas.openxmlformats.org/drawingml/2006/main" xmlns:r="http://schemas.openxmlformats.org/officeDocument/2006/relationships" xmlns:p="http://schemas.openxmlformats.org/presentationml/2006/main">
   <p:cSld>
     <p:spTree>
@@ -18360,7 +20605,7 @@
 </p:sld>
 </file>
 
-<file path=ppt/slides/slide43.xml><?xml version="1.0" encoding="utf-8"?>
+<file path=ppt/slides/slide52.xml><?xml version="1.0" encoding="utf-8"?>
 <p:sld xmlns:a="http://schemas.openxmlformats.org/drawingml/2006/main" xmlns:r="http://schemas.openxmlformats.org/officeDocument/2006/relationships" xmlns:p="http://schemas.openxmlformats.org/presentationml/2006/main">
   <p:cSld>
     <p:spTree>
@@ -18454,7 +20699,146 @@
 </p:sld>
 </file>
 
-<file path=ppt/slides/slide44.xml><?xml version="1.0" encoding="utf-8"?>
+<file path=ppt/slides/slide53.xml><?xml version="1.0" encoding="utf-8"?>
+<p:sld xmlns:a="http://schemas.openxmlformats.org/drawingml/2006/main" xmlns:r="http://schemas.openxmlformats.org/officeDocument/2006/relationships" xmlns:p="http://schemas.openxmlformats.org/presentationml/2006/main">
+  <p:cSld>
+    <p:spTree>
+      <p:nvGrpSpPr>
+        <p:cNvPr id="1" name=""/>
+        <p:cNvGrpSpPr/>
+        <p:nvPr/>
+      </p:nvGrpSpPr>
+      <p:grpSpPr>
+        <a:xfrm>
+          <a:off x="0" y="0"/>
+          <a:ext cx="0" cy="0"/>
+          <a:chOff x="0" y="0"/>
+          <a:chExt cx="0" cy="0"/>
+        </a:xfrm>
+      </p:grpSpPr>
+      <p:sp>
+        <p:nvSpPr>
+          <p:cNvPr id="2" name="Text Placeholder 1">
+            <a:extLst>
+              <a:ext uri="{FF2B5EF4-FFF2-40B4-BE49-F238E27FC236}">
+                <a16:creationId xmlns:a16="http://schemas.microsoft.com/office/drawing/2014/main" id="{F30F071A-0450-8F6E-F28D-8124D7A90523}"/>
+              </a:ext>
+            </a:extLst>
+          </p:cNvPr>
+          <p:cNvSpPr>
+            <a:spLocks noGrp="1"/>
+          </p:cNvSpPr>
+          <p:nvPr>
+            <p:ph type="body" sz="quarter" idx="10"/>
+          </p:nvPr>
+        </p:nvSpPr>
+        <p:spPr/>
+        <p:txBody>
+          <a:bodyPr/>
+          <a:lstStyle/>
+          <a:p>
+            <a:pPr marL="0" indent="0">
+              <a:buNone/>
+            </a:pPr>
+            <a:r>
+              <a:rPr lang="en-CA" b="1" dirty="0"/>
+              <a:t>Activity #8 – Clone a Repository</a:t>
+            </a:r>
+          </a:p>
+          <a:p>
+            <a:pPr marL="514350" indent="-514350">
+              <a:buFont typeface="+mj-lt"/>
+              <a:buAutoNum type="arabicPeriod"/>
+            </a:pPr>
+            <a:r>
+              <a:rPr lang="en-CA" dirty="0"/>
+              <a:t>Go to the GitHub website and search for a repo that interests you.</a:t>
+            </a:r>
+          </a:p>
+          <a:p>
+            <a:pPr marL="514350" indent="-514350">
+              <a:buFont typeface="+mj-lt"/>
+              <a:buAutoNum type="arabicPeriod"/>
+            </a:pPr>
+            <a:endParaRPr lang="en-CA" dirty="0"/>
+          </a:p>
+          <a:p>
+            <a:pPr marL="514350" indent="-514350">
+              <a:buFont typeface="+mj-lt"/>
+              <a:buAutoNum type="arabicPeriod"/>
+            </a:pPr>
+            <a:r>
+              <a:rPr lang="en-CA" dirty="0"/>
+              <a:t>Copy the repo’s URL</a:t>
+            </a:r>
+          </a:p>
+          <a:p>
+            <a:pPr marL="514350" indent="-514350">
+              <a:buFont typeface="+mj-lt"/>
+              <a:buAutoNum type="arabicPeriod"/>
+            </a:pPr>
+            <a:endParaRPr lang="en-CA" dirty="0"/>
+          </a:p>
+          <a:p>
+            <a:pPr marL="514350" indent="-514350">
+              <a:buFont typeface="+mj-lt"/>
+              <a:buAutoNum type="arabicPeriod"/>
+            </a:pPr>
+            <a:r>
+              <a:rPr lang="en-CA" dirty="0"/>
+              <a:t>In the Desktop App, do File </a:t>
+            </a:r>
+            <a:r>
+              <a:rPr lang="en-CA" dirty="0">
+                <a:sym typeface="Wingdings" panose="05000000000000000000" pitchFamily="2" charset="2"/>
+              </a:rPr>
+              <a:t> Clone a repository and paste the URL. </a:t>
+            </a:r>
+          </a:p>
+          <a:p>
+            <a:pPr marL="514350" indent="-514350">
+              <a:buFont typeface="+mj-lt"/>
+              <a:buAutoNum type="arabicPeriod"/>
+            </a:pPr>
+            <a:endParaRPr lang="en-CA" dirty="0">
+              <a:sym typeface="Wingdings" panose="05000000000000000000" pitchFamily="2" charset="2"/>
+            </a:endParaRPr>
+          </a:p>
+          <a:p>
+            <a:pPr marL="514350" indent="-514350">
+              <a:buFont typeface="+mj-lt"/>
+              <a:buAutoNum type="arabicPeriod"/>
+            </a:pPr>
+            <a:r>
+              <a:rPr lang="en-CA" dirty="0">
+                <a:sym typeface="Wingdings" panose="05000000000000000000" pitchFamily="2" charset="2"/>
+              </a:rPr>
+              <a:t>Open the cloned repo and explore!</a:t>
+            </a:r>
+          </a:p>
+          <a:p>
+            <a:pPr marL="514350" indent="-514350">
+              <a:buFont typeface="+mj-lt"/>
+              <a:buAutoNum type="arabicPeriod"/>
+            </a:pPr>
+            <a:endParaRPr lang="en-CA" dirty="0"/>
+          </a:p>
+        </p:txBody>
+      </p:sp>
+    </p:spTree>
+    <p:extLst>
+      <p:ext uri="{BB962C8B-B14F-4D97-AF65-F5344CB8AC3E}">
+        <p14:creationId xmlns:p14="http://schemas.microsoft.com/office/powerpoint/2010/main" val="580897146"/>
+      </p:ext>
+    </p:extLst>
+  </p:cSld>
+  <p:clrMapOvr>
+    <a:masterClrMapping/>
+  </p:clrMapOvr>
+</p:sld>
+</file>
+
+<file path=ppt/slides/slide54.xml><?xml version="1.0" encoding="utf-8"?>
 <p:sld xmlns:a="http://schemas.openxmlformats.org/drawingml/2006/main" xmlns:r="http://schemas.openxmlformats.org/officeDocument/2006/relationships" xmlns:p="http://schemas.openxmlformats.org/presentationml/2006/main">
   <p:cSld>
     <p:spTree>
@@ -18585,7 +20969,7 @@
 </p:sld>
 </file>
 
-<file path=ppt/slides/slide45.xml><?xml version="1.0" encoding="utf-8"?>
+<file path=ppt/slides/slide55.xml><?xml version="1.0" encoding="utf-8"?>
 <p:sld xmlns:a="http://schemas.openxmlformats.org/drawingml/2006/main" xmlns:r="http://schemas.openxmlformats.org/officeDocument/2006/relationships" xmlns:p="http://schemas.openxmlformats.org/presentationml/2006/main">
   <p:cSld>
     <p:spTree>
@@ -18684,7 +21068,148 @@
 </p:sld>
 </file>
 
-<file path=ppt/slides/slide46.xml><?xml version="1.0" encoding="utf-8"?>
+<file path=ppt/slides/slide56.xml><?xml version="1.0" encoding="utf-8"?>
+<p:sld xmlns:a="http://schemas.openxmlformats.org/drawingml/2006/main" xmlns:r="http://schemas.openxmlformats.org/officeDocument/2006/relationships" xmlns:p="http://schemas.openxmlformats.org/presentationml/2006/main">
+  <p:cSld>
+    <p:spTree>
+      <p:nvGrpSpPr>
+        <p:cNvPr id="1" name=""/>
+        <p:cNvGrpSpPr/>
+        <p:nvPr/>
+      </p:nvGrpSpPr>
+      <p:grpSpPr>
+        <a:xfrm>
+          <a:off x="0" y="0"/>
+          <a:ext cx="0" cy="0"/>
+          <a:chOff x="0" y="0"/>
+          <a:chExt cx="0" cy="0"/>
+        </a:xfrm>
+      </p:grpSpPr>
+      <p:sp>
+        <p:nvSpPr>
+          <p:cNvPr id="2" name="Text Placeholder 1">
+            <a:extLst>
+              <a:ext uri="{FF2B5EF4-FFF2-40B4-BE49-F238E27FC236}">
+                <a16:creationId xmlns:a16="http://schemas.microsoft.com/office/drawing/2014/main" id="{F30F071A-0450-8F6E-F28D-8124D7A90523}"/>
+              </a:ext>
+            </a:extLst>
+          </p:cNvPr>
+          <p:cNvSpPr>
+            <a:spLocks noGrp="1"/>
+          </p:cNvSpPr>
+          <p:nvPr>
+            <p:ph type="body" sz="quarter" idx="10"/>
+          </p:nvPr>
+        </p:nvSpPr>
+        <p:spPr/>
+        <p:txBody>
+          <a:bodyPr>
+            <a:normAutofit fontScale="92500" lnSpcReduction="20000"/>
+          </a:bodyPr>
+          <a:lstStyle/>
+          <a:p>
+            <a:pPr marL="0" indent="0">
+              <a:buNone/>
+            </a:pPr>
+            <a:r>
+              <a:rPr lang="en-CA" b="1" dirty="0"/>
+              <a:t>Activity #9 – Fork a Repo and make a Pull Request</a:t>
+            </a:r>
+          </a:p>
+          <a:p>
+            <a:pPr marL="514350" indent="-514350">
+              <a:buFont typeface="+mj-lt"/>
+              <a:buAutoNum type="arabicPeriod"/>
+            </a:pPr>
+            <a:r>
+              <a:rPr lang="en-CA" dirty="0"/>
+              <a:t>Open the link in chat to access the repo I made.</a:t>
+            </a:r>
+          </a:p>
+          <a:p>
+            <a:pPr marL="514350" indent="-514350">
+              <a:buFont typeface="+mj-lt"/>
+              <a:buAutoNum type="arabicPeriod"/>
+            </a:pPr>
+            <a:endParaRPr lang="en-CA" dirty="0"/>
+          </a:p>
+          <a:p>
+            <a:pPr marL="514350" indent="-514350">
+              <a:buFont typeface="+mj-lt"/>
+              <a:buAutoNum type="arabicPeriod"/>
+            </a:pPr>
+            <a:r>
+              <a:rPr lang="en-CA" dirty="0"/>
+              <a:t>Click the “fork” button</a:t>
+            </a:r>
+          </a:p>
+          <a:p>
+            <a:pPr marL="514350" indent="-514350">
+              <a:buFont typeface="+mj-lt"/>
+              <a:buAutoNum type="arabicPeriod"/>
+            </a:pPr>
+            <a:endParaRPr lang="en-CA" dirty="0"/>
+          </a:p>
+          <a:p>
+            <a:pPr marL="514350" indent="-514350">
+              <a:buFont typeface="+mj-lt"/>
+              <a:buAutoNum type="arabicPeriod"/>
+            </a:pPr>
+            <a:r>
+              <a:rPr lang="en-CA" dirty="0"/>
+              <a:t>Clone your forked copy to your computer and add a text file with one thing you have learned today. Commit the file.</a:t>
+            </a:r>
+          </a:p>
+          <a:p>
+            <a:pPr marL="514350" indent="-514350">
+              <a:buFont typeface="+mj-lt"/>
+              <a:buAutoNum type="arabicPeriod"/>
+            </a:pPr>
+            <a:endParaRPr lang="en-CA" dirty="0"/>
+          </a:p>
+          <a:p>
+            <a:pPr marL="514350" indent="-514350">
+              <a:buFont typeface="+mj-lt"/>
+              <a:buAutoNum type="arabicPeriod"/>
+            </a:pPr>
+            <a:r>
+              <a:rPr lang="en-CA" dirty="0"/>
+              <a:t>Push the commit to your forked repo.</a:t>
+            </a:r>
+          </a:p>
+          <a:p>
+            <a:pPr marL="514350" indent="-514350">
+              <a:buFont typeface="+mj-lt"/>
+              <a:buAutoNum type="arabicPeriod"/>
+            </a:pPr>
+            <a:endParaRPr lang="en-CA" dirty="0"/>
+          </a:p>
+          <a:p>
+            <a:pPr marL="514350" indent="-514350">
+              <a:buFont typeface="+mj-lt"/>
+              <a:buAutoNum type="arabicPeriod"/>
+            </a:pPr>
+            <a:r>
+              <a:rPr lang="en-CA" dirty="0"/>
+              <a:t>On the GitHub website. Look at your forked repo and select the “create Pull Request” button</a:t>
+            </a:r>
+          </a:p>
+        </p:txBody>
+      </p:sp>
+    </p:spTree>
+    <p:extLst>
+      <p:ext uri="{BB962C8B-B14F-4D97-AF65-F5344CB8AC3E}">
+        <p14:creationId xmlns:p14="http://schemas.microsoft.com/office/powerpoint/2010/main" val="1411733175"/>
+      </p:ext>
+    </p:extLst>
+  </p:cSld>
+  <p:clrMapOvr>
+    <a:masterClrMapping/>
+  </p:clrMapOvr>
+</p:sld>
+</file>
+
+<file path=ppt/slides/slide57.xml><?xml version="1.0" encoding="utf-8"?>
 <p:sld xmlns:a="http://schemas.openxmlformats.org/drawingml/2006/main" xmlns:r="http://schemas.openxmlformats.org/officeDocument/2006/relationships" xmlns:p="http://schemas.openxmlformats.org/presentationml/2006/main">
   <p:cSld>
     <p:spTree>
@@ -19036,7 +21561,7 @@
 </p:sld>
 </file>
 
-<file path=ppt/slides/slide47.xml><?xml version="1.0" encoding="utf-8"?>
+<file path=ppt/slides/slide58.xml><?xml version="1.0" encoding="utf-8"?>
 <p:sld xmlns:a="http://schemas.openxmlformats.org/drawingml/2006/main" xmlns:r="http://schemas.openxmlformats.org/officeDocument/2006/relationships" xmlns:p="http://schemas.openxmlformats.org/presentationml/2006/main">
   <p:cSld>
     <p:spTree>
@@ -19094,7 +21619,7 @@
 </p:sld>
 </file>
 
-<file path=ppt/slides/slide48.xml><?xml version="1.0" encoding="utf-8"?>
+<file path=ppt/slides/slide59.xml><?xml version="1.0" encoding="utf-8"?>
 <p:sld xmlns:a="http://schemas.openxmlformats.org/drawingml/2006/main" xmlns:r="http://schemas.openxmlformats.org/officeDocument/2006/relationships" xmlns:p="http://schemas.openxmlformats.org/presentationml/2006/main">
   <p:cSld>
     <p:spTree>
@@ -19219,7 +21744,67 @@
 </p:sld>
 </file>
 
-<file path=ppt/slides/slide49.xml><?xml version="1.0" encoding="utf-8"?>
+<file path=ppt/slides/slide6.xml><?xml version="1.0" encoding="utf-8"?>
+<p:sld xmlns:a="http://schemas.openxmlformats.org/drawingml/2006/main" xmlns:r="http://schemas.openxmlformats.org/officeDocument/2006/relationships" xmlns:p="http://schemas.openxmlformats.org/presentationml/2006/main">
+  <p:cSld>
+    <p:spTree>
+      <p:nvGrpSpPr>
+        <p:cNvPr id="1" name=""/>
+        <p:cNvGrpSpPr/>
+        <p:nvPr/>
+      </p:nvGrpSpPr>
+      <p:grpSpPr>
+        <a:xfrm>
+          <a:off x="0" y="0"/>
+          <a:ext cx="0" cy="0"/>
+          <a:chOff x="0" y="0"/>
+          <a:chExt cx="0" cy="0"/>
+        </a:xfrm>
+      </p:grpSpPr>
+      <p:pic>
+        <p:nvPicPr>
+          <p:cNvPr id="3" name="Picture 2">
+            <a:extLst>
+              <a:ext uri="{FF2B5EF4-FFF2-40B4-BE49-F238E27FC236}">
+                <a16:creationId xmlns:a16="http://schemas.microsoft.com/office/drawing/2014/main" id="{D63D6295-D41F-B16A-80CA-1D999E04CFC6}"/>
+              </a:ext>
+            </a:extLst>
+          </p:cNvPr>
+          <p:cNvPicPr>
+            <a:picLocks noChangeAspect="1"/>
+          </p:cNvPicPr>
+          <p:nvPr/>
+        </p:nvPicPr>
+        <p:blipFill>
+          <a:blip r:embed="rId2"/>
+          <a:stretch>
+            <a:fillRect/>
+          </a:stretch>
+        </p:blipFill>
+        <p:spPr>
+          <a:xfrm>
+            <a:off x="2690224" y="1489562"/>
+            <a:ext cx="3763552" cy="5018069"/>
+          </a:xfrm>
+          <a:prstGeom prst="rect">
+            <a:avLst/>
+          </a:prstGeom>
+        </p:spPr>
+      </p:pic>
+    </p:spTree>
+    <p:extLst>
+      <p:ext uri="{BB962C8B-B14F-4D97-AF65-F5344CB8AC3E}">
+        <p14:creationId xmlns:p14="http://schemas.microsoft.com/office/powerpoint/2010/main" val="910056172"/>
+      </p:ext>
+    </p:extLst>
+  </p:cSld>
+  <p:clrMapOvr>
+    <a:masterClrMapping/>
+  </p:clrMapOvr>
+</p:sld>
+</file>
+
+<file path=ppt/slides/slide60.xml><?xml version="1.0" encoding="utf-8"?>
 <p:sld xmlns:a="http://schemas.openxmlformats.org/drawingml/2006/main" xmlns:r="http://schemas.openxmlformats.org/officeDocument/2006/relationships" xmlns:p="http://schemas.openxmlformats.org/presentationml/2006/main">
   <p:cSld>
     <p:spTree>
@@ -19553,107 +22138,7 @@
 </p:sld>
 </file>
 
-<file path=ppt/slides/slide5.xml><?xml version="1.0" encoding="utf-8"?>
-<p:sld xmlns:a="http://schemas.openxmlformats.org/drawingml/2006/main" xmlns:r="http://schemas.openxmlformats.org/officeDocument/2006/relationships" xmlns:p="http://schemas.openxmlformats.org/presentationml/2006/main">
-  <p:cSld>
-    <p:spTree>
-      <p:nvGrpSpPr>
-        <p:cNvPr id="1" name=""/>
-        <p:cNvGrpSpPr/>
-        <p:nvPr/>
-      </p:nvGrpSpPr>
-      <p:grpSpPr>
-        <a:xfrm>
-          <a:off x="0" y="0"/>
-          <a:ext cx="0" cy="0"/>
-          <a:chOff x="0" y="0"/>
-          <a:chExt cx="0" cy="0"/>
-        </a:xfrm>
-      </p:grpSpPr>
-      <p:sp>
-        <p:nvSpPr>
-          <p:cNvPr id="2" name="Text Placeholder 1">
-            <a:extLst>
-              <a:ext uri="{FF2B5EF4-FFF2-40B4-BE49-F238E27FC236}">
-                <a16:creationId xmlns:a16="http://schemas.microsoft.com/office/drawing/2014/main" id="{09E2662B-C95B-76DF-8523-2BDCBE3A731E}"/>
-              </a:ext>
-            </a:extLst>
-          </p:cNvPr>
-          <p:cNvSpPr>
-            <a:spLocks noGrp="1"/>
-          </p:cNvSpPr>
-          <p:nvPr>
-            <p:ph type="body" sz="quarter" idx="10"/>
-          </p:nvPr>
-        </p:nvSpPr>
-        <p:spPr/>
-        <p:txBody>
-          <a:bodyPr/>
-          <a:lstStyle/>
-          <a:p>
-            <a:pPr marL="0" indent="0">
-              <a:buNone/>
-            </a:pPr>
-            <a:r>
-              <a:rPr lang="en-CA" b="1" dirty="0"/>
-              <a:t>What you WILL learn</a:t>
-            </a:r>
-          </a:p>
-          <a:p>
-            <a:r>
-              <a:rPr lang="en-CA" dirty="0"/>
-              <a:t>Basic theory and features behind Git and GitHub</a:t>
-            </a:r>
-          </a:p>
-          <a:p>
-            <a:r>
-              <a:rPr lang="en-CA" dirty="0"/>
-              <a:t>How to manage local and remote repositories</a:t>
-            </a:r>
-          </a:p>
-          <a:p>
-            <a:pPr marL="0" indent="0">
-              <a:buNone/>
-            </a:pPr>
-            <a:endParaRPr lang="en-CA" dirty="0"/>
-          </a:p>
-          <a:p>
-            <a:pPr marL="0" indent="0">
-              <a:buNone/>
-            </a:pPr>
-            <a:r>
-              <a:rPr lang="en-CA" b="1" dirty="0"/>
-              <a:t>What you will NOT learn</a:t>
-            </a:r>
-          </a:p>
-          <a:p>
-            <a:r>
-              <a:rPr lang="en-CA" dirty="0"/>
-              <a:t>How to code</a:t>
-            </a:r>
-          </a:p>
-          <a:p>
-            <a:r>
-              <a:rPr lang="en-CA" dirty="0"/>
-              <a:t>Data Analysis</a:t>
-            </a:r>
-          </a:p>
-        </p:txBody>
-      </p:sp>
-    </p:spTree>
-    <p:extLst>
-      <p:ext uri="{BB962C8B-B14F-4D97-AF65-F5344CB8AC3E}">
-        <p14:creationId xmlns:p14="http://schemas.microsoft.com/office/powerpoint/2010/main" val="2837531258"/>
-      </p:ext>
-    </p:extLst>
-  </p:cSld>
-  <p:clrMapOvr>
-    <a:masterClrMapping/>
-  </p:clrMapOvr>
-</p:sld>
-</file>
-
-<file path=ppt/slides/slide50.xml><?xml version="1.0" encoding="utf-8"?>
+<file path=ppt/slides/slide61.xml><?xml version="1.0" encoding="utf-8"?>
 <p:sld xmlns:a="http://schemas.openxmlformats.org/drawingml/2006/main" xmlns:r="http://schemas.openxmlformats.org/officeDocument/2006/relationships" xmlns:p="http://schemas.openxmlformats.org/presentationml/2006/main">
   <p:cSld>
     <p:spTree>
@@ -19712,7 +22197,7 @@
 </p:sld>
 </file>
 
-<file path=ppt/slides/slide51.xml><?xml version="1.0" encoding="utf-8"?>
+<file path=ppt/slides/slide62.xml><?xml version="1.0" encoding="utf-8"?>
 <p:sld xmlns:a="http://schemas.openxmlformats.org/drawingml/2006/main" xmlns:r="http://schemas.openxmlformats.org/officeDocument/2006/relationships" xmlns:p="http://schemas.openxmlformats.org/presentationml/2006/main">
   <p:cSld>
     <p:spTree>
@@ -19827,66 +22312,6 @@
     <p:extLst>
       <p:ext uri="{BB962C8B-B14F-4D97-AF65-F5344CB8AC3E}">
         <p14:creationId xmlns:p14="http://schemas.microsoft.com/office/powerpoint/2010/main" val="2212101275"/>
-      </p:ext>
-    </p:extLst>
-  </p:cSld>
-  <p:clrMapOvr>
-    <a:masterClrMapping/>
-  </p:clrMapOvr>
-</p:sld>
-</file>
-
-<file path=ppt/slides/slide6.xml><?xml version="1.0" encoding="utf-8"?>
-<p:sld xmlns:a="http://schemas.openxmlformats.org/drawingml/2006/main" xmlns:r="http://schemas.openxmlformats.org/officeDocument/2006/relationships" xmlns:p="http://schemas.openxmlformats.org/presentationml/2006/main">
-  <p:cSld>
-    <p:spTree>
-      <p:nvGrpSpPr>
-        <p:cNvPr id="1" name=""/>
-        <p:cNvGrpSpPr/>
-        <p:nvPr/>
-      </p:nvGrpSpPr>
-      <p:grpSpPr>
-        <a:xfrm>
-          <a:off x="0" y="0"/>
-          <a:ext cx="0" cy="0"/>
-          <a:chOff x="0" y="0"/>
-          <a:chExt cx="0" cy="0"/>
-        </a:xfrm>
-      </p:grpSpPr>
-      <p:pic>
-        <p:nvPicPr>
-          <p:cNvPr id="3" name="Picture 2">
-            <a:extLst>
-              <a:ext uri="{FF2B5EF4-FFF2-40B4-BE49-F238E27FC236}">
-                <a16:creationId xmlns:a16="http://schemas.microsoft.com/office/drawing/2014/main" id="{D63D6295-D41F-B16A-80CA-1D999E04CFC6}"/>
-              </a:ext>
-            </a:extLst>
-          </p:cNvPr>
-          <p:cNvPicPr>
-            <a:picLocks noChangeAspect="1"/>
-          </p:cNvPicPr>
-          <p:nvPr/>
-        </p:nvPicPr>
-        <p:blipFill>
-          <a:blip r:embed="rId2"/>
-          <a:stretch>
-            <a:fillRect/>
-          </a:stretch>
-        </p:blipFill>
-        <p:spPr>
-          <a:xfrm>
-            <a:off x="2690224" y="1489562"/>
-            <a:ext cx="3763552" cy="5018069"/>
-          </a:xfrm>
-          <a:prstGeom prst="rect">
-            <a:avLst/>
-          </a:prstGeom>
-        </p:spPr>
-      </p:pic>
-    </p:spTree>
-    <p:extLst>
-      <p:ext uri="{BB962C8B-B14F-4D97-AF65-F5344CB8AC3E}">
-        <p14:creationId xmlns:p14="http://schemas.microsoft.com/office/powerpoint/2010/main" val="910056172"/>
       </p:ext>
     </p:extLst>
   </p:cSld>
@@ -20212,7 +22637,7 @@
           <p:cNvPr id="2" name="Text Placeholder 1">
             <a:extLst>
               <a:ext uri="{FF2B5EF4-FFF2-40B4-BE49-F238E27FC236}">
-                <a16:creationId xmlns:a16="http://schemas.microsoft.com/office/drawing/2014/main" id="{4A4CAD59-1F6A-FED7-6EE0-E9E97EE35FCD}"/>
+                <a16:creationId xmlns:a16="http://schemas.microsoft.com/office/drawing/2014/main" id="{43252691-AD7E-B9B9-8DF3-DB5BADA01947}"/>
               </a:ext>
             </a:extLst>
           </p:cNvPr>
@@ -20223,457 +22648,66 @@
             <p:ph type="body" sz="quarter" idx="10"/>
           </p:nvPr>
         </p:nvSpPr>
-        <p:spPr>
-          <a:xfrm>
-            <a:off x="242372" y="1454228"/>
-            <a:ext cx="8658743" cy="430328"/>
-          </a:xfrm>
-        </p:spPr>
+        <p:spPr/>
         <p:txBody>
           <a:bodyPr>
-            <a:normAutofit fontScale="92500" lnSpcReduction="10000"/>
+            <a:normAutofit fontScale="92500" lnSpcReduction="20000"/>
           </a:bodyPr>
           <a:lstStyle/>
           <a:p>
-            <a:pPr marL="0" indent="0" algn="ctr">
+            <a:pPr marL="0" indent="0">
               <a:buNone/>
             </a:pPr>
             <a:r>
               <a:rPr lang="en-CA" b="1" dirty="0"/>
-              <a:t>Git 			vs.			 GitHub</a:t>
-            </a:r>
-          </a:p>
-        </p:txBody>
-      </p:sp>
-      <p:sp>
-        <p:nvSpPr>
-          <p:cNvPr id="3" name="Espace réservé du contenu 2">
-            <a:extLst>
-              <a:ext uri="{FF2B5EF4-FFF2-40B4-BE49-F238E27FC236}">
-                <a16:creationId xmlns:a16="http://schemas.microsoft.com/office/drawing/2014/main" id="{CAE263CC-C949-1C99-4A6D-072B34B0459A}"/>
-              </a:ext>
-            </a:extLst>
-          </p:cNvPr>
-          <p:cNvSpPr txBox="1">
-            <a:spLocks/>
-          </p:cNvSpPr>
-          <p:nvPr/>
-        </p:nvSpPr>
-        <p:spPr>
-          <a:xfrm>
-            <a:off x="628650" y="1825627"/>
-            <a:ext cx="3886200" cy="4351335"/>
-          </a:xfrm>
-          <a:prstGeom prst="rect">
-            <a:avLst/>
-          </a:prstGeom>
-        </p:spPr>
-        <p:txBody>
-          <a:bodyPr/>
-          <a:lstStyle>
-            <a:lvl1pPr marL="228540" indent="-228540" algn="l" defTabSz="914175" rtl="0" eaLnBrk="1" latinLnBrk="0" hangingPunct="1">
-              <a:lnSpc>
-                <a:spcPct val="90000"/>
-              </a:lnSpc>
-              <a:spcBef>
-                <a:spcPts val="998"/>
-              </a:spcBef>
-              <a:buFont typeface="Arial" panose="020B0604020202020204" pitchFamily="34" charset="0"/>
-              <a:buChar char="•"/>
-              <a:defRPr sz="2798" kern="1200">
-                <a:solidFill>
-                  <a:schemeClr val="tx1"/>
-                </a:solidFill>
-                <a:latin typeface="+mn-lt"/>
-                <a:ea typeface="+mn-ea"/>
-                <a:cs typeface="+mn-cs"/>
-              </a:defRPr>
-            </a:lvl1pPr>
-            <a:lvl2pPr marL="685628" indent="-228540" algn="l" defTabSz="914175" rtl="0" eaLnBrk="1" latinLnBrk="0" hangingPunct="1">
-              <a:lnSpc>
-                <a:spcPct val="90000"/>
-              </a:lnSpc>
-              <a:spcBef>
-                <a:spcPts val="503"/>
-              </a:spcBef>
-              <a:buFont typeface="Arial" panose="020B0604020202020204" pitchFamily="34" charset="0"/>
-              <a:buChar char="•"/>
-              <a:defRPr sz="2400" kern="1200">
-                <a:solidFill>
-                  <a:schemeClr val="tx1"/>
-                </a:solidFill>
-                <a:latin typeface="+mn-lt"/>
-                <a:ea typeface="+mn-ea"/>
-                <a:cs typeface="+mn-cs"/>
-              </a:defRPr>
-            </a:lvl2pPr>
-            <a:lvl3pPr marL="1142715" indent="-228540" algn="l" defTabSz="914175" rtl="0" eaLnBrk="1" latinLnBrk="0" hangingPunct="1">
-              <a:lnSpc>
-                <a:spcPct val="90000"/>
-              </a:lnSpc>
-              <a:spcBef>
-                <a:spcPts val="503"/>
-              </a:spcBef>
-              <a:buFont typeface="Arial" panose="020B0604020202020204" pitchFamily="34" charset="0"/>
-              <a:buChar char="•"/>
-              <a:defRPr sz="2002" kern="1200">
-                <a:solidFill>
-                  <a:schemeClr val="tx1"/>
-                </a:solidFill>
-                <a:latin typeface="+mn-lt"/>
-                <a:ea typeface="+mn-ea"/>
-                <a:cs typeface="+mn-cs"/>
-              </a:defRPr>
-            </a:lvl3pPr>
-            <a:lvl4pPr marL="1599803" indent="-228540" algn="l" defTabSz="914175" rtl="0" eaLnBrk="1" latinLnBrk="0" hangingPunct="1">
-              <a:lnSpc>
-                <a:spcPct val="90000"/>
-              </a:lnSpc>
-              <a:spcBef>
-                <a:spcPts val="503"/>
-              </a:spcBef>
-              <a:buFont typeface="Arial" panose="020B0604020202020204" pitchFamily="34" charset="0"/>
-              <a:buChar char="•"/>
-              <a:defRPr sz="1800" kern="1200">
-                <a:solidFill>
-                  <a:schemeClr val="tx1"/>
-                </a:solidFill>
-                <a:latin typeface="+mn-lt"/>
-                <a:ea typeface="+mn-ea"/>
-                <a:cs typeface="+mn-cs"/>
-              </a:defRPr>
-            </a:lvl4pPr>
-            <a:lvl5pPr marL="2056883" indent="-228540" algn="l" defTabSz="914175" rtl="0" eaLnBrk="1" latinLnBrk="0" hangingPunct="1">
-              <a:lnSpc>
-                <a:spcPct val="90000"/>
-              </a:lnSpc>
-              <a:spcBef>
-                <a:spcPts val="503"/>
-              </a:spcBef>
-              <a:buFont typeface="Arial" panose="020B0604020202020204" pitchFamily="34" charset="0"/>
-              <a:buChar char="•"/>
-              <a:defRPr sz="1800" kern="1200">
-                <a:solidFill>
-                  <a:schemeClr val="tx1"/>
-                </a:solidFill>
-                <a:latin typeface="+mn-lt"/>
-                <a:ea typeface="+mn-ea"/>
-                <a:cs typeface="+mn-cs"/>
-              </a:defRPr>
-            </a:lvl5pPr>
-            <a:lvl6pPr marL="2513970" indent="-228540" algn="l" defTabSz="914175" rtl="0" eaLnBrk="1" latinLnBrk="0" hangingPunct="1">
-              <a:lnSpc>
-                <a:spcPct val="90000"/>
-              </a:lnSpc>
-              <a:spcBef>
-                <a:spcPts val="503"/>
-              </a:spcBef>
-              <a:buFont typeface="Arial" panose="020B0604020202020204" pitchFamily="34" charset="0"/>
-              <a:buChar char="•"/>
-              <a:defRPr sz="1800" kern="1200">
-                <a:solidFill>
-                  <a:schemeClr val="tx1"/>
-                </a:solidFill>
-                <a:latin typeface="+mn-lt"/>
-                <a:ea typeface="+mn-ea"/>
-                <a:cs typeface="+mn-cs"/>
-              </a:defRPr>
-            </a:lvl6pPr>
-            <a:lvl7pPr marL="2971058" indent="-228540" algn="l" defTabSz="914175" rtl="0" eaLnBrk="1" latinLnBrk="0" hangingPunct="1">
-              <a:lnSpc>
-                <a:spcPct val="90000"/>
-              </a:lnSpc>
-              <a:spcBef>
-                <a:spcPts val="503"/>
-              </a:spcBef>
-              <a:buFont typeface="Arial" panose="020B0604020202020204" pitchFamily="34" charset="0"/>
-              <a:buChar char="•"/>
-              <a:defRPr sz="1800" kern="1200">
-                <a:solidFill>
-                  <a:schemeClr val="tx1"/>
-                </a:solidFill>
-                <a:latin typeface="+mn-lt"/>
-                <a:ea typeface="+mn-ea"/>
-                <a:cs typeface="+mn-cs"/>
-              </a:defRPr>
-            </a:lvl7pPr>
-            <a:lvl8pPr marL="3428145" indent="-228540" algn="l" defTabSz="914175" rtl="0" eaLnBrk="1" latinLnBrk="0" hangingPunct="1">
-              <a:lnSpc>
-                <a:spcPct val="90000"/>
-              </a:lnSpc>
-              <a:spcBef>
-                <a:spcPts val="503"/>
-              </a:spcBef>
-              <a:buFont typeface="Arial" panose="020B0604020202020204" pitchFamily="34" charset="0"/>
-              <a:buChar char="•"/>
-              <a:defRPr sz="1800" kern="1200">
-                <a:solidFill>
-                  <a:schemeClr val="tx1"/>
-                </a:solidFill>
-                <a:latin typeface="+mn-lt"/>
-                <a:ea typeface="+mn-ea"/>
-                <a:cs typeface="+mn-cs"/>
-              </a:defRPr>
-            </a:lvl8pPr>
-            <a:lvl9pPr marL="3885225" indent="-228540" algn="l" defTabSz="914175" rtl="0" eaLnBrk="1" latinLnBrk="0" hangingPunct="1">
-              <a:lnSpc>
-                <a:spcPct val="90000"/>
-              </a:lnSpc>
-              <a:spcBef>
-                <a:spcPts val="503"/>
-              </a:spcBef>
-              <a:buFont typeface="Arial" panose="020B0604020202020204" pitchFamily="34" charset="0"/>
-              <a:buChar char="•"/>
-              <a:defRPr sz="1800" kern="1200">
-                <a:solidFill>
-                  <a:schemeClr val="tx1"/>
-                </a:solidFill>
-                <a:latin typeface="+mn-lt"/>
-                <a:ea typeface="+mn-ea"/>
-                <a:cs typeface="+mn-cs"/>
-              </a:defRPr>
-            </a:lvl9pPr>
-          </a:lstStyle>
-          <a:p>
-            <a:endParaRPr lang="en-CA"/>
-          </a:p>
-          <a:p>
-            <a:r>
-              <a:rPr lang="en-CA"/>
-              <a:t>A version control system</a:t>
-            </a:r>
-          </a:p>
-          <a:p>
-            <a:endParaRPr lang="en-CA"/>
-          </a:p>
-          <a:p>
-            <a:r>
-              <a:rPr lang="en-CA"/>
-              <a:t>Works locally and remotely</a:t>
-            </a:r>
-          </a:p>
-          <a:p>
-            <a:endParaRPr lang="en-CA"/>
-          </a:p>
-          <a:p>
-            <a:r>
-              <a:rPr lang="en-CA"/>
-              <a:t>Is open-source</a:t>
-            </a:r>
+              <a:t>What kind of files does Git track?</a:t>
+            </a:r>
+            <a:endParaRPr lang="en-CA" dirty="0"/>
           </a:p>
           <a:p>
             <a:pPr marL="0" indent="0">
-              <a:buFont typeface="Arial" panose="020B0604020202020204" pitchFamily="34" charset="0"/>
-              <a:buNone/>
-            </a:pPr>
+              <a:buNone/>
+            </a:pPr>
+            <a:endParaRPr lang="en-CA" b="1" dirty="0"/>
+          </a:p>
+          <a:p>
+            <a:r>
+              <a:rPr lang="en-CA" dirty="0"/>
+              <a:t>Can track any file, but works best for </a:t>
+            </a:r>
+            <a:r>
+              <a:rPr lang="en-CA" b="1" dirty="0"/>
+              <a:t>pure text files</a:t>
+            </a:r>
+            <a:r>
+              <a:rPr lang="en-CA" dirty="0"/>
+              <a:t> (.txt,.R,.</a:t>
+            </a:r>
+            <a:r>
+              <a:rPr lang="en-CA" dirty="0" err="1"/>
+              <a:t>py</a:t>
+            </a:r>
+            <a:r>
+              <a:rPr lang="en-CA" dirty="0"/>
+              <a:t> etc.)</a:t>
+            </a:r>
+          </a:p>
+          <a:p>
             <a:endParaRPr lang="en-CA" dirty="0"/>
           </a:p>
-        </p:txBody>
-      </p:sp>
-      <p:sp>
-        <p:nvSpPr>
-          <p:cNvPr id="4" name="Espace réservé du contenu 3">
-            <a:extLst>
-              <a:ext uri="{FF2B5EF4-FFF2-40B4-BE49-F238E27FC236}">
-                <a16:creationId xmlns:a16="http://schemas.microsoft.com/office/drawing/2014/main" id="{2794B09C-4A6C-6F4A-182A-60D6A6403924}"/>
-              </a:ext>
-            </a:extLst>
-          </p:cNvPr>
-          <p:cNvSpPr txBox="1">
-            <a:spLocks/>
-          </p:cNvSpPr>
-          <p:nvPr/>
-        </p:nvSpPr>
-        <p:spPr>
-          <a:xfrm>
-            <a:off x="4629150" y="1825627"/>
-            <a:ext cx="3886200" cy="4351335"/>
-          </a:xfrm>
-          <a:prstGeom prst="rect">
-            <a:avLst/>
-          </a:prstGeom>
-        </p:spPr>
-        <p:txBody>
-          <a:bodyPr/>
-          <a:lstStyle>
-            <a:lvl1pPr marL="228540" indent="-228540" algn="l" defTabSz="914175" rtl="0" eaLnBrk="1" latinLnBrk="0" hangingPunct="1">
-              <a:lnSpc>
-                <a:spcPct val="90000"/>
-              </a:lnSpc>
-              <a:spcBef>
-                <a:spcPts val="998"/>
-              </a:spcBef>
-              <a:buFont typeface="Arial" panose="020B0604020202020204" pitchFamily="34" charset="0"/>
-              <a:buChar char="•"/>
-              <a:defRPr sz="2798" kern="1200">
-                <a:solidFill>
-                  <a:schemeClr val="tx1"/>
-                </a:solidFill>
-                <a:latin typeface="+mn-lt"/>
-                <a:ea typeface="+mn-ea"/>
-                <a:cs typeface="+mn-cs"/>
-              </a:defRPr>
-            </a:lvl1pPr>
-            <a:lvl2pPr marL="685628" indent="-228540" algn="l" defTabSz="914175" rtl="0" eaLnBrk="1" latinLnBrk="0" hangingPunct="1">
-              <a:lnSpc>
-                <a:spcPct val="90000"/>
-              </a:lnSpc>
-              <a:spcBef>
-                <a:spcPts val="503"/>
-              </a:spcBef>
-              <a:buFont typeface="Arial" panose="020B0604020202020204" pitchFamily="34" charset="0"/>
-              <a:buChar char="•"/>
-              <a:defRPr sz="2400" kern="1200">
-                <a:solidFill>
-                  <a:schemeClr val="tx1"/>
-                </a:solidFill>
-                <a:latin typeface="+mn-lt"/>
-                <a:ea typeface="+mn-ea"/>
-                <a:cs typeface="+mn-cs"/>
-              </a:defRPr>
-            </a:lvl2pPr>
-            <a:lvl3pPr marL="1142715" indent="-228540" algn="l" defTabSz="914175" rtl="0" eaLnBrk="1" latinLnBrk="0" hangingPunct="1">
-              <a:lnSpc>
-                <a:spcPct val="90000"/>
-              </a:lnSpc>
-              <a:spcBef>
-                <a:spcPts val="503"/>
-              </a:spcBef>
-              <a:buFont typeface="Arial" panose="020B0604020202020204" pitchFamily="34" charset="0"/>
-              <a:buChar char="•"/>
-              <a:defRPr sz="2002" kern="1200">
-                <a:solidFill>
-                  <a:schemeClr val="tx1"/>
-                </a:solidFill>
-                <a:latin typeface="+mn-lt"/>
-                <a:ea typeface="+mn-ea"/>
-                <a:cs typeface="+mn-cs"/>
-              </a:defRPr>
-            </a:lvl3pPr>
-            <a:lvl4pPr marL="1599803" indent="-228540" algn="l" defTabSz="914175" rtl="0" eaLnBrk="1" latinLnBrk="0" hangingPunct="1">
-              <a:lnSpc>
-                <a:spcPct val="90000"/>
-              </a:lnSpc>
-              <a:spcBef>
-                <a:spcPts val="503"/>
-              </a:spcBef>
-              <a:buFont typeface="Arial" panose="020B0604020202020204" pitchFamily="34" charset="0"/>
-              <a:buChar char="•"/>
-              <a:defRPr sz="1800" kern="1200">
-                <a:solidFill>
-                  <a:schemeClr val="tx1"/>
-                </a:solidFill>
-                <a:latin typeface="+mn-lt"/>
-                <a:ea typeface="+mn-ea"/>
-                <a:cs typeface="+mn-cs"/>
-              </a:defRPr>
-            </a:lvl4pPr>
-            <a:lvl5pPr marL="2056883" indent="-228540" algn="l" defTabSz="914175" rtl="0" eaLnBrk="1" latinLnBrk="0" hangingPunct="1">
-              <a:lnSpc>
-                <a:spcPct val="90000"/>
-              </a:lnSpc>
-              <a:spcBef>
-                <a:spcPts val="503"/>
-              </a:spcBef>
-              <a:buFont typeface="Arial" panose="020B0604020202020204" pitchFamily="34" charset="0"/>
-              <a:buChar char="•"/>
-              <a:defRPr sz="1800" kern="1200">
-                <a:solidFill>
-                  <a:schemeClr val="tx1"/>
-                </a:solidFill>
-                <a:latin typeface="+mn-lt"/>
-                <a:ea typeface="+mn-ea"/>
-                <a:cs typeface="+mn-cs"/>
-              </a:defRPr>
-            </a:lvl5pPr>
-            <a:lvl6pPr marL="2513970" indent="-228540" algn="l" defTabSz="914175" rtl="0" eaLnBrk="1" latinLnBrk="0" hangingPunct="1">
-              <a:lnSpc>
-                <a:spcPct val="90000"/>
-              </a:lnSpc>
-              <a:spcBef>
-                <a:spcPts val="503"/>
-              </a:spcBef>
-              <a:buFont typeface="Arial" panose="020B0604020202020204" pitchFamily="34" charset="0"/>
-              <a:buChar char="•"/>
-              <a:defRPr sz="1800" kern="1200">
-                <a:solidFill>
-                  <a:schemeClr val="tx1"/>
-                </a:solidFill>
-                <a:latin typeface="+mn-lt"/>
-                <a:ea typeface="+mn-ea"/>
-                <a:cs typeface="+mn-cs"/>
-              </a:defRPr>
-            </a:lvl6pPr>
-            <a:lvl7pPr marL="2971058" indent="-228540" algn="l" defTabSz="914175" rtl="0" eaLnBrk="1" latinLnBrk="0" hangingPunct="1">
-              <a:lnSpc>
-                <a:spcPct val="90000"/>
-              </a:lnSpc>
-              <a:spcBef>
-                <a:spcPts val="503"/>
-              </a:spcBef>
-              <a:buFont typeface="Arial" panose="020B0604020202020204" pitchFamily="34" charset="0"/>
-              <a:buChar char="•"/>
-              <a:defRPr sz="1800" kern="1200">
-                <a:solidFill>
-                  <a:schemeClr val="tx1"/>
-                </a:solidFill>
-                <a:latin typeface="+mn-lt"/>
-                <a:ea typeface="+mn-ea"/>
-                <a:cs typeface="+mn-cs"/>
-              </a:defRPr>
-            </a:lvl7pPr>
-            <a:lvl8pPr marL="3428145" indent="-228540" algn="l" defTabSz="914175" rtl="0" eaLnBrk="1" latinLnBrk="0" hangingPunct="1">
-              <a:lnSpc>
-                <a:spcPct val="90000"/>
-              </a:lnSpc>
-              <a:spcBef>
-                <a:spcPts val="503"/>
-              </a:spcBef>
-              <a:buFont typeface="Arial" panose="020B0604020202020204" pitchFamily="34" charset="0"/>
-              <a:buChar char="•"/>
-              <a:defRPr sz="1800" kern="1200">
-                <a:solidFill>
-                  <a:schemeClr val="tx1"/>
-                </a:solidFill>
-                <a:latin typeface="+mn-lt"/>
-                <a:ea typeface="+mn-ea"/>
-                <a:cs typeface="+mn-cs"/>
-              </a:defRPr>
-            </a:lvl8pPr>
-            <a:lvl9pPr marL="3885225" indent="-228540" algn="l" defTabSz="914175" rtl="0" eaLnBrk="1" latinLnBrk="0" hangingPunct="1">
-              <a:lnSpc>
-                <a:spcPct val="90000"/>
-              </a:lnSpc>
-              <a:spcBef>
-                <a:spcPts val="503"/>
-              </a:spcBef>
-              <a:buFont typeface="Arial" panose="020B0604020202020204" pitchFamily="34" charset="0"/>
-              <a:buChar char="•"/>
-              <a:defRPr sz="1800" kern="1200">
-                <a:solidFill>
-                  <a:schemeClr val="tx1"/>
-                </a:solidFill>
-                <a:latin typeface="+mn-lt"/>
-                <a:ea typeface="+mn-ea"/>
-                <a:cs typeface="+mn-cs"/>
-              </a:defRPr>
-            </a:lvl9pPr>
-          </a:lstStyle>
+          <a:p>
+            <a:r>
+              <a:rPr lang="en-CA" dirty="0"/>
+              <a:t>Word documents, PowerPoint slides are in binary; Git has no support for displaying the changes occurring in these files</a:t>
+            </a:r>
+          </a:p>
           <a:p>
             <a:endParaRPr lang="en-CA" dirty="0"/>
           </a:p>
           <a:p>
             <a:r>
               <a:rPr lang="en-CA" dirty="0"/>
-              <a:t>A server that </a:t>
-            </a:r>
-            <a:r>
-              <a:rPr lang="en-CA" b="1" dirty="0"/>
-              <a:t>hosts </a:t>
-            </a:r>
-            <a:r>
-              <a:rPr lang="en-CA" dirty="0"/>
-              <a:t>Git repositories</a:t>
+              <a:t>Still useful for storing such files, just doesn’t make the most of all of Git’s features</a:t>
             </a:r>
           </a:p>
           <a:p>
@@ -20682,16 +22716,7 @@
           <a:p>
             <a:r>
               <a:rPr lang="en-CA" dirty="0"/>
-              <a:t>Works solely as a cloud-based service</a:t>
-            </a:r>
-          </a:p>
-          <a:p>
-            <a:endParaRPr lang="en-CA" dirty="0"/>
-          </a:p>
-          <a:p>
-            <a:r>
-              <a:rPr lang="en-CA" dirty="0"/>
-              <a:t>Owned by Microsoft</a:t>
+              <a:t>Markdown and LaTeX can be used instead of these binary files</a:t>
             </a:r>
           </a:p>
         </p:txBody>
@@ -20699,7 +22724,7 @@
     </p:spTree>
     <p:extLst>
       <p:ext uri="{BB962C8B-B14F-4D97-AF65-F5344CB8AC3E}">
-        <p14:creationId xmlns:p14="http://schemas.microsoft.com/office/powerpoint/2010/main" val="3449938012"/>
+        <p14:creationId xmlns:p14="http://schemas.microsoft.com/office/powerpoint/2010/main" val="1245366370"/>
       </p:ext>
     </p:extLst>
   </p:cSld>

</xml_diff>

<commit_message>
Edited slides for new folder names
</commit_message>
<xml_diff>
--- a/Slides/MiCM_GitHub_Workshop.pptx
+++ b/Slides/MiCM_GitHub_Workshop.pptx
@@ -1327,7 +1327,7 @@
   <pc:docChgLst>
     <pc:chgData name="Adrien Osakwe" userId="7a3e290c-eb83-484b-8e3d-d46ef2333477" providerId="ADAL" clId="{78A6C5BD-472B-4DA2-BC3B-9D1B7248E02A}"/>
     <pc:docChg chg="undo custSel addSld delSld modSld sldOrd">
-      <pc:chgData name="Adrien Osakwe" userId="7a3e290c-eb83-484b-8e3d-d46ef2333477" providerId="ADAL" clId="{78A6C5BD-472B-4DA2-BC3B-9D1B7248E02A}" dt="2025-06-25T14:26:10.829" v="1061" actId="20577"/>
+      <pc:chgData name="Adrien Osakwe" userId="7a3e290c-eb83-484b-8e3d-d46ef2333477" providerId="ADAL" clId="{78A6C5BD-472B-4DA2-BC3B-9D1B7248E02A}" dt="2025-06-25T14:48:22.326" v="1074" actId="20577"/>
       <pc:docMkLst>
         <pc:docMk/>
       </pc:docMkLst>
@@ -1437,13 +1437,13 @@
         </pc:spChg>
       </pc:sldChg>
       <pc:sldChg chg="modSp mod ord">
-        <pc:chgData name="Adrien Osakwe" userId="7a3e290c-eb83-484b-8e3d-d46ef2333477" providerId="ADAL" clId="{78A6C5BD-472B-4DA2-BC3B-9D1B7248E02A}" dt="2025-06-25T14:26:10.829" v="1061" actId="20577"/>
+        <pc:chgData name="Adrien Osakwe" userId="7a3e290c-eb83-484b-8e3d-d46ef2333477" providerId="ADAL" clId="{78A6C5BD-472B-4DA2-BC3B-9D1B7248E02A}" dt="2025-06-25T14:48:22.326" v="1074" actId="20577"/>
         <pc:sldMkLst>
           <pc:docMk/>
           <pc:sldMk cId="1071182491" sldId="401"/>
         </pc:sldMkLst>
         <pc:spChg chg="mod">
-          <ac:chgData name="Adrien Osakwe" userId="7a3e290c-eb83-484b-8e3d-d46ef2333477" providerId="ADAL" clId="{78A6C5BD-472B-4DA2-BC3B-9D1B7248E02A}" dt="2025-06-25T14:26:10.829" v="1061" actId="20577"/>
+          <ac:chgData name="Adrien Osakwe" userId="7a3e290c-eb83-484b-8e3d-d46ef2333477" providerId="ADAL" clId="{78A6C5BD-472B-4DA2-BC3B-9D1B7248E02A}" dt="2025-06-25T14:48:22.326" v="1074" actId="20577"/>
           <ac:spMkLst>
             <pc:docMk/>
             <pc:sldMk cId="1071182491" sldId="401"/>
@@ -25085,7 +25085,15 @@
             </a:pPr>
             <a:r>
               <a:rPr lang="en-CA" dirty="0"/>
-              <a:t>Example Activities (Data Analysis // Database curation) are stored in ‘Team Project’ folder for this workshop’s repo.</a:t>
+              <a:t>Example Activities (Data Analysis // Database curation) are stored in </a:t>
+            </a:r>
+            <a:r>
+              <a:rPr lang="en-CA"/>
+              <a:t>‘Exercises’ </a:t>
+            </a:r>
+            <a:r>
+              <a:rPr lang="en-CA" dirty="0"/>
+              <a:t>folder for this workshop’s repo.</a:t>
             </a:r>
           </a:p>
           <a:p>

</xml_diff>